<commit_message>
Update code test and DS Basics
</commit_message>
<xml_diff>
--- a/cheat_sheet/DS Basics.pptx
+++ b/cheat_sheet/DS Basics.pptx
@@ -106,6 +106,20 @@
     </a:lvl9pPr>
   </p:defaultTextStyle>
   <p:extLst>
+    <p:ext uri="{521415D9-36F7-43E2-AB2F-B90AF26B5E84}">
+      <p14:sectionLst xmlns:p14="http://schemas.microsoft.com/office/powerpoint/2010/main">
+        <p14:section name="Default Section" id="{281E8FDA-E623-4EB1-A11A-E29F90905496}">
+          <p14:sldIdLst>
+            <p14:sldId id="258"/>
+          </p14:sldIdLst>
+        </p14:section>
+        <p14:section name="Neural Network" id="{1AF085EE-6EF8-4A30-9426-A63BDB500CBC}">
+          <p14:sldIdLst>
+            <p14:sldId id="257"/>
+          </p14:sldIdLst>
+        </p14:section>
+      </p14:sectionLst>
+    </p:ext>
     <p:ext uri="{EFAFB233-063F-42B5-8137-9DF3F51BA10A}">
       <p15:sldGuideLst xmlns:p15="http://schemas.microsoft.com/office/powerpoint/2012/main"/>
     </p:ext>
@@ -1772,7 +1786,7 @@
           <a:p>
             <a:fld id="{1AB153FA-EDD0-4CF2-940E-53E42A92FA71}" type="datetimeFigureOut">
               <a:rPr lang="en-US" smtClean="0"/>
-              <a:t>9/9/2021</a:t>
+              <a:t>9/28/2021</a:t>
             </a:fld>
             <a:endParaRPr lang="en-US"/>
           </a:p>
@@ -1942,7 +1956,7 @@
           <a:p>
             <a:fld id="{1AB153FA-EDD0-4CF2-940E-53E42A92FA71}" type="datetimeFigureOut">
               <a:rPr lang="en-US" smtClean="0"/>
-              <a:t>9/9/2021</a:t>
+              <a:t>9/28/2021</a:t>
             </a:fld>
             <a:endParaRPr lang="en-US"/>
           </a:p>
@@ -2122,7 +2136,7 @@
           <a:p>
             <a:fld id="{1AB153FA-EDD0-4CF2-940E-53E42A92FA71}" type="datetimeFigureOut">
               <a:rPr lang="en-US" smtClean="0"/>
-              <a:t>9/9/2021</a:t>
+              <a:t>9/28/2021</a:t>
             </a:fld>
             <a:endParaRPr lang="en-US"/>
           </a:p>
@@ -2292,7 +2306,7 @@
           <a:p>
             <a:fld id="{1AB153FA-EDD0-4CF2-940E-53E42A92FA71}" type="datetimeFigureOut">
               <a:rPr lang="en-US" smtClean="0"/>
-              <a:t>9/9/2021</a:t>
+              <a:t>9/28/2021</a:t>
             </a:fld>
             <a:endParaRPr lang="en-US"/>
           </a:p>
@@ -2538,7 +2552,7 @@
           <a:p>
             <a:fld id="{1AB153FA-EDD0-4CF2-940E-53E42A92FA71}" type="datetimeFigureOut">
               <a:rPr lang="en-US" smtClean="0"/>
-              <a:t>9/9/2021</a:t>
+              <a:t>9/28/2021</a:t>
             </a:fld>
             <a:endParaRPr lang="en-US"/>
           </a:p>
@@ -2770,7 +2784,7 @@
           <a:p>
             <a:fld id="{1AB153FA-EDD0-4CF2-940E-53E42A92FA71}" type="datetimeFigureOut">
               <a:rPr lang="en-US" smtClean="0"/>
-              <a:t>9/9/2021</a:t>
+              <a:t>9/28/2021</a:t>
             </a:fld>
             <a:endParaRPr lang="en-US"/>
           </a:p>
@@ -3137,7 +3151,7 @@
           <a:p>
             <a:fld id="{1AB153FA-EDD0-4CF2-940E-53E42A92FA71}" type="datetimeFigureOut">
               <a:rPr lang="en-US" smtClean="0"/>
-              <a:t>9/9/2021</a:t>
+              <a:t>9/28/2021</a:t>
             </a:fld>
             <a:endParaRPr lang="en-US"/>
           </a:p>
@@ -3255,7 +3269,7 @@
           <a:p>
             <a:fld id="{1AB153FA-EDD0-4CF2-940E-53E42A92FA71}" type="datetimeFigureOut">
               <a:rPr lang="en-US" smtClean="0"/>
-              <a:t>9/9/2021</a:t>
+              <a:t>9/28/2021</a:t>
             </a:fld>
             <a:endParaRPr lang="en-US"/>
           </a:p>
@@ -3350,7 +3364,7 @@
           <a:p>
             <a:fld id="{1AB153FA-EDD0-4CF2-940E-53E42A92FA71}" type="datetimeFigureOut">
               <a:rPr lang="en-US" smtClean="0"/>
-              <a:t>9/9/2021</a:t>
+              <a:t>9/28/2021</a:t>
             </a:fld>
             <a:endParaRPr lang="en-US"/>
           </a:p>
@@ -3627,7 +3641,7 @@
           <a:p>
             <a:fld id="{1AB153FA-EDD0-4CF2-940E-53E42A92FA71}" type="datetimeFigureOut">
               <a:rPr lang="en-US" smtClean="0"/>
-              <a:t>9/9/2021</a:t>
+              <a:t>9/28/2021</a:t>
             </a:fld>
             <a:endParaRPr lang="en-US"/>
           </a:p>
@@ -3884,7 +3898,7 @@
           <a:p>
             <a:fld id="{1AB153FA-EDD0-4CF2-940E-53E42A92FA71}" type="datetimeFigureOut">
               <a:rPr lang="en-US" smtClean="0"/>
-              <a:t>9/9/2021</a:t>
+              <a:t>9/28/2021</a:t>
             </a:fld>
             <a:endParaRPr lang="en-US"/>
           </a:p>
@@ -4097,7 +4111,7 @@
           <a:p>
             <a:fld id="{1AB153FA-EDD0-4CF2-940E-53E42A92FA71}" type="datetimeFigureOut">
               <a:rPr lang="en-US" smtClean="0"/>
-              <a:t>9/9/2021</a:t>
+              <a:t>9/28/2021</a:t>
             </a:fld>
             <a:endParaRPr lang="en-US"/>
           </a:p>
@@ -11203,14 +11217,107 @@
           <a:chExt cx="0" cy="0"/>
         </a:xfrm>
       </p:grpSpPr>
+      <p:sp>
+        <p:nvSpPr>
+          <p:cNvPr id="3" name="Rectangle 2">
+            <a:extLst>
+              <a:ext uri="{FF2B5EF4-FFF2-40B4-BE49-F238E27FC236}">
+                <a16:creationId xmlns:a16="http://schemas.microsoft.com/office/drawing/2014/main" id="{87FFBDE2-D426-4581-8817-A05507EAFC32}"/>
+              </a:ext>
+            </a:extLst>
+          </p:cNvPr>
+          <p:cNvSpPr/>
+          <p:nvPr/>
+        </p:nvSpPr>
+        <p:spPr>
+          <a:xfrm>
+            <a:off x="0" y="0"/>
+            <a:ext cx="2286000" cy="552450"/>
+          </a:xfrm>
+          <a:prstGeom prst="rect">
+            <a:avLst/>
+          </a:prstGeom>
+          <a:solidFill>
+            <a:srgbClr val="001746"/>
+          </a:solidFill>
+          <a:ln>
+            <a:solidFill>
+              <a:schemeClr val="accent1"/>
+            </a:solidFill>
+          </a:ln>
+        </p:spPr>
+        <p:style>
+          <a:lnRef idx="2">
+            <a:schemeClr val="accent1">
+              <a:shade val="50000"/>
+            </a:schemeClr>
+          </a:lnRef>
+          <a:fillRef idx="1">
+            <a:schemeClr val="accent1"/>
+          </a:fillRef>
+          <a:effectRef idx="0">
+            <a:schemeClr val="accent1"/>
+          </a:effectRef>
+          <a:fontRef idx="minor">
+            <a:schemeClr val="lt1"/>
+          </a:fontRef>
+        </p:style>
+        <p:txBody>
+          <a:bodyPr rtlCol="0" anchor="t"/>
+          <a:lstStyle/>
+          <a:p>
+            <a:r>
+              <a:rPr lang="en-US" sz="1000" b="1" dirty="0">
+                <a:solidFill>
+                  <a:schemeClr val="accent2"/>
+                </a:solidFill>
+              </a:rPr>
+              <a:t>Basics</a:t>
+            </a:r>
+            <a:endParaRPr lang="en-SG" sz="1000" b="1" dirty="0">
+              <a:solidFill>
+                <a:schemeClr val="accent2"/>
+              </a:solidFill>
+            </a:endParaRPr>
+          </a:p>
+          <a:p>
+            <a:pPr marL="88488" indent="-88488">
+              <a:buFont typeface="Arial" panose="020B0604020202020204" pitchFamily="34" charset="0"/>
+              <a:buChar char="•"/>
+            </a:pPr>
+            <a:r>
+              <a:rPr lang="en-US" sz="1000" dirty="0">
+                <a:solidFill>
+                  <a:schemeClr val="bg1"/>
+                </a:solidFill>
+              </a:rPr>
+              <a:t>Forward Pass: prediction and loss</a:t>
+            </a:r>
+          </a:p>
+          <a:p>
+            <a:pPr marL="88488" indent="-88488">
+              <a:buFont typeface="Arial" panose="020B0604020202020204" pitchFamily="34" charset="0"/>
+              <a:buChar char="•"/>
+            </a:pPr>
+            <a:r>
+              <a:rPr lang="en-US" sz="1000" dirty="0">
+                <a:solidFill>
+                  <a:schemeClr val="bg1"/>
+                </a:solidFill>
+              </a:rPr>
+              <a:t>Back Propagation: update weights</a:t>
+            </a:r>
+          </a:p>
+        </p:txBody>
+      </p:sp>
       <mc:AlternateContent xmlns:mc="http://schemas.openxmlformats.org/markup-compatibility/2006">
         <mc:Choice xmlns:a14="http://schemas.microsoft.com/office/drawing/2010/main" Requires="a14">
           <p:sp>
             <p:nvSpPr>
-              <p:cNvPr id="57" name="Rectangle 56">
+              <p:cNvPr id="5" name="Rectangle 4">
                 <a:extLst>
                   <a:ext uri="{FF2B5EF4-FFF2-40B4-BE49-F238E27FC236}">
-                    <a16:creationId xmlns:a16="http://schemas.microsoft.com/office/drawing/2014/main" id="{7CA76DBA-3A25-4458-AE2D-AD7DFBD7CEB3}"/>
+                    <a16:creationId xmlns:a16="http://schemas.microsoft.com/office/drawing/2014/main" id="{337F7E18-823F-4CA9-84A3-5FB6B1A5EC4A}"/>
                   </a:ext>
                 </a:extLst>
               </p:cNvPr>
@@ -11219,8 +11326,8 @@
             </p:nvSpPr>
             <p:spPr>
               <a:xfrm>
-                <a:off x="0" y="0"/>
-                <a:ext cx="2286000" cy="2292383"/>
+                <a:off x="4572000" y="0"/>
+                <a:ext cx="2286000" cy="2394155"/>
               </a:xfrm>
               <a:prstGeom prst="rect">
                 <a:avLst/>
@@ -11260,8 +11367,62 @@
                       <a:schemeClr val="accent2"/>
                     </a:solidFill>
                   </a:rPr>
-                  <a:t>Momentum</a:t>
-                </a:r>
+                  <a:t>Gradient </a:t>
+                </a:r>
+                <a14:m>
+                  <m:oMath xmlns:m="http://schemas.openxmlformats.org/officeDocument/2006/math">
+                    <m:r>
+                      <a:rPr lang="en-US" sz="1000" b="1" i="1" smtClean="0">
+                        <a:solidFill>
+                          <a:schemeClr val="accent2"/>
+                        </a:solidFill>
+                        <a:latin typeface="Cambria Math" panose="02040503050406030204" pitchFamily="18" charset="0"/>
+                        <a:ea typeface="Cambria Math" panose="02040503050406030204" pitchFamily="18" charset="0"/>
+                      </a:rPr>
+                      <m:t>𝛁</m:t>
+                    </m:r>
+                    <m:r>
+                      <a:rPr lang="en-US" sz="1000" b="1" i="1" smtClean="0">
+                        <a:solidFill>
+                          <a:schemeClr val="accent2"/>
+                        </a:solidFill>
+                        <a:latin typeface="Cambria Math" panose="02040503050406030204" pitchFamily="18" charset="0"/>
+                        <a:ea typeface="Cambria Math" panose="02040503050406030204" pitchFamily="18" charset="0"/>
+                      </a:rPr>
+                      <m:t>=</m:t>
+                    </m:r>
+                    <m:r>
+                      <a:rPr lang="en-US" sz="1000" b="1" i="1" smtClean="0">
+                        <a:solidFill>
+                          <a:schemeClr val="accent2"/>
+                        </a:solidFill>
+                        <a:latin typeface="Cambria Math" panose="02040503050406030204" pitchFamily="18" charset="0"/>
+                        <a:ea typeface="Cambria Math" panose="02040503050406030204" pitchFamily="18" charset="0"/>
+                      </a:rPr>
+                      <m:t>𝒅𝑳</m:t>
+                    </m:r>
+                    <m:r>
+                      <a:rPr lang="en-US" sz="1000" b="1" i="1" smtClean="0">
+                        <a:solidFill>
+                          <a:schemeClr val="accent2"/>
+                        </a:solidFill>
+                        <a:latin typeface="Cambria Math" panose="02040503050406030204" pitchFamily="18" charset="0"/>
+                        <a:ea typeface="Cambria Math" panose="02040503050406030204" pitchFamily="18" charset="0"/>
+                      </a:rPr>
+                      <m:t>/</m:t>
+                    </m:r>
+                    <m:r>
+                      <a:rPr lang="en-US" sz="1000" b="1" i="1" smtClean="0">
+                        <a:solidFill>
+                          <a:schemeClr val="accent2"/>
+                        </a:solidFill>
+                        <a:latin typeface="Cambria Math" panose="02040503050406030204" pitchFamily="18" charset="0"/>
+                        <a:ea typeface="Cambria Math" panose="02040503050406030204" pitchFamily="18" charset="0"/>
+                      </a:rPr>
+                      <m:t>𝒅𝑾</m:t>
+                    </m:r>
+                  </m:oMath>
+                </a14:m>
                 <a:endParaRPr lang="en-SG" sz="1000" b="1" dirty="0">
                   <a:solidFill>
                     <a:schemeClr val="accent2"/>
@@ -11273,10 +11434,1121 @@
                   <a:buFont typeface="Arial" panose="020B0604020202020204" pitchFamily="34" charset="0"/>
                   <a:buChar char="•"/>
                 </a:pPr>
+                <a:r>
+                  <a:rPr lang="en-US" sz="1000" dirty="0">
+                    <a:solidFill>
+                      <a:schemeClr val="bg1"/>
+                    </a:solidFill>
+                  </a:rPr>
+                  <a:t>Numeric Gradient</a:t>
+                </a:r>
+              </a:p>
+              <a:p>
+                <a:pPr marL="265462" lvl="1" indent="-176974">
+                  <a:buFont typeface="Courier New" panose="02070309020205020404" pitchFamily="49" charset="0"/>
+                  <a:buChar char="-"/>
+                </a:pPr>
+                <a:r>
+                  <a:rPr lang="en-US" sz="1000" dirty="0"/>
+                  <a:t>Calculate from delta, inefficient</a:t>
+                </a:r>
+              </a:p>
+              <a:p>
+                <a:pPr marL="265462" lvl="1" indent="-176974">
+                  <a:buFont typeface="Courier New" panose="02070309020205020404" pitchFamily="49" charset="0"/>
+                  <a:buChar char="-"/>
+                </a:pPr>
+                <a:r>
+                  <a:rPr lang="en-US" sz="1000" dirty="0"/>
+                  <a:t>Use as gradient checking</a:t>
+                </a:r>
+              </a:p>
+              <a:p>
+                <a:pPr marL="88488" indent="-88488">
+                  <a:buFont typeface="Arial" panose="020B0604020202020204" pitchFamily="34" charset="0"/>
+                  <a:buChar char="•"/>
+                </a:pPr>
+                <a:r>
+                  <a:rPr lang="en-US" sz="1000" dirty="0">
+                    <a:solidFill>
+                      <a:schemeClr val="bg1"/>
+                    </a:solidFill>
+                  </a:rPr>
+                  <a:t>Analytical Gradient</a:t>
+                </a:r>
+              </a:p>
+              <a:p>
+                <a:pPr marL="265462" lvl="1" indent="-176974">
+                  <a:buFont typeface="Courier New" panose="02070309020205020404" pitchFamily="49" charset="0"/>
+                  <a:buChar char="-"/>
+                </a:pPr>
+                <a:r>
+                  <a:rPr lang="en-US" sz="1000" dirty="0"/>
+                  <a:t>Calculated by math</a:t>
+                </a:r>
+              </a:p>
+              <a:p>
+                <a:pPr marL="265462" lvl="1" indent="-176974">
+                  <a:buFont typeface="Courier New" panose="02070309020205020404" pitchFamily="49" charset="0"/>
+                  <a:buChar char="-"/>
+                </a:pPr>
+                <a:r>
+                  <a:rPr lang="en-US" sz="1000" dirty="0"/>
+                  <a:t>Chain Rule + DP = </a:t>
+                </a:r>
+                <a:r>
+                  <a:rPr lang="en-US" sz="1000" dirty="0">
+                    <a:solidFill>
+                      <a:schemeClr val="accent2"/>
+                    </a:solidFill>
+                  </a:rPr>
+                  <a:t>Back Propagation</a:t>
+                </a:r>
+              </a:p>
+              <a:p>
+                <a:pPr indent="-88488">
+                  <a:buFont typeface="Arial" panose="020B0604020202020204" pitchFamily="34" charset="0"/>
+                  <a:buChar char="•"/>
+                </a:pPr>
+                <a:r>
+                  <a:rPr lang="en-US" sz="1000" b="1" dirty="0">
+                    <a:solidFill>
+                      <a:schemeClr val="accent2">
+                        <a:lumMod val="50000"/>
+                      </a:schemeClr>
+                    </a:solidFill>
+                    <a:highlight>
+                      <a:srgbClr val="FFFF00"/>
+                    </a:highlight>
+                  </a:rPr>
+                  <a:t>Vanishing Gradient</a:t>
+                </a:r>
+              </a:p>
+              <a:p>
+                <a:pPr marL="265462" lvl="1" indent="-176974">
+                  <a:buFont typeface="Courier New" panose="02070309020205020404" pitchFamily="49" charset="0"/>
+                  <a:buChar char="-"/>
+                </a:pPr>
+                <a:r>
+                  <a:rPr lang="en-US" sz="1000" dirty="0"/>
+                  <a:t>Multiplication of small gradients</a:t>
+                </a:r>
+              </a:p>
+              <a:p>
+                <a:pPr indent="-88488">
+                  <a:buFont typeface="Arial" panose="020B0604020202020204" pitchFamily="34" charset="0"/>
+                  <a:buChar char="•"/>
+                </a:pPr>
+                <a:r>
+                  <a:rPr lang="en-US" sz="1000" b="1" dirty="0">
+                    <a:solidFill>
+                      <a:schemeClr val="accent2">
+                        <a:lumMod val="50000"/>
+                      </a:schemeClr>
+                    </a:solidFill>
+                    <a:highlight>
+                      <a:srgbClr val="FFFF00"/>
+                    </a:highlight>
+                  </a:rPr>
+                  <a:t>Exploding Gradient</a:t>
+                </a:r>
+              </a:p>
+              <a:p>
+                <a:pPr marL="265462" lvl="1" indent="-176974">
+                  <a:buFont typeface="Courier New" panose="02070309020205020404" pitchFamily="49" charset="0"/>
+                  <a:buChar char="-"/>
+                </a:pPr>
+                <a:r>
+                  <a:rPr lang="en-US" sz="1000" dirty="0"/>
+                  <a:t>Multiplication of large gradients</a:t>
+                </a:r>
+              </a:p>
+              <a:p>
+                <a:pPr marL="265462" lvl="1" indent="-176974">
+                  <a:buFont typeface="Courier New" panose="02070309020205020404" pitchFamily="49" charset="0"/>
+                  <a:buChar char="-"/>
+                </a:pPr>
+                <a:r>
+                  <a:rPr lang="en-US" sz="1000" dirty="0"/>
+                  <a:t>Can be from weight values</a:t>
+                </a:r>
+              </a:p>
+              <a:p>
+                <a:pPr marL="88488" indent="-88488">
+                  <a:buFont typeface="Arial" panose="020B0604020202020204" pitchFamily="34" charset="0"/>
+                  <a:buChar char="•"/>
+                </a:pPr>
+                <a:r>
+                  <a:rPr lang="en-US" sz="1000" b="1" dirty="0">
+                    <a:solidFill>
+                      <a:schemeClr val="accent2"/>
+                    </a:solidFill>
+                  </a:rPr>
+                  <a:t>Preventing Vanishing / Exploding</a:t>
+                </a:r>
+              </a:p>
+              <a:p>
+                <a:pPr marL="265462" lvl="1" indent="-176974">
+                  <a:buFont typeface="Courier New" panose="02070309020205020404" pitchFamily="49" charset="0"/>
+                  <a:buChar char="-"/>
+                </a:pPr>
+                <a:r>
+                  <a:rPr lang="en-US" sz="1000" dirty="0"/>
+                  <a:t>Initialization</a:t>
+                </a:r>
+              </a:p>
+              <a:p>
+                <a:pPr marL="265462" lvl="1" indent="-176974">
+                  <a:buFont typeface="Courier New" panose="02070309020205020404" pitchFamily="49" charset="0"/>
+                  <a:buChar char="-"/>
+                </a:pPr>
+                <a:r>
+                  <a:rPr lang="en-US" sz="1000" dirty="0"/>
+                  <a:t>Choice of activation function</a:t>
+                </a:r>
+                <a:endParaRPr lang="en-US" sz="1000" dirty="0">
+                  <a:solidFill>
+                    <a:schemeClr val="accent2"/>
+                  </a:solidFill>
+                </a:endParaRPr>
+              </a:p>
+            </p:txBody>
+          </p:sp>
+        </mc:Choice>
+        <mc:Fallback>
+          <p:sp>
+            <p:nvSpPr>
+              <p:cNvPr id="5" name="Rectangle 4">
+                <a:extLst>
+                  <a:ext uri="{FF2B5EF4-FFF2-40B4-BE49-F238E27FC236}">
+                    <a16:creationId xmlns:a16="http://schemas.microsoft.com/office/drawing/2014/main" id="{337F7E18-823F-4CA9-84A3-5FB6B1A5EC4A}"/>
+                  </a:ext>
+                </a:extLst>
+              </p:cNvPr>
+              <p:cNvSpPr>
+                <a:spLocks noRot="1" noChangeAspect="1" noMove="1" noResize="1" noEditPoints="1" noAdjustHandles="1" noChangeArrowheads="1" noChangeShapeType="1" noTextEdit="1"/>
+              </p:cNvSpPr>
+              <p:nvPr/>
+            </p:nvSpPr>
+            <p:spPr>
+              <a:xfrm>
+                <a:off x="4572000" y="0"/>
+                <a:ext cx="2286000" cy="2394155"/>
+              </a:xfrm>
+              <a:prstGeom prst="rect">
+                <a:avLst/>
+              </a:prstGeom>
+              <a:blipFill>
+                <a:blip r:embed="rId2"/>
+                <a:stretch>
+                  <a:fillRect b="-506"/>
+                </a:stretch>
+              </a:blipFill>
+              <a:ln>
+                <a:solidFill>
+                  <a:schemeClr val="accent1"/>
+                </a:solidFill>
+              </a:ln>
+            </p:spPr>
+            <p:txBody>
+              <a:bodyPr/>
+              <a:lstStyle/>
+              <a:p>
+                <a:r>
+                  <a:rPr lang="en-SG">
+                    <a:noFill/>
+                  </a:rPr>
+                  <a:t> </a:t>
+                </a:r>
+              </a:p>
+            </p:txBody>
+          </p:sp>
+        </mc:Fallback>
+      </mc:AlternateContent>
+      <mc:AlternateContent xmlns:mc="http://schemas.openxmlformats.org/markup-compatibility/2006">
+        <mc:Choice xmlns:a14="http://schemas.microsoft.com/office/drawing/2010/main" Requires="a14">
+          <p:sp>
+            <p:nvSpPr>
+              <p:cNvPr id="7" name="Rectangle 6">
+                <a:extLst>
+                  <a:ext uri="{FF2B5EF4-FFF2-40B4-BE49-F238E27FC236}">
+                    <a16:creationId xmlns:a16="http://schemas.microsoft.com/office/drawing/2014/main" id="{BAB43570-0C37-4C50-A42D-BC2F39AAE8C8}"/>
+                  </a:ext>
+                </a:extLst>
+              </p:cNvPr>
+              <p:cNvSpPr/>
+              <p:nvPr/>
+            </p:nvSpPr>
+            <p:spPr>
+              <a:xfrm>
+                <a:off x="6858000" y="0"/>
+                <a:ext cx="2286000" cy="4463846"/>
+              </a:xfrm>
+              <a:prstGeom prst="rect">
+                <a:avLst/>
+              </a:prstGeom>
+              <a:solidFill>
+                <a:srgbClr val="001746"/>
+              </a:solidFill>
+              <a:ln>
+                <a:solidFill>
+                  <a:schemeClr val="accent1"/>
+                </a:solidFill>
+              </a:ln>
+            </p:spPr>
+            <p:style>
+              <a:lnRef idx="2">
+                <a:schemeClr val="accent1">
+                  <a:shade val="50000"/>
+                </a:schemeClr>
+              </a:lnRef>
+              <a:fillRef idx="1">
+                <a:schemeClr val="accent1"/>
+              </a:fillRef>
+              <a:effectRef idx="0">
+                <a:schemeClr val="accent1"/>
+              </a:effectRef>
+              <a:fontRef idx="minor">
+                <a:schemeClr val="lt1"/>
+              </a:fontRef>
+            </p:style>
+            <p:txBody>
+              <a:bodyPr rtlCol="0" anchor="t"/>
+              <a:lstStyle/>
+              <a:p>
+                <a:r>
+                  <a:rPr lang="en-US" sz="1000" b="1" dirty="0">
+                    <a:solidFill>
+                      <a:schemeClr val="accent2">
+                        <a:lumMod val="50000"/>
+                      </a:schemeClr>
+                    </a:solidFill>
+                    <a:highlight>
+                      <a:srgbClr val="FFFF00"/>
+                    </a:highlight>
+                  </a:rPr>
+                  <a:t>Optimization</a:t>
+                </a:r>
+                <a:endParaRPr lang="en-SG" sz="1000" b="1" dirty="0">
+                  <a:solidFill>
+                    <a:schemeClr val="accent2">
+                      <a:lumMod val="50000"/>
+                    </a:schemeClr>
+                  </a:solidFill>
+                  <a:highlight>
+                    <a:srgbClr val="FFFF00"/>
+                  </a:highlight>
+                </a:endParaRPr>
+              </a:p>
+              <a:p>
+                <a:pPr marL="88488" indent="-88488">
+                  <a:buFont typeface="Arial" panose="020B0604020202020204" pitchFamily="34" charset="0"/>
+                  <a:buChar char="•"/>
+                </a:pPr>
+                <a:r>
+                  <a:rPr lang="en-US" sz="1000" b="1" dirty="0">
+                    <a:solidFill>
+                      <a:schemeClr val="accent2"/>
+                    </a:solidFill>
+                  </a:rPr>
+                  <a:t>Stochastic Gradient Descent (SGD)</a:t>
+                </a:r>
+              </a:p>
+              <a:p>
+                <a:pPr marL="265462" lvl="1" indent="-176974">
+                  <a:buFont typeface="Courier New" panose="02070309020205020404" pitchFamily="49" charset="0"/>
+                  <a:buChar char="-"/>
+                </a:pPr>
+                <a:r>
+                  <a:rPr lang="en-US" sz="1000" dirty="0"/>
+                  <a:t>Use a random observation</a:t>
+                </a:r>
+              </a:p>
+              <a:p>
+                <a:pPr marL="265462" lvl="1" indent="-176974">
+                  <a:buFont typeface="Courier New" panose="02070309020205020404" pitchFamily="49" charset="0"/>
+                  <a:buChar char="-"/>
+                </a:pPr>
+                <a:r>
+                  <a:rPr lang="en-US" sz="1000" dirty="0"/>
+                  <a:t>Slow to converge</a:t>
+                </a:r>
+              </a:p>
+              <a:p>
+                <a:pPr marL="88488" indent="-88488">
+                  <a:buFont typeface="Arial" panose="020B0604020202020204" pitchFamily="34" charset="0"/>
+                  <a:buChar char="•"/>
+                </a:pPr>
+                <a:r>
+                  <a:rPr lang="en-US" sz="1000" b="1" dirty="0">
+                    <a:solidFill>
+                      <a:schemeClr val="accent2"/>
+                    </a:solidFill>
+                  </a:rPr>
+                  <a:t>Momentum</a:t>
+                </a:r>
+              </a:p>
+              <a:p>
+                <a:pPr marL="265462" lvl="1" indent="-176974">
+                  <a:buFont typeface="Courier New" panose="02070309020205020404" pitchFamily="49" charset="0"/>
+                  <a:buChar char="-"/>
+                </a:pPr>
+                <a:r>
+                  <a:rPr lang="en-US" sz="1000" dirty="0"/>
+                  <a:t>Also use previous gradients</a:t>
+                </a:r>
+              </a:p>
+              <a:p>
+                <a:pPr marL="265462" lvl="1" indent="-176974">
+                  <a:buFont typeface="Courier New" panose="02070309020205020404" pitchFamily="49" charset="0"/>
+                  <a:buChar char="-"/>
+                </a:pPr>
+                <a:r>
+                  <a:rPr lang="en-US" sz="1000" dirty="0"/>
+                  <a:t>Problem: too much momentum can jump pass global optima</a:t>
+                </a:r>
+              </a:p>
+              <a:p>
+                <a:pPr marL="265462" lvl="1" indent="-176974">
+                  <a:buFont typeface="Courier New" panose="02070309020205020404" pitchFamily="49" charset="0"/>
+                  <a:buChar char="-"/>
+                </a:pPr>
+                <a14:m>
+                  <m:oMath xmlns:m="http://schemas.openxmlformats.org/officeDocument/2006/math">
+                    <m:r>
+                      <a:rPr lang="en-US" sz="1000" smtClean="0">
+                        <a:latin typeface="Cambria Math" panose="02040503050406030204" pitchFamily="18" charset="0"/>
+                      </a:rPr>
+                      <m:t>𝑊</m:t>
+                    </m:r>
+                    <m:r>
+                      <a:rPr lang="en-US" sz="1000" smtClean="0">
+                        <a:latin typeface="Cambria Math" panose="02040503050406030204" pitchFamily="18" charset="0"/>
+                      </a:rPr>
+                      <m:t>=</m:t>
+                    </m:r>
+                    <m:r>
+                      <a:rPr lang="en-US" sz="1000" smtClean="0">
+                        <a:latin typeface="Cambria Math" panose="02040503050406030204" pitchFamily="18" charset="0"/>
+                      </a:rPr>
+                      <m:t>𝑊</m:t>
+                    </m:r>
+                    <m:r>
+                      <a:rPr lang="en-US" sz="1000" smtClean="0">
+                        <a:latin typeface="Cambria Math" panose="02040503050406030204" pitchFamily="18" charset="0"/>
+                      </a:rPr>
+                      <m:t>−</m:t>
+                    </m:r>
+                    <m:r>
+                      <a:rPr lang="en-US" sz="1000" smtClean="0">
+                        <a:latin typeface="Cambria Math" panose="02040503050406030204" pitchFamily="18" charset="0"/>
+                      </a:rPr>
+                      <m:t>𝛼</m:t>
+                    </m:r>
+                    <m:sSub>
+                      <m:sSubPr>
+                        <m:ctrlPr>
+                          <a:rPr lang="en-SG" sz="1000" i="1">
+                            <a:latin typeface="Cambria Math" panose="02040503050406030204" pitchFamily="18" charset="0"/>
+                          </a:rPr>
+                        </m:ctrlPr>
+                      </m:sSubPr>
+                      <m:e>
+                        <m:r>
+                          <a:rPr lang="en-US" sz="1000">
+                            <a:latin typeface="Cambria Math" panose="02040503050406030204" pitchFamily="18" charset="0"/>
+                          </a:rPr>
+                          <m:t>𝑉</m:t>
+                        </m:r>
+                      </m:e>
+                      <m:sub>
+                        <m:r>
+                          <a:rPr lang="en-US" sz="1000">
+                            <a:latin typeface="Cambria Math" panose="02040503050406030204" pitchFamily="18" charset="0"/>
+                          </a:rPr>
+                          <m:t>𝑑𝑊</m:t>
+                        </m:r>
+                      </m:sub>
+                    </m:sSub>
+                  </m:oMath>
+                </a14:m>
+                <a:endParaRPr lang="en-SG" sz="1000" dirty="0"/>
+              </a:p>
+              <a:p>
+                <a:pPr marL="265462" lvl="1" indent="-176974">
+                  <a:buFont typeface="Courier New" panose="02070309020205020404" pitchFamily="49" charset="0"/>
+                  <a:buChar char="-"/>
+                </a:pPr>
                 <a14:m>
                   <m:oMath xmlns:m="http://schemas.openxmlformats.org/officeDocument/2006/math">
                     <m:sSub>
                       <m:sSubPr>
+                        <m:ctrlPr>
+                          <a:rPr lang="en-SG" sz="1000"/>
+                        </m:ctrlPr>
+                      </m:sSubPr>
+                      <m:e>
+                        <m:r>
+                          <a:rPr lang="en-US" sz="1000"/>
+                          <m:t>𝑉</m:t>
+                        </m:r>
+                      </m:e>
+                      <m:sub>
+                        <m:r>
+                          <a:rPr lang="en-US" sz="1000"/>
+                          <m:t>𝑑𝑊</m:t>
+                        </m:r>
+                      </m:sub>
+                    </m:sSub>
+                    <m:r>
+                      <a:rPr lang="en-US" sz="1000"/>
+                      <m:t>=</m:t>
+                    </m:r>
+                    <m:sSub>
+                      <m:sSubPr>
+                        <m:ctrlPr>
+                          <a:rPr lang="en-SG" sz="1000"/>
+                        </m:ctrlPr>
+                      </m:sSubPr>
+                      <m:e>
+                        <m:r>
+                          <a:rPr lang="en-US" sz="1000"/>
+                          <m:t>𝛽</m:t>
+                        </m:r>
+                      </m:e>
+                      <m:sub>
+                        <m:r>
+                          <a:rPr lang="en-US" sz="1000"/>
+                          <m:t>1</m:t>
+                        </m:r>
+                      </m:sub>
+                    </m:sSub>
+                    <m:r>
+                      <a:rPr lang="en-US" sz="1000"/>
+                      <m:t> </m:t>
+                    </m:r>
+                    <m:sSub>
+                      <m:sSubPr>
+                        <m:ctrlPr>
+                          <a:rPr lang="en-SG" sz="1000"/>
+                        </m:ctrlPr>
+                      </m:sSubPr>
+                      <m:e>
+                        <m:r>
+                          <a:rPr lang="en-US" sz="1000"/>
+                          <m:t>𝑉</m:t>
+                        </m:r>
+                      </m:e>
+                      <m:sub>
+                        <m:r>
+                          <a:rPr lang="en-US" sz="1000"/>
+                          <m:t>𝑑𝑊</m:t>
+                        </m:r>
+                      </m:sub>
+                    </m:sSub>
+                    <m:r>
+                      <a:rPr lang="en-US" sz="1000"/>
+                      <m:t>+(1−</m:t>
+                    </m:r>
+                    <m:sSub>
+                      <m:sSubPr>
+                        <m:ctrlPr>
+                          <a:rPr lang="en-SG" sz="1000"/>
+                        </m:ctrlPr>
+                      </m:sSubPr>
+                      <m:e>
+                        <m:r>
+                          <a:rPr lang="en-US" sz="1000"/>
+                          <m:t>𝛽</m:t>
+                        </m:r>
+                      </m:e>
+                      <m:sub>
+                        <m:r>
+                          <a:rPr lang="en-US" sz="1000"/>
+                          <m:t>1</m:t>
+                        </m:r>
+                      </m:sub>
+                    </m:sSub>
+                    <m:r>
+                      <a:rPr lang="en-US" sz="1000"/>
+                      <m:t>)</m:t>
+                    </m:r>
+                    <m:r>
+                      <a:rPr lang="en-US" sz="1000"/>
+                      <m:t>𝑑𝑊</m:t>
+                    </m:r>
+                  </m:oMath>
+                </a14:m>
+                <a:endParaRPr lang="en-SG" sz="1000" dirty="0"/>
+              </a:p>
+              <a:p>
+                <a:pPr marL="88488" indent="-88488">
+                  <a:buFont typeface="Arial" panose="020B0604020202020204" pitchFamily="34" charset="0"/>
+                  <a:buChar char="•"/>
+                </a:pPr>
+                <a:r>
+                  <a:rPr lang="en-US" sz="1000" b="1" dirty="0">
+                    <a:solidFill>
+                      <a:schemeClr val="accent2"/>
+                    </a:solidFill>
+                  </a:rPr>
+                  <a:t>Adagrad</a:t>
+                </a:r>
+              </a:p>
+              <a:p>
+                <a:pPr marL="265462" lvl="1" indent="-176974">
+                  <a:buFont typeface="Courier New" panose="02070309020205020404" pitchFamily="49" charset="0"/>
+                  <a:buChar char="-"/>
+                </a:pPr>
+                <a:r>
+                  <a:rPr lang="en-US" sz="1000" dirty="0"/>
+                  <a:t>Learning rate per parameter</a:t>
+                </a:r>
+              </a:p>
+              <a:p>
+                <a:pPr marL="265462" lvl="1" indent="-176974">
+                  <a:buFont typeface="Courier New" panose="02070309020205020404" pitchFamily="49" charset="0"/>
+                  <a:buChar char="-"/>
+                </a:pPr>
+                <a:r>
+                  <a:rPr lang="en-US" sz="1000" dirty="0"/>
+                  <a:t>Lower rate if past big updates</a:t>
+                </a:r>
+              </a:p>
+              <a:p>
+                <a:pPr marL="265462" lvl="1" indent="-176974">
+                  <a:buFont typeface="Courier New" panose="02070309020205020404" pitchFamily="49" charset="0"/>
+                  <a:buChar char="-"/>
+                </a:pPr>
+                <a:r>
+                  <a:rPr lang="en-US" sz="1000" dirty="0"/>
+                  <a:t>Helpful in sparse features</a:t>
+                </a:r>
+              </a:p>
+              <a:p>
+                <a:pPr marL="265462" lvl="1" indent="-176974">
+                  <a:buFont typeface="Courier New" panose="02070309020205020404" pitchFamily="49" charset="0"/>
+                  <a:buChar char="-"/>
+                </a:pPr>
+                <a14:m>
+                  <m:oMath xmlns:m="http://schemas.openxmlformats.org/officeDocument/2006/math">
+                    <m:sSub>
+                      <m:sSubPr>
+                        <m:ctrlPr>
+                          <a:rPr lang="en-US" sz="1000" b="0" i="1" smtClean="0">
+                            <a:latin typeface="Cambria Math" panose="02040503050406030204" pitchFamily="18" charset="0"/>
+                          </a:rPr>
+                        </m:ctrlPr>
+                      </m:sSubPr>
+                      <m:e>
+                        <m:r>
+                          <a:rPr lang="en-US" sz="1000" b="0" i="1" smtClean="0">
+                            <a:latin typeface="Cambria Math" panose="02040503050406030204" pitchFamily="18" charset="0"/>
+                          </a:rPr>
+                          <m:t>𝑊</m:t>
+                        </m:r>
+                      </m:e>
+                      <m:sub>
+                        <m:r>
+                          <a:rPr lang="en-US" sz="1000" b="0" i="1" smtClean="0">
+                            <a:latin typeface="Cambria Math" panose="02040503050406030204" pitchFamily="18" charset="0"/>
+                          </a:rPr>
+                          <m:t>𝑖</m:t>
+                        </m:r>
+                      </m:sub>
+                    </m:sSub>
+                    <m:r>
+                      <a:rPr lang="en-US" sz="1000" b="0" i="1" smtClean="0">
+                        <a:latin typeface="Cambria Math" panose="02040503050406030204" pitchFamily="18" charset="0"/>
+                      </a:rPr>
+                      <m:t>=</m:t>
+                    </m:r>
+                    <m:sSub>
+                      <m:sSubPr>
+                        <m:ctrlPr>
+                          <a:rPr lang="en-US" sz="1000" b="0" i="1" smtClean="0">
+                            <a:latin typeface="Cambria Math" panose="02040503050406030204" pitchFamily="18" charset="0"/>
+                          </a:rPr>
+                        </m:ctrlPr>
+                      </m:sSubPr>
+                      <m:e>
+                        <m:r>
+                          <a:rPr lang="en-US" sz="1000" b="0" i="1" smtClean="0">
+                            <a:latin typeface="Cambria Math" panose="02040503050406030204" pitchFamily="18" charset="0"/>
+                          </a:rPr>
+                          <m:t>𝑊</m:t>
+                        </m:r>
+                      </m:e>
+                      <m:sub>
+                        <m:r>
+                          <a:rPr lang="en-US" sz="1000" b="0" i="1" smtClean="0">
+                            <a:latin typeface="Cambria Math" panose="02040503050406030204" pitchFamily="18" charset="0"/>
+                          </a:rPr>
+                          <m:t>𝑖</m:t>
+                        </m:r>
+                      </m:sub>
+                    </m:sSub>
+                    <m:r>
+                      <a:rPr lang="en-US" sz="1000" b="0" i="1" smtClean="0">
+                        <a:latin typeface="Cambria Math" panose="02040503050406030204" pitchFamily="18" charset="0"/>
+                      </a:rPr>
+                      <m:t>−</m:t>
+                    </m:r>
+                    <m:sSub>
+                      <m:sSubPr>
+                        <m:ctrlPr>
+                          <a:rPr lang="en-US" sz="1000" b="0" i="1" smtClean="0">
+                            <a:latin typeface="Cambria Math" panose="02040503050406030204" pitchFamily="18" charset="0"/>
+                          </a:rPr>
+                        </m:ctrlPr>
+                      </m:sSubPr>
+                      <m:e>
+                        <m:r>
+                          <a:rPr lang="en-US" sz="1000" b="0" i="1" smtClean="0">
+                            <a:latin typeface="Cambria Math" panose="02040503050406030204" pitchFamily="18" charset="0"/>
+                          </a:rPr>
+                          <m:t>𝑟</m:t>
+                        </m:r>
+                      </m:e>
+                      <m:sub>
+                        <m:r>
+                          <a:rPr lang="en-US" sz="1000" b="0" i="1" smtClean="0">
+                            <a:latin typeface="Cambria Math" panose="02040503050406030204" pitchFamily="18" charset="0"/>
+                          </a:rPr>
+                          <m:t>𝑖</m:t>
+                        </m:r>
+                      </m:sub>
+                    </m:sSub>
+                    <m:sSub>
+                      <m:sSubPr>
+                        <m:ctrlPr>
+                          <a:rPr lang="en-US" sz="1000" b="0" i="1" smtClean="0">
+                            <a:latin typeface="Cambria Math" panose="02040503050406030204" pitchFamily="18" charset="0"/>
+                            <a:ea typeface="Cambria Math" panose="02040503050406030204" pitchFamily="18" charset="0"/>
+                          </a:rPr>
+                        </m:ctrlPr>
+                      </m:sSubPr>
+                      <m:e>
+                        <m:r>
+                          <m:rPr>
+                            <m:sty m:val="p"/>
+                          </m:rPr>
+                          <a:rPr lang="en-US" sz="1000" b="0" i="1" smtClean="0">
+                            <a:latin typeface="Cambria Math" panose="02040503050406030204" pitchFamily="18" charset="0"/>
+                            <a:ea typeface="Cambria Math" panose="02040503050406030204" pitchFamily="18" charset="0"/>
+                          </a:rPr>
+                          <m:t>∇</m:t>
+                        </m:r>
+                      </m:e>
+                      <m:sub>
+                        <m:r>
+                          <a:rPr lang="en-US" sz="1000" b="0" i="1" smtClean="0">
+                            <a:latin typeface="Cambria Math" panose="02040503050406030204" pitchFamily="18" charset="0"/>
+                            <a:ea typeface="Cambria Math" panose="02040503050406030204" pitchFamily="18" charset="0"/>
+                          </a:rPr>
+                          <m:t>𝑖</m:t>
+                        </m:r>
+                      </m:sub>
+                    </m:sSub>
+                  </m:oMath>
+                </a14:m>
+                <a:endParaRPr lang="en-US" sz="1000" dirty="0"/>
+              </a:p>
+              <a:p>
+                <a:pPr marL="265462" lvl="1" indent="-176974">
+                  <a:buFont typeface="Courier New" panose="02070309020205020404" pitchFamily="49" charset="0"/>
+                  <a:buChar char="-"/>
+                </a:pPr>
+                <a14:m>
+                  <m:oMath xmlns:m="http://schemas.openxmlformats.org/officeDocument/2006/math">
+                    <m:sSubSup>
+                      <m:sSubSupPr>
+                        <m:ctrlPr>
+                          <a:rPr lang="en-US" sz="1000" b="0" i="1" smtClean="0">
+                            <a:latin typeface="Cambria Math" panose="02040503050406030204" pitchFamily="18" charset="0"/>
+                          </a:rPr>
+                        </m:ctrlPr>
+                      </m:sSubSupPr>
+                      <m:e>
+                        <m:r>
+                          <a:rPr lang="en-US" sz="1000" b="0" i="1" smtClean="0">
+                            <a:latin typeface="Cambria Math" panose="02040503050406030204" pitchFamily="18" charset="0"/>
+                          </a:rPr>
+                          <m:t>𝑟</m:t>
+                        </m:r>
+                      </m:e>
+                      <m:sub>
+                        <m:r>
+                          <a:rPr lang="en-US" sz="1000" b="0" i="1" smtClean="0">
+                            <a:latin typeface="Cambria Math" panose="02040503050406030204" pitchFamily="18" charset="0"/>
+                          </a:rPr>
+                          <m:t>𝑖</m:t>
+                        </m:r>
+                      </m:sub>
+                      <m:sup>
+                        <m:r>
+                          <a:rPr lang="en-US" sz="1000" b="0" i="1" smtClean="0">
+                            <a:latin typeface="Cambria Math" panose="02040503050406030204" pitchFamily="18" charset="0"/>
+                          </a:rPr>
+                          <m:t>𝑡</m:t>
+                        </m:r>
+                      </m:sup>
+                    </m:sSubSup>
+                    <m:r>
+                      <a:rPr lang="en-US" sz="1000" b="0" i="1" smtClean="0">
+                        <a:latin typeface="Cambria Math" panose="02040503050406030204" pitchFamily="18" charset="0"/>
+                      </a:rPr>
+                      <m:t>=</m:t>
+                    </m:r>
+                    <m:f>
+                      <m:fPr>
+                        <m:ctrlPr>
+                          <a:rPr lang="en-US" sz="1000" b="0" i="1" smtClean="0">
+                            <a:latin typeface="Cambria Math" panose="02040503050406030204" pitchFamily="18" charset="0"/>
+                          </a:rPr>
+                        </m:ctrlPr>
+                      </m:fPr>
+                      <m:num>
+                        <m:sSub>
+                          <m:sSubPr>
+                            <m:ctrlPr>
+                              <a:rPr lang="en-US" sz="1000" b="0" i="1" smtClean="0">
+                                <a:latin typeface="Cambria Math" panose="02040503050406030204" pitchFamily="18" charset="0"/>
+                              </a:rPr>
+                            </m:ctrlPr>
+                          </m:sSubPr>
+                          <m:e>
+                            <m:r>
+                              <a:rPr lang="en-US" sz="1000" b="0" i="1" smtClean="0">
+                                <a:latin typeface="Cambria Math" panose="02040503050406030204" pitchFamily="18" charset="0"/>
+                              </a:rPr>
+                              <m:t>𝑟</m:t>
+                            </m:r>
+                          </m:e>
+                          <m:sub>
+                            <m:r>
+                              <a:rPr lang="en-US" sz="1000" b="0" i="1" smtClean="0">
+                                <a:latin typeface="Cambria Math" panose="02040503050406030204" pitchFamily="18" charset="0"/>
+                              </a:rPr>
+                              <m:t>𝑔</m:t>
+                            </m:r>
+                          </m:sub>
+                        </m:sSub>
+                      </m:num>
+                      <m:den>
+                        <m:rad>
+                          <m:radPr>
+                            <m:degHide m:val="on"/>
+                            <m:ctrlPr>
+                              <a:rPr lang="en-US" sz="1000" b="0" i="1" smtClean="0">
+                                <a:latin typeface="Cambria Math" panose="02040503050406030204" pitchFamily="18" charset="0"/>
+                              </a:rPr>
+                            </m:ctrlPr>
+                          </m:radPr>
+                          <m:deg/>
+                          <m:e>
+                            <m:sSup>
+                              <m:sSupPr>
+                                <m:ctrlPr>
+                                  <a:rPr lang="en-US" sz="1000" b="0" i="1" smtClean="0">
+                                    <a:latin typeface="Cambria Math" panose="02040503050406030204" pitchFamily="18" charset="0"/>
+                                    <a:ea typeface="Cambria Math" panose="02040503050406030204" pitchFamily="18" charset="0"/>
+                                  </a:rPr>
+                                </m:ctrlPr>
+                              </m:sSupPr>
+                              <m:e>
+                                <m:d>
+                                  <m:dPr>
+                                    <m:ctrlPr>
+                                      <a:rPr lang="en-US" sz="1000" b="0" i="1" smtClean="0">
+                                        <a:latin typeface="Cambria Math" panose="02040503050406030204" pitchFamily="18" charset="0"/>
+                                        <a:ea typeface="Cambria Math" panose="02040503050406030204" pitchFamily="18" charset="0"/>
+                                      </a:rPr>
+                                    </m:ctrlPr>
+                                  </m:dPr>
+                                  <m:e>
+                                    <m:sSubSup>
+                                      <m:sSubSupPr>
+                                        <m:ctrlPr>
+                                          <a:rPr lang="en-US" sz="1000" b="0" i="1" smtClean="0">
+                                            <a:latin typeface="Cambria Math" panose="02040503050406030204" pitchFamily="18" charset="0"/>
+                                            <a:ea typeface="Cambria Math" panose="02040503050406030204" pitchFamily="18" charset="0"/>
+                                          </a:rPr>
+                                        </m:ctrlPr>
+                                      </m:sSubSupPr>
+                                      <m:e>
+                                        <m:r>
+                                          <m:rPr>
+                                            <m:sty m:val="p"/>
+                                          </m:rPr>
+                                          <a:rPr lang="en-US" sz="1000" b="0" i="1" smtClean="0">
+                                            <a:latin typeface="Cambria Math" panose="02040503050406030204" pitchFamily="18" charset="0"/>
+                                            <a:ea typeface="Cambria Math" panose="02040503050406030204" pitchFamily="18" charset="0"/>
+                                          </a:rPr>
+                                          <m:t>∇</m:t>
+                                        </m:r>
+                                      </m:e>
+                                      <m:sub>
+                                        <m:r>
+                                          <a:rPr lang="en-US" sz="1000" b="0" i="1" smtClean="0">
+                                            <a:latin typeface="Cambria Math" panose="02040503050406030204" pitchFamily="18" charset="0"/>
+                                            <a:ea typeface="Cambria Math" panose="02040503050406030204" pitchFamily="18" charset="0"/>
+                                          </a:rPr>
+                                          <m:t>𝑖</m:t>
+                                        </m:r>
+                                      </m:sub>
+                                      <m:sup>
+                                        <m:r>
+                                          <a:rPr lang="en-US" sz="1000" b="0" i="1" smtClean="0">
+                                            <a:latin typeface="Cambria Math" panose="02040503050406030204" pitchFamily="18" charset="0"/>
+                                            <a:ea typeface="Cambria Math" panose="02040503050406030204" pitchFamily="18" charset="0"/>
+                                          </a:rPr>
+                                          <m:t>𝑡</m:t>
+                                        </m:r>
+                                        <m:r>
+                                          <a:rPr lang="en-US" sz="1000" b="0" i="1" smtClean="0">
+                                            <a:latin typeface="Cambria Math" panose="02040503050406030204" pitchFamily="18" charset="0"/>
+                                            <a:ea typeface="Cambria Math" panose="02040503050406030204" pitchFamily="18" charset="0"/>
+                                          </a:rPr>
+                                          <m:t>−1</m:t>
+                                        </m:r>
+                                      </m:sup>
+                                    </m:sSubSup>
+                                  </m:e>
+                                </m:d>
+                              </m:e>
+                              <m:sup>
+                                <m:r>
+                                  <a:rPr lang="en-US" sz="1000" b="0" i="1" smtClean="0">
+                                    <a:latin typeface="Cambria Math" panose="02040503050406030204" pitchFamily="18" charset="0"/>
+                                    <a:ea typeface="Cambria Math" panose="02040503050406030204" pitchFamily="18" charset="0"/>
+                                  </a:rPr>
+                                  <m:t>2</m:t>
+                                </m:r>
+                              </m:sup>
+                            </m:sSup>
+                            <m:r>
+                              <a:rPr lang="en-US" sz="1000" b="0" i="1" smtClean="0">
+                                <a:latin typeface="Cambria Math" panose="02040503050406030204" pitchFamily="18" charset="0"/>
+                                <a:ea typeface="Cambria Math" panose="02040503050406030204" pitchFamily="18" charset="0"/>
+                              </a:rPr>
+                              <m:t>+…+</m:t>
+                            </m:r>
+                            <m:sSup>
+                              <m:sSupPr>
+                                <m:ctrlPr>
+                                  <a:rPr lang="en-US" sz="1000" b="0" i="1" smtClean="0">
+                                    <a:latin typeface="Cambria Math" panose="02040503050406030204" pitchFamily="18" charset="0"/>
+                                    <a:ea typeface="Cambria Math" panose="02040503050406030204" pitchFamily="18" charset="0"/>
+                                  </a:rPr>
+                                </m:ctrlPr>
+                              </m:sSupPr>
+                              <m:e>
+                                <m:d>
+                                  <m:dPr>
+                                    <m:ctrlPr>
+                                      <a:rPr lang="en-US" sz="1000" b="0" i="1" smtClean="0">
+                                        <a:latin typeface="Cambria Math" panose="02040503050406030204" pitchFamily="18" charset="0"/>
+                                        <a:ea typeface="Cambria Math" panose="02040503050406030204" pitchFamily="18" charset="0"/>
+                                      </a:rPr>
+                                    </m:ctrlPr>
+                                  </m:dPr>
+                                  <m:e>
+                                    <m:sSubSup>
+                                      <m:sSubSupPr>
+                                        <m:ctrlPr>
+                                          <a:rPr lang="en-US" sz="1000" b="0" i="1" smtClean="0">
+                                            <a:latin typeface="Cambria Math" panose="02040503050406030204" pitchFamily="18" charset="0"/>
+                                            <a:ea typeface="Cambria Math" panose="02040503050406030204" pitchFamily="18" charset="0"/>
+                                          </a:rPr>
+                                        </m:ctrlPr>
+                                      </m:sSubSupPr>
+                                      <m:e>
+                                        <m:r>
+                                          <m:rPr>
+                                            <m:sty m:val="p"/>
+                                          </m:rPr>
+                                          <a:rPr lang="en-US" sz="1000" b="0" i="1" smtClean="0">
+                                            <a:latin typeface="Cambria Math" panose="02040503050406030204" pitchFamily="18" charset="0"/>
+                                            <a:ea typeface="Cambria Math" panose="02040503050406030204" pitchFamily="18" charset="0"/>
+                                          </a:rPr>
+                                          <m:t>∇</m:t>
+                                        </m:r>
+                                      </m:e>
+                                      <m:sub>
+                                        <m:r>
+                                          <a:rPr lang="en-US" sz="1000" b="0" i="1" smtClean="0">
+                                            <a:latin typeface="Cambria Math" panose="02040503050406030204" pitchFamily="18" charset="0"/>
+                                            <a:ea typeface="Cambria Math" panose="02040503050406030204" pitchFamily="18" charset="0"/>
+                                          </a:rPr>
+                                          <m:t>𝑖</m:t>
+                                        </m:r>
+                                      </m:sub>
+                                      <m:sup>
+                                        <m:r>
+                                          <a:rPr lang="en-US" sz="1000" b="0" i="1" smtClean="0">
+                                            <a:latin typeface="Cambria Math" panose="02040503050406030204" pitchFamily="18" charset="0"/>
+                                            <a:ea typeface="Cambria Math" panose="02040503050406030204" pitchFamily="18" charset="0"/>
+                                          </a:rPr>
+                                          <m:t>𝑡</m:t>
+                                        </m:r>
+                                        <m:r>
+                                          <a:rPr lang="en-US" sz="1000" b="0" i="1" smtClean="0">
+                                            <a:latin typeface="Cambria Math" panose="02040503050406030204" pitchFamily="18" charset="0"/>
+                                            <a:ea typeface="Cambria Math" panose="02040503050406030204" pitchFamily="18" charset="0"/>
+                                          </a:rPr>
+                                          <m:t>−</m:t>
+                                        </m:r>
+                                        <m:r>
+                                          <a:rPr lang="en-US" sz="1000" b="0" i="1" smtClean="0">
+                                            <a:latin typeface="Cambria Math" panose="02040503050406030204" pitchFamily="18" charset="0"/>
+                                            <a:ea typeface="Cambria Math" panose="02040503050406030204" pitchFamily="18" charset="0"/>
+                                          </a:rPr>
+                                          <m:t>𝑛</m:t>
+                                        </m:r>
+                                      </m:sup>
+                                    </m:sSubSup>
+                                  </m:e>
+                                </m:d>
+                              </m:e>
+                              <m:sup>
+                                <m:r>
+                                  <a:rPr lang="en-US" sz="1000" b="0" i="1" smtClean="0">
+                                    <a:latin typeface="Cambria Math" panose="02040503050406030204" pitchFamily="18" charset="0"/>
+                                    <a:ea typeface="Cambria Math" panose="02040503050406030204" pitchFamily="18" charset="0"/>
+                                  </a:rPr>
+                                  <m:t>2</m:t>
+                                </m:r>
+                              </m:sup>
+                            </m:sSup>
+                          </m:e>
+                        </m:rad>
+                      </m:den>
+                    </m:f>
+                  </m:oMath>
+                </a14:m>
+                <a:endParaRPr lang="en-US" sz="1000" dirty="0"/>
+              </a:p>
+              <a:p>
+                <a:pPr marL="265462" lvl="1" indent="-176974">
+                  <a:buFont typeface="Courier New" panose="02070309020205020404" pitchFamily="49" charset="0"/>
+                  <a:buChar char="-"/>
+                </a:pPr>
+                <a14:m>
+                  <m:oMath xmlns:m="http://schemas.openxmlformats.org/officeDocument/2006/math">
+                    <m:sSub>
+                      <m:sSubPr>
+                        <m:ctrlPr>
+                          <a:rPr lang="en-US" sz="1000" b="0" i="1" smtClean="0">
+                            <a:latin typeface="Cambria Math" panose="02040503050406030204" pitchFamily="18" charset="0"/>
+                          </a:rPr>
+                        </m:ctrlPr>
+                      </m:sSubPr>
+                      <m:e>
+                        <m:r>
+                          <a:rPr lang="en-US" sz="1000" b="0" i="1" smtClean="0">
+                            <a:latin typeface="Cambria Math" panose="02040503050406030204" pitchFamily="18" charset="0"/>
+                          </a:rPr>
+                          <m:t>𝑟</m:t>
+                        </m:r>
+                      </m:e>
+                      <m:sub>
+                        <m:r>
+                          <a:rPr lang="en-US" sz="1000" b="0" i="1" smtClean="0">
+                            <a:latin typeface="Cambria Math" panose="02040503050406030204" pitchFamily="18" charset="0"/>
+                          </a:rPr>
+                          <m:t>𝑔</m:t>
+                        </m:r>
+                      </m:sub>
+                    </m:sSub>
+                  </m:oMath>
+                </a14:m>
+                <a:r>
+                  <a:rPr lang="en-US" sz="1000" dirty="0"/>
+                  <a:t> is usually 0.001</a:t>
+                </a:r>
+              </a:p>
+              <a:p>
+                <a:pPr marL="88488" indent="-88488">
+                  <a:buFont typeface="Arial" panose="020B0604020202020204" pitchFamily="34" charset="0"/>
+                  <a:buChar char="•"/>
+                </a:pPr>
+                <a:r>
+                  <a:rPr lang="en-US" sz="1000" b="1" dirty="0">
+                    <a:solidFill>
+                      <a:schemeClr val="accent2"/>
+                    </a:solidFill>
+                  </a:rPr>
+                  <a:t>RMSprop</a:t>
+                </a:r>
+              </a:p>
+              <a:p>
+                <a:pPr marL="265462" lvl="1" indent="-176974">
+                  <a:buFont typeface="Courier New" panose="02070309020205020404" pitchFamily="49" charset="0"/>
+                  <a:buChar char="-"/>
+                </a:pPr>
+                <a:r>
+                  <a:rPr lang="en-US" sz="1000" dirty="0"/>
+                  <a:t>Adagrad with decay rate</a:t>
+                </a:r>
+              </a:p>
+              <a:p>
+                <a:pPr marL="265462" lvl="1" indent="-176974">
+                  <a:buFont typeface="Courier New" panose="02070309020205020404" pitchFamily="49" charset="0"/>
+                  <a:buChar char="-"/>
+                </a:pPr>
+                <a14:m>
+                  <m:oMath xmlns:m="http://schemas.openxmlformats.org/officeDocument/2006/math">
+                    <m:r>
+                      <a:rPr lang="en-US" sz="1000" smtClean="0">
+                        <a:solidFill>
+                          <a:schemeClr val="bg1"/>
+                        </a:solidFill>
+                        <a:latin typeface="Cambria Math" panose="02040503050406030204" pitchFamily="18" charset="0"/>
+                      </a:rPr>
+                      <m:t>𝑊</m:t>
+                    </m:r>
+                    <m:r>
+                      <a:rPr lang="en-US" sz="1000" smtClean="0">
+                        <a:solidFill>
+                          <a:schemeClr val="bg1"/>
+                        </a:solidFill>
+                        <a:latin typeface="Cambria Math" panose="02040503050406030204" pitchFamily="18" charset="0"/>
+                      </a:rPr>
+                      <m:t>=</m:t>
+                    </m:r>
+                    <m:r>
+                      <a:rPr lang="en-US" sz="1000" smtClean="0">
+                        <a:solidFill>
+                          <a:schemeClr val="bg1"/>
+                        </a:solidFill>
+                        <a:latin typeface="Cambria Math" panose="02040503050406030204" pitchFamily="18" charset="0"/>
+                      </a:rPr>
+                      <m:t>𝑊</m:t>
+                    </m:r>
+                    <m:r>
+                      <a:rPr lang="en-US" sz="1000" smtClean="0">
+                        <a:solidFill>
+                          <a:schemeClr val="bg1"/>
+                        </a:solidFill>
+                        <a:latin typeface="Cambria Math" panose="02040503050406030204" pitchFamily="18" charset="0"/>
+                      </a:rPr>
+                      <m:t>−</m:t>
+                    </m:r>
+                    <m:r>
+                      <m:rPr>
+                        <m:sty m:val="p"/>
+                      </m:rPr>
+                      <a:rPr lang="en-US" sz="1000" smtClean="0">
+                        <a:solidFill>
+                          <a:schemeClr val="bg1"/>
+                        </a:solidFill>
+                        <a:latin typeface="Cambria Math" panose="02040503050406030204" pitchFamily="18" charset="0"/>
+                      </a:rPr>
+                      <m:t>α</m:t>
+                    </m:r>
+                    <m:f>
+                      <m:fPr>
                         <m:ctrlPr>
                           <a:rPr lang="en-SG" sz="1000" i="1">
                             <a:solidFill>
@@ -11285,73 +12557,74 @@
                             <a:latin typeface="Cambria Math" panose="02040503050406030204" pitchFamily="18" charset="0"/>
                           </a:rPr>
                         </m:ctrlPr>
-                      </m:sSubPr>
-                      <m:e>
+                      </m:fPr>
+                      <m:num>
                         <m:r>
+                          <m:rPr>
+                            <m:sty m:val="p"/>
+                          </m:rPr>
                           <a:rPr lang="en-US" sz="1000">
                             <a:solidFill>
                               <a:schemeClr val="bg1"/>
                             </a:solidFill>
                             <a:latin typeface="Cambria Math" panose="02040503050406030204" pitchFamily="18" charset="0"/>
                           </a:rPr>
-                          <m:t>𝑉</m:t>
+                          <m:t>dW</m:t>
                         </m:r>
-                      </m:e>
-                      <m:sub>
-                        <m:r>
-                          <a:rPr lang="en-US" sz="1000">
-                            <a:solidFill>
-                              <a:schemeClr val="bg1"/>
-                            </a:solidFill>
-                            <a:latin typeface="Cambria Math" panose="02040503050406030204" pitchFamily="18" charset="0"/>
-                          </a:rPr>
-                          <m:t>𝑑𝑊</m:t>
-                        </m:r>
-                      </m:sub>
-                    </m:sSub>
-                    <m:r>
-                      <a:rPr lang="en-US" sz="1000">
-                        <a:solidFill>
-                          <a:schemeClr val="bg1"/>
-                        </a:solidFill>
-                        <a:latin typeface="Cambria Math" panose="02040503050406030204" pitchFamily="18" charset="0"/>
-                      </a:rPr>
-                      <m:t>=</m:t>
-                    </m:r>
-                    <m:sSub>
-                      <m:sSubPr>
-                        <m:ctrlPr>
-                          <a:rPr lang="en-SG" sz="1000" i="1">
-                            <a:solidFill>
-                              <a:schemeClr val="bg1"/>
-                            </a:solidFill>
-                            <a:latin typeface="Cambria Math" panose="02040503050406030204" pitchFamily="18" charset="0"/>
-                          </a:rPr>
-                        </m:ctrlPr>
-                      </m:sSubPr>
-                      <m:e>
-                        <m:r>
-                          <a:rPr lang="en-US" sz="1000">
-                            <a:solidFill>
-                              <a:schemeClr val="bg1"/>
-                            </a:solidFill>
-                            <a:latin typeface="Cambria Math" panose="02040503050406030204" pitchFamily="18" charset="0"/>
-                          </a:rPr>
-                          <m:t>𝛽</m:t>
-                        </m:r>
-                      </m:e>
-                      <m:sub>
-                        <m:r>
-                          <a:rPr lang="en-US" sz="1000">
-                            <a:solidFill>
-                              <a:schemeClr val="bg1"/>
-                            </a:solidFill>
-                            <a:latin typeface="Cambria Math" panose="02040503050406030204" pitchFamily="18" charset="0"/>
-                          </a:rPr>
-                          <m:t>1</m:t>
-                        </m:r>
-                      </m:sub>
-                    </m:sSub>
+                      </m:num>
+                      <m:den>
+                        <m:rad>
+                          <m:radPr>
+                            <m:degHide m:val="on"/>
+                            <m:ctrlPr>
+                              <a:rPr lang="en-SG" sz="1000" i="1">
+                                <a:solidFill>
+                                  <a:schemeClr val="bg1"/>
+                                </a:solidFill>
+                                <a:latin typeface="Cambria Math" panose="02040503050406030204" pitchFamily="18" charset="0"/>
+                              </a:rPr>
+                            </m:ctrlPr>
+                          </m:radPr>
+                          <m:deg/>
+                          <m:e>
+                            <m:sSub>
+                              <m:sSubPr>
+                                <m:ctrlPr>
+                                  <a:rPr lang="en-SG" sz="1000" i="1">
+                                    <a:solidFill>
+                                      <a:schemeClr val="bg1"/>
+                                    </a:solidFill>
+                                    <a:latin typeface="Cambria Math" panose="02040503050406030204" pitchFamily="18" charset="0"/>
+                                  </a:rPr>
+                                </m:ctrlPr>
+                              </m:sSubPr>
+                              <m:e>
+                                <m:r>
+                                  <a:rPr lang="en-US" sz="1000">
+                                    <a:solidFill>
+                                      <a:schemeClr val="bg1"/>
+                                    </a:solidFill>
+                                    <a:latin typeface="Cambria Math" panose="02040503050406030204" pitchFamily="18" charset="0"/>
+                                  </a:rPr>
+                                  <m:t>𝑆</m:t>
+                                </m:r>
+                              </m:e>
+                              <m:sub>
+                                <m:r>
+                                  <a:rPr lang="en-US" sz="1000">
+                                    <a:solidFill>
+                                      <a:schemeClr val="bg1"/>
+                                    </a:solidFill>
+                                    <a:latin typeface="Cambria Math" panose="02040503050406030204" pitchFamily="18" charset="0"/>
+                                  </a:rPr>
+                                  <m:t>𝑑𝑤</m:t>
+                                </m:r>
+                              </m:sub>
+                            </m:sSub>
+                          </m:e>
+                        </m:rad>
+                      </m:den>
+                    </m:f>
                     <m:r>
                       <a:rPr lang="en-US" sz="1000">
                         <a:solidFill>
@@ -11360,101 +12633,6 @@
                         <a:latin typeface="Cambria Math" panose="02040503050406030204" pitchFamily="18" charset="0"/>
                       </a:rPr>
                       <m:t> </m:t>
-                    </m:r>
-                    <m:sSub>
-                      <m:sSubPr>
-                        <m:ctrlPr>
-                          <a:rPr lang="en-SG" sz="1000" i="1">
-                            <a:solidFill>
-                              <a:schemeClr val="bg1"/>
-                            </a:solidFill>
-                            <a:latin typeface="Cambria Math" panose="02040503050406030204" pitchFamily="18" charset="0"/>
-                          </a:rPr>
-                        </m:ctrlPr>
-                      </m:sSubPr>
-                      <m:e>
-                        <m:r>
-                          <a:rPr lang="en-US" sz="1000">
-                            <a:solidFill>
-                              <a:schemeClr val="bg1"/>
-                            </a:solidFill>
-                            <a:latin typeface="Cambria Math" panose="02040503050406030204" pitchFamily="18" charset="0"/>
-                          </a:rPr>
-                          <m:t>𝑉</m:t>
-                        </m:r>
-                      </m:e>
-                      <m:sub>
-                        <m:r>
-                          <a:rPr lang="en-US" sz="1000">
-                            <a:solidFill>
-                              <a:schemeClr val="bg1"/>
-                            </a:solidFill>
-                            <a:latin typeface="Cambria Math" panose="02040503050406030204" pitchFamily="18" charset="0"/>
-                          </a:rPr>
-                          <m:t>𝑑𝑊</m:t>
-                        </m:r>
-                      </m:sub>
-                    </m:sSub>
-                    <m:r>
-                      <a:rPr lang="en-US" sz="1000">
-                        <a:solidFill>
-                          <a:schemeClr val="bg1"/>
-                        </a:solidFill>
-                        <a:latin typeface="Cambria Math" panose="02040503050406030204" pitchFamily="18" charset="0"/>
-                      </a:rPr>
-                      <m:t>+(1−</m:t>
-                    </m:r>
-                    <m:sSub>
-                      <m:sSubPr>
-                        <m:ctrlPr>
-                          <a:rPr lang="en-SG" sz="1000" i="1">
-                            <a:solidFill>
-                              <a:schemeClr val="bg1"/>
-                            </a:solidFill>
-                            <a:latin typeface="Cambria Math" panose="02040503050406030204" pitchFamily="18" charset="0"/>
-                          </a:rPr>
-                        </m:ctrlPr>
-                      </m:sSubPr>
-                      <m:e>
-                        <m:r>
-                          <a:rPr lang="en-US" sz="1000">
-                            <a:solidFill>
-                              <a:schemeClr val="bg1"/>
-                            </a:solidFill>
-                            <a:latin typeface="Cambria Math" panose="02040503050406030204" pitchFamily="18" charset="0"/>
-                          </a:rPr>
-                          <m:t>𝛽</m:t>
-                        </m:r>
-                      </m:e>
-                      <m:sub>
-                        <m:r>
-                          <a:rPr lang="en-US" sz="1000">
-                            <a:solidFill>
-                              <a:schemeClr val="bg1"/>
-                            </a:solidFill>
-                            <a:latin typeface="Cambria Math" panose="02040503050406030204" pitchFamily="18" charset="0"/>
-                          </a:rPr>
-                          <m:t>1</m:t>
-                        </m:r>
-                      </m:sub>
-                    </m:sSub>
-                    <m:r>
-                      <a:rPr lang="en-US" sz="1000">
-                        <a:solidFill>
-                          <a:schemeClr val="bg1"/>
-                        </a:solidFill>
-                        <a:latin typeface="Cambria Math" panose="02040503050406030204" pitchFamily="18" charset="0"/>
-                      </a:rPr>
-                      <m:t>)</m:t>
-                    </m:r>
-                    <m:r>
-                      <a:rPr lang="en-US" sz="1000">
-                        <a:solidFill>
-                          <a:schemeClr val="bg1"/>
-                        </a:solidFill>
-                        <a:latin typeface="Cambria Math" panose="02040503050406030204" pitchFamily="18" charset="0"/>
-                      </a:rPr>
-                      <m:t>𝑑𝑊</m:t>
                     </m:r>
                   </m:oMath>
                 </a14:m>
@@ -11465,125 +12643,16 @@
                 </a:endParaRPr>
               </a:p>
               <a:p>
-                <a:pPr marL="88488" indent="-88488">
-                  <a:buFont typeface="Arial" panose="020B0604020202020204" pitchFamily="34" charset="0"/>
-                  <a:buChar char="•"/>
-                </a:pPr>
-                <a14:m>
-                  <m:oMath xmlns:m="http://schemas.openxmlformats.org/officeDocument/2006/math">
-                    <m:r>
-                      <a:rPr lang="en-US" sz="1000">
-                        <a:solidFill>
-                          <a:schemeClr val="bg1"/>
-                        </a:solidFill>
-                        <a:latin typeface="Cambria Math" panose="02040503050406030204" pitchFamily="18" charset="0"/>
-                      </a:rPr>
-                      <m:t>𝑊</m:t>
-                    </m:r>
-                    <m:r>
-                      <a:rPr lang="en-US" sz="1000">
-                        <a:solidFill>
-                          <a:schemeClr val="bg1"/>
-                        </a:solidFill>
-                        <a:latin typeface="Cambria Math" panose="02040503050406030204" pitchFamily="18" charset="0"/>
-                      </a:rPr>
-                      <m:t>=</m:t>
-                    </m:r>
-                    <m:r>
-                      <a:rPr lang="en-US" sz="1000">
-                        <a:solidFill>
-                          <a:schemeClr val="bg1"/>
-                        </a:solidFill>
-                        <a:latin typeface="Cambria Math" panose="02040503050406030204" pitchFamily="18" charset="0"/>
-                      </a:rPr>
-                      <m:t>𝑊</m:t>
-                    </m:r>
-                    <m:r>
-                      <a:rPr lang="en-US" sz="1000">
-                        <a:solidFill>
-                          <a:schemeClr val="bg1"/>
-                        </a:solidFill>
-                        <a:latin typeface="Cambria Math" panose="02040503050406030204" pitchFamily="18" charset="0"/>
-                      </a:rPr>
-                      <m:t>−</m:t>
-                    </m:r>
-                    <m:r>
-                      <a:rPr lang="en-US" sz="1000">
-                        <a:solidFill>
-                          <a:schemeClr val="bg1"/>
-                        </a:solidFill>
-                        <a:latin typeface="Cambria Math" panose="02040503050406030204" pitchFamily="18" charset="0"/>
-                      </a:rPr>
-                      <m:t>𝛼</m:t>
-                    </m:r>
-                    <m:sSub>
-                      <m:sSubPr>
-                        <m:ctrlPr>
-                          <a:rPr lang="en-SG" sz="1000" i="1">
-                            <a:solidFill>
-                              <a:schemeClr val="bg1"/>
-                            </a:solidFill>
-                            <a:latin typeface="Cambria Math" panose="02040503050406030204" pitchFamily="18" charset="0"/>
-                          </a:rPr>
-                        </m:ctrlPr>
-                      </m:sSubPr>
-                      <m:e>
-                        <m:r>
-                          <a:rPr lang="en-US" sz="1000">
-                            <a:solidFill>
-                              <a:schemeClr val="bg1"/>
-                            </a:solidFill>
-                            <a:latin typeface="Cambria Math" panose="02040503050406030204" pitchFamily="18" charset="0"/>
-                          </a:rPr>
-                          <m:t>𝑉</m:t>
-                        </m:r>
-                      </m:e>
-                      <m:sub>
-                        <m:r>
-                          <a:rPr lang="en-US" sz="1000">
-                            <a:solidFill>
-                              <a:schemeClr val="bg1"/>
-                            </a:solidFill>
-                            <a:latin typeface="Cambria Math" panose="02040503050406030204" pitchFamily="18" charset="0"/>
-                          </a:rPr>
-                          <m:t>𝑑𝑊</m:t>
-                        </m:r>
-                      </m:sub>
-                    </m:sSub>
-                  </m:oMath>
-                </a14:m>
-                <a:endParaRPr lang="en-SG" sz="1000" dirty="0">
-                  <a:solidFill>
-                    <a:schemeClr val="bg1"/>
-                  </a:solidFill>
-                </a:endParaRPr>
-              </a:p>
-              <a:p>
-                <a:r>
-                  <a:rPr lang="en-US" sz="1000" b="1" dirty="0">
-                    <a:solidFill>
-                      <a:schemeClr val="accent2"/>
-                    </a:solidFill>
-                  </a:rPr>
-                  <a:t>RMSprop</a:t>
-                </a:r>
-                <a:endParaRPr lang="en-SG" sz="1000" b="1" dirty="0">
-                  <a:solidFill>
-                    <a:schemeClr val="accent2"/>
-                  </a:solidFill>
-                </a:endParaRPr>
-              </a:p>
-              <a:p>
-                <a:pPr marL="88488" indent="-88488">
-                  <a:buFont typeface="Arial" panose="020B0604020202020204" pitchFamily="34" charset="0"/>
-                  <a:buChar char="•"/>
+                <a:pPr marL="265462" lvl="1" indent="-176974">
+                  <a:buFont typeface="Courier New" panose="02070309020205020404" pitchFamily="49" charset="0"/>
+                  <a:buChar char="-"/>
                 </a:pPr>
                 <a14:m>
                   <m:oMath xmlns:m="http://schemas.openxmlformats.org/officeDocument/2006/math">
                     <m:sSub>
                       <m:sSubPr>
                         <m:ctrlPr>
-                          <a:rPr lang="en-SG" sz="1000" i="1">
+                          <a:rPr lang="en-SG" sz="1000" i="1" smtClean="0">
                             <a:solidFill>
                               <a:schemeClr val="bg1"/>
                             </a:solidFill>
@@ -11802,182 +12871,13 @@
                     </m:sSup>
                   </m:oMath>
                 </a14:m>
-                <a:endParaRPr lang="en-SG" sz="1000" dirty="0">
-                  <a:solidFill>
-                    <a:schemeClr val="bg1"/>
-                  </a:solidFill>
-                </a:endParaRPr>
+                <a:endParaRPr lang="en-US" sz="1000" dirty="0"/>
               </a:p>
               <a:p>
-                <a:pPr marL="88488" indent="-88488">
+                <a:pPr indent="-88488">
                   <a:buFont typeface="Arial" panose="020B0604020202020204" pitchFamily="34" charset="0"/>
                   <a:buChar char="•"/>
                 </a:pPr>
-                <a14:m>
-                  <m:oMath xmlns:m="http://schemas.openxmlformats.org/officeDocument/2006/math">
-                    <m:r>
-                      <a:rPr lang="en-US" sz="1000">
-                        <a:solidFill>
-                          <a:schemeClr val="bg1"/>
-                        </a:solidFill>
-                        <a:latin typeface="Cambria Math" panose="02040503050406030204" pitchFamily="18" charset="0"/>
-                      </a:rPr>
-                      <m:t>𝑊</m:t>
-                    </m:r>
-                    <m:r>
-                      <a:rPr lang="en-US" sz="1000">
-                        <a:solidFill>
-                          <a:schemeClr val="bg1"/>
-                        </a:solidFill>
-                        <a:latin typeface="Cambria Math" panose="02040503050406030204" pitchFamily="18" charset="0"/>
-                      </a:rPr>
-                      <m:t>=</m:t>
-                    </m:r>
-                    <m:r>
-                      <a:rPr lang="en-US" sz="1000">
-                        <a:solidFill>
-                          <a:schemeClr val="bg1"/>
-                        </a:solidFill>
-                        <a:latin typeface="Cambria Math" panose="02040503050406030204" pitchFamily="18" charset="0"/>
-                      </a:rPr>
-                      <m:t>𝑊</m:t>
-                    </m:r>
-                    <m:r>
-                      <a:rPr lang="en-US" sz="1000">
-                        <a:solidFill>
-                          <a:schemeClr val="bg1"/>
-                        </a:solidFill>
-                        <a:latin typeface="Cambria Math" panose="02040503050406030204" pitchFamily="18" charset="0"/>
-                      </a:rPr>
-                      <m:t>−</m:t>
-                    </m:r>
-                    <m:r>
-                      <m:rPr>
-                        <m:sty m:val="p"/>
-                      </m:rPr>
-                      <a:rPr lang="en-US" sz="1000">
-                        <a:solidFill>
-                          <a:schemeClr val="bg1"/>
-                        </a:solidFill>
-                        <a:latin typeface="Cambria Math" panose="02040503050406030204" pitchFamily="18" charset="0"/>
-                      </a:rPr>
-                      <m:t>α</m:t>
-                    </m:r>
-                    <m:f>
-                      <m:fPr>
-                        <m:ctrlPr>
-                          <a:rPr lang="en-SG" sz="1000" i="1">
-                            <a:solidFill>
-                              <a:schemeClr val="bg1"/>
-                            </a:solidFill>
-                            <a:latin typeface="Cambria Math" panose="02040503050406030204" pitchFamily="18" charset="0"/>
-                          </a:rPr>
-                        </m:ctrlPr>
-                      </m:fPr>
-                      <m:num>
-                        <m:r>
-                          <m:rPr>
-                            <m:sty m:val="p"/>
-                          </m:rPr>
-                          <a:rPr lang="en-US" sz="1000">
-                            <a:solidFill>
-                              <a:schemeClr val="bg1"/>
-                            </a:solidFill>
-                            <a:latin typeface="Cambria Math" panose="02040503050406030204" pitchFamily="18" charset="0"/>
-                          </a:rPr>
-                          <m:t>dW</m:t>
-                        </m:r>
-                      </m:num>
-                      <m:den>
-                        <m:rad>
-                          <m:radPr>
-                            <m:degHide m:val="on"/>
-                            <m:ctrlPr>
-                              <a:rPr lang="en-SG" sz="1000" i="1">
-                                <a:solidFill>
-                                  <a:schemeClr val="bg1"/>
-                                </a:solidFill>
-                                <a:latin typeface="Cambria Math" panose="02040503050406030204" pitchFamily="18" charset="0"/>
-                              </a:rPr>
-                            </m:ctrlPr>
-                          </m:radPr>
-                          <m:deg/>
-                          <m:e>
-                            <m:sSub>
-                              <m:sSubPr>
-                                <m:ctrlPr>
-                                  <a:rPr lang="en-SG" sz="1000" i="1">
-                                    <a:solidFill>
-                                      <a:schemeClr val="bg1"/>
-                                    </a:solidFill>
-                                    <a:latin typeface="Cambria Math" panose="02040503050406030204" pitchFamily="18" charset="0"/>
-                                  </a:rPr>
-                                </m:ctrlPr>
-                              </m:sSubPr>
-                              <m:e>
-                                <m:r>
-                                  <a:rPr lang="en-US" sz="1000">
-                                    <a:solidFill>
-                                      <a:schemeClr val="bg1"/>
-                                    </a:solidFill>
-                                    <a:latin typeface="Cambria Math" panose="02040503050406030204" pitchFamily="18" charset="0"/>
-                                  </a:rPr>
-                                  <m:t>𝑆</m:t>
-                                </m:r>
-                              </m:e>
-                              <m:sub>
-                                <m:r>
-                                  <a:rPr lang="en-US" sz="1000">
-                                    <a:solidFill>
-                                      <a:schemeClr val="bg1"/>
-                                    </a:solidFill>
-                                    <a:latin typeface="Cambria Math" panose="02040503050406030204" pitchFamily="18" charset="0"/>
-                                  </a:rPr>
-                                  <m:t>𝑑𝑤</m:t>
-                                </m:r>
-                              </m:sub>
-                            </m:sSub>
-                          </m:e>
-                        </m:rad>
-                      </m:den>
-                    </m:f>
-                    <m:r>
-                      <a:rPr lang="en-US" sz="1000">
-                        <a:solidFill>
-                          <a:schemeClr val="bg1"/>
-                        </a:solidFill>
-                        <a:latin typeface="Cambria Math" panose="02040503050406030204" pitchFamily="18" charset="0"/>
-                      </a:rPr>
-                      <m:t> </m:t>
-                    </m:r>
-                  </m:oMath>
-                </a14:m>
-                <a:endParaRPr lang="en-SG" sz="1000" dirty="0">
-                  <a:solidFill>
-                    <a:schemeClr val="bg1"/>
-                  </a:solidFill>
-                </a:endParaRPr>
-              </a:p>
-              <a:p>
-                <a:pPr marL="88488" indent="-88488">
-                  <a:buFont typeface="Arial" panose="020B0604020202020204" pitchFamily="34" charset="0"/>
-                  <a:buChar char="•"/>
-                </a:pPr>
-                <a:r>
-                  <a:rPr lang="en-US" sz="1000" dirty="0">
-                    <a:solidFill>
-                      <a:schemeClr val="bg1"/>
-                    </a:solidFill>
-                  </a:rPr>
-                  <a:t>Allow using larger learning rate α</a:t>
-                </a:r>
-                <a:endParaRPr lang="en-SG" sz="1000" dirty="0">
-                  <a:solidFill>
-                    <a:schemeClr val="bg1"/>
-                  </a:solidFill>
-                </a:endParaRPr>
-              </a:p>
-              <a:p>
                 <a:r>
                   <a:rPr lang="en-US" sz="1000" b="1" dirty="0">
                     <a:solidFill>
@@ -11993,9 +12893,19 @@
                 </a:r>
               </a:p>
               <a:p>
-                <a:pPr marL="88488" indent="-88488">
-                  <a:buFont typeface="Arial" panose="020B0604020202020204" pitchFamily="34" charset="0"/>
-                  <a:buChar char="•"/>
+                <a:pPr marL="265462" lvl="1" indent="-176974">
+                  <a:buFont typeface="Courier New" panose="02070309020205020404" pitchFamily="49" charset="0"/>
+                  <a:buChar char="-"/>
+                </a:pPr>
+                <a:r>
+                  <a:rPr lang="en-US" sz="1000" dirty="0"/>
+                  <a:t>Momentum + RMSprop</a:t>
+                </a:r>
+              </a:p>
+              <a:p>
+                <a:pPr marL="265462" lvl="1" indent="-176974">
+                  <a:buFont typeface="Courier New" panose="02070309020205020404" pitchFamily="49" charset="0"/>
+                  <a:buChar char="-"/>
                 </a:pPr>
                 <a:r>
                   <a:rPr lang="en-US" sz="1000" dirty="0">
@@ -12003,42 +12913,18 @@
                       <a:schemeClr val="bg1"/>
                     </a:solidFill>
                   </a:rPr>
-                  <a:t>Momentum + RMSprop</a:t>
-                </a:r>
-                <a:endParaRPr lang="en-SG" sz="1000" dirty="0">
-                  <a:solidFill>
-                    <a:schemeClr val="bg1"/>
-                  </a:solidFill>
-                </a:endParaRPr>
+                  <a:t>bias correction on V, S; div by (1-β)</a:t>
+                </a:r>
               </a:p>
               <a:p>
-                <a:pPr marL="88488" indent="-88488">
-                  <a:buFont typeface="Arial" panose="020B0604020202020204" pitchFamily="34" charset="0"/>
-                  <a:buChar char="•"/>
-                </a:pPr>
-                <a:r>
-                  <a:rPr lang="en-US" sz="1000" dirty="0">
-                    <a:solidFill>
-                      <a:schemeClr val="bg1"/>
-                    </a:solidFill>
-                  </a:rPr>
-                  <a:t>bias correction on V and S, div by (1-β)</a:t>
-                </a:r>
-                <a:endParaRPr lang="en-SG" sz="1000" dirty="0">
-                  <a:solidFill>
-                    <a:schemeClr val="bg1"/>
-                  </a:solidFill>
-                </a:endParaRPr>
-              </a:p>
-              <a:p>
-                <a:pPr marL="88488" indent="-88488">
-                  <a:buFont typeface="Arial" panose="020B0604020202020204" pitchFamily="34" charset="0"/>
-                  <a:buChar char="•"/>
+                <a:pPr marL="265462" lvl="1" indent="-176974">
+                  <a:buFont typeface="Courier New" panose="02070309020205020404" pitchFamily="49" charset="0"/>
+                  <a:buChar char="-"/>
                 </a:pPr>
                 <a14:m>
                   <m:oMath xmlns:m="http://schemas.openxmlformats.org/officeDocument/2006/math">
                     <m:r>
-                      <a:rPr lang="en-US" sz="1000">
+                      <a:rPr lang="en-US" sz="1000" smtClean="0">
                         <a:solidFill>
                           <a:schemeClr val="bg1"/>
                         </a:solidFill>
@@ -12047,7 +12933,7 @@
                       <m:t>𝑊</m:t>
                     </m:r>
                     <m:r>
-                      <a:rPr lang="en-US" sz="1000">
+                      <a:rPr lang="en-US" sz="1000" smtClean="0">
                         <a:solidFill>
                           <a:schemeClr val="bg1"/>
                         </a:solidFill>
@@ -12056,7 +12942,7 @@
                       <m:t>=</m:t>
                     </m:r>
                     <m:r>
-                      <a:rPr lang="en-US" sz="1000">
+                      <a:rPr lang="en-US" sz="1000" smtClean="0">
                         <a:solidFill>
                           <a:schemeClr val="bg1"/>
                         </a:solidFill>
@@ -12065,7 +12951,7 @@
                       <m:t>𝑊</m:t>
                     </m:r>
                     <m:r>
-                      <a:rPr lang="en-US" sz="1000">
+                      <a:rPr lang="en-US" sz="1000" smtClean="0">
                         <a:solidFill>
                           <a:schemeClr val="bg1"/>
                         </a:solidFill>
@@ -12074,7 +12960,7 @@
                       <m:t>−</m:t>
                     </m:r>
                     <m:r>
-                      <a:rPr lang="en-US" sz="1000">
+                      <a:rPr lang="en-US" sz="1000" smtClean="0">
                         <a:solidFill>
                           <a:schemeClr val="bg1"/>
                         </a:solidFill>
@@ -12200,9 +13086,1988 @@
                         </m:r>
                       </m:den>
                     </m:f>
+                    <m:r>
+                      <a:rPr lang="en-US" sz="1000" i="1">
+                        <a:solidFill>
+                          <a:schemeClr val="bg1"/>
+                        </a:solidFill>
+                        <a:latin typeface="Cambria Math" panose="02040503050406030204" pitchFamily="18" charset="0"/>
+                      </a:rPr>
+                      <m:t> </m:t>
+                    </m:r>
                   </m:oMath>
                 </a14:m>
                 <a:endParaRPr lang="en-SG" sz="1000" dirty="0">
+                  <a:solidFill>
+                    <a:schemeClr val="bg1"/>
+                  </a:solidFill>
+                </a:endParaRPr>
+              </a:p>
+              <a:p>
+                <a:pPr marL="265462" lvl="1" indent="-176974">
+                  <a:buFont typeface="Courier New" panose="02070309020205020404" pitchFamily="49" charset="0"/>
+                  <a:buChar char="-"/>
+                </a:pPr>
+                <a:r>
+                  <a:rPr lang="en-US" sz="1000" dirty="0">
+                    <a:solidFill>
+                      <a:schemeClr val="bg1"/>
+                    </a:solidFill>
+                  </a:rPr>
+                  <a:t>Default </a:t>
+                </a:r>
+                <a:r>
+                  <a:rPr lang="el-GR" sz="1000" dirty="0">
+                    <a:solidFill>
+                      <a:schemeClr val="bg1"/>
+                    </a:solidFill>
+                  </a:rPr>
+                  <a:t>β1 </a:t>
+                </a:r>
+                <a:r>
+                  <a:rPr lang="en-SG" sz="1000" dirty="0">
+                    <a:solidFill>
+                      <a:schemeClr val="bg1"/>
+                    </a:solidFill>
+                  </a:rPr>
+                  <a:t>= 0.9, </a:t>
+                </a:r>
+                <a:r>
+                  <a:rPr lang="el-GR" sz="1000" dirty="0">
+                    <a:solidFill>
+                      <a:schemeClr val="bg1"/>
+                    </a:solidFill>
+                  </a:rPr>
+                  <a:t>β2 </a:t>
+                </a:r>
+                <a:r>
+                  <a:rPr lang="en-US" sz="1000" dirty="0">
+                    <a:solidFill>
+                      <a:schemeClr val="bg1"/>
+                    </a:solidFill>
+                  </a:rPr>
+                  <a:t>=</a:t>
+                </a:r>
+                <a:r>
+                  <a:rPr lang="en-SG" sz="1000" dirty="0">
+                    <a:solidFill>
+                      <a:schemeClr val="bg1"/>
+                    </a:solidFill>
+                  </a:rPr>
+                  <a:t> 0.999</a:t>
+                </a:r>
+              </a:p>
+            </p:txBody>
+          </p:sp>
+        </mc:Choice>
+        <mc:Fallback>
+          <p:sp>
+            <p:nvSpPr>
+              <p:cNvPr id="7" name="Rectangle 6">
+                <a:extLst>
+                  <a:ext uri="{FF2B5EF4-FFF2-40B4-BE49-F238E27FC236}">
+                    <a16:creationId xmlns:a16="http://schemas.microsoft.com/office/drawing/2014/main" id="{BAB43570-0C37-4C50-A42D-BC2F39AAE8C8}"/>
+                  </a:ext>
+                </a:extLst>
+              </p:cNvPr>
+              <p:cNvSpPr>
+                <a:spLocks noRot="1" noChangeAspect="1" noMove="1" noResize="1" noEditPoints="1" noAdjustHandles="1" noChangeArrowheads="1" noChangeShapeType="1" noTextEdit="1"/>
+              </p:cNvSpPr>
+              <p:nvPr/>
+            </p:nvSpPr>
+            <p:spPr>
+              <a:xfrm>
+                <a:off x="6858000" y="0"/>
+                <a:ext cx="2286000" cy="4463846"/>
+              </a:xfrm>
+              <a:prstGeom prst="rect">
+                <a:avLst/>
+              </a:prstGeom>
+              <a:blipFill>
+                <a:blip r:embed="rId3"/>
+                <a:stretch>
+                  <a:fillRect b="-409"/>
+                </a:stretch>
+              </a:blipFill>
+              <a:ln>
+                <a:solidFill>
+                  <a:schemeClr val="accent1"/>
+                </a:solidFill>
+              </a:ln>
+            </p:spPr>
+            <p:txBody>
+              <a:bodyPr/>
+              <a:lstStyle/>
+              <a:p>
+                <a:r>
+                  <a:rPr lang="en-SG">
+                    <a:noFill/>
+                  </a:rPr>
+                  <a:t> </a:t>
+                </a:r>
+              </a:p>
+            </p:txBody>
+          </p:sp>
+        </mc:Fallback>
+      </mc:AlternateContent>
+      <p:sp>
+        <p:nvSpPr>
+          <p:cNvPr id="8" name="Rectangle 7">
+            <a:extLst>
+              <a:ext uri="{FF2B5EF4-FFF2-40B4-BE49-F238E27FC236}">
+                <a16:creationId xmlns:a16="http://schemas.microsoft.com/office/drawing/2014/main" id="{A8F3493C-F53D-4931-9015-C7FABD918ADF}"/>
+              </a:ext>
+            </a:extLst>
+          </p:cNvPr>
+          <p:cNvSpPr/>
+          <p:nvPr/>
+        </p:nvSpPr>
+        <p:spPr>
+          <a:xfrm>
+            <a:off x="2286000" y="-1"/>
+            <a:ext cx="2286000" cy="2818786"/>
+          </a:xfrm>
+          <a:prstGeom prst="rect">
+            <a:avLst/>
+          </a:prstGeom>
+          <a:solidFill>
+            <a:srgbClr val="001746"/>
+          </a:solidFill>
+          <a:ln>
+            <a:solidFill>
+              <a:schemeClr val="accent1"/>
+            </a:solidFill>
+          </a:ln>
+        </p:spPr>
+        <p:style>
+          <a:lnRef idx="2">
+            <a:schemeClr val="accent1">
+              <a:shade val="50000"/>
+            </a:schemeClr>
+          </a:lnRef>
+          <a:fillRef idx="1">
+            <a:schemeClr val="accent1"/>
+          </a:fillRef>
+          <a:effectRef idx="0">
+            <a:schemeClr val="accent1"/>
+          </a:effectRef>
+          <a:fontRef idx="minor">
+            <a:schemeClr val="lt1"/>
+          </a:fontRef>
+        </p:style>
+        <p:txBody>
+          <a:bodyPr rtlCol="0" anchor="t"/>
+          <a:lstStyle/>
+          <a:p>
+            <a:r>
+              <a:rPr lang="en-US" sz="1000" b="1" dirty="0">
+                <a:solidFill>
+                  <a:schemeClr val="accent2"/>
+                </a:solidFill>
+              </a:rPr>
+              <a:t>Activation Functions</a:t>
+            </a:r>
+            <a:endParaRPr lang="en-SG" sz="1000" b="1" dirty="0">
+              <a:solidFill>
+                <a:schemeClr val="accent2"/>
+              </a:solidFill>
+            </a:endParaRPr>
+          </a:p>
+          <a:p>
+            <a:pPr marL="88488" indent="-88488">
+              <a:buFont typeface="Arial" panose="020B0604020202020204" pitchFamily="34" charset="0"/>
+              <a:buChar char="•"/>
+            </a:pPr>
+            <a:r>
+              <a:rPr lang="en-US" sz="1000" b="1" dirty="0">
+                <a:solidFill>
+                  <a:schemeClr val="accent2">
+                    <a:lumMod val="50000"/>
+                  </a:schemeClr>
+                </a:solidFill>
+                <a:highlight>
+                  <a:srgbClr val="FFFF00"/>
+                </a:highlight>
+              </a:rPr>
+              <a:t>ReLU</a:t>
+            </a:r>
+            <a:r>
+              <a:rPr lang="en-US" sz="1000" dirty="0">
+                <a:solidFill>
+                  <a:schemeClr val="accent2"/>
+                </a:solidFill>
+              </a:rPr>
+              <a:t> </a:t>
+            </a:r>
+            <a:r>
+              <a:rPr lang="en-US" sz="1000" dirty="0"/>
+              <a:t> (asymmetric)</a:t>
+            </a:r>
+            <a:endParaRPr lang="en-US" sz="1000" dirty="0">
+              <a:solidFill>
+                <a:schemeClr val="accent2"/>
+              </a:solidFill>
+            </a:endParaRPr>
+          </a:p>
+          <a:p>
+            <a:pPr marL="265462" lvl="1" indent="-176974">
+              <a:buFont typeface="Courier New" panose="02070309020205020404" pitchFamily="49" charset="0"/>
+              <a:buChar char="-"/>
+            </a:pPr>
+            <a:r>
+              <a:rPr lang="en-US" sz="1000" dirty="0"/>
+              <a:t>Not differentiable; do sub-gradient</a:t>
+            </a:r>
+          </a:p>
+          <a:p>
+            <a:pPr marL="265462" lvl="1" indent="-176974">
+              <a:buFont typeface="Courier New" panose="02070309020205020404" pitchFamily="49" charset="0"/>
+              <a:buChar char="-"/>
+            </a:pPr>
+            <a:r>
+              <a:rPr lang="en-US" sz="1000" dirty="0"/>
+              <a:t>Computational efficient</a:t>
+            </a:r>
+          </a:p>
+          <a:p>
+            <a:pPr marL="265462" lvl="1" indent="-176974">
+              <a:buFont typeface="Courier New" panose="02070309020205020404" pitchFamily="49" charset="0"/>
+              <a:buChar char="-"/>
+            </a:pPr>
+            <a:r>
+              <a:rPr lang="en-US" sz="1000" dirty="0"/>
+              <a:t>Sparsity can reduce overfitting</a:t>
+            </a:r>
+          </a:p>
+          <a:p>
+            <a:pPr marL="265462" lvl="1" indent="-176974">
+              <a:buFont typeface="Courier New" panose="02070309020205020404" pitchFamily="49" charset="0"/>
+              <a:buChar char="-"/>
+            </a:pPr>
+            <a:r>
+              <a:rPr lang="en-US" sz="1000" dirty="0"/>
+              <a:t>Uncapped – likely to explode</a:t>
+            </a:r>
+          </a:p>
+          <a:p>
+            <a:pPr marL="265462" lvl="1" indent="-176974">
+              <a:buFont typeface="Courier New" panose="02070309020205020404" pitchFamily="49" charset="0"/>
+              <a:buChar char="-"/>
+            </a:pPr>
+            <a:r>
+              <a:rPr lang="en-US" sz="1000" dirty="0"/>
+              <a:t>Dying ReLU: once 0 always 0</a:t>
+            </a:r>
+          </a:p>
+          <a:p>
+            <a:pPr marL="88488" indent="-88488">
+              <a:buFont typeface="Arial" panose="020B0604020202020204" pitchFamily="34" charset="0"/>
+              <a:buChar char="•"/>
+            </a:pPr>
+            <a:r>
+              <a:rPr lang="en-US" sz="1000" dirty="0">
+                <a:solidFill>
+                  <a:schemeClr val="accent2"/>
+                </a:solidFill>
+              </a:rPr>
+              <a:t>Leaky ReLU</a:t>
+            </a:r>
+            <a:r>
+              <a:rPr lang="en-US" sz="1000" dirty="0"/>
+              <a:t> (asymmetric)</a:t>
+            </a:r>
+            <a:endParaRPr lang="en-US" sz="1000" dirty="0">
+              <a:solidFill>
+                <a:schemeClr val="accent2"/>
+              </a:solidFill>
+            </a:endParaRPr>
+          </a:p>
+          <a:p>
+            <a:pPr marL="265462" lvl="1" indent="-176974">
+              <a:buFont typeface="Courier New" panose="02070309020205020404" pitchFamily="49" charset="0"/>
+              <a:buChar char="-"/>
+            </a:pPr>
+            <a:r>
+              <a:rPr lang="en-US" sz="1000" dirty="0"/>
+              <a:t>Slope for negative to prevent dying</a:t>
+            </a:r>
+          </a:p>
+          <a:p>
+            <a:pPr marL="88488" indent="-88488">
+              <a:buFont typeface="Arial" panose="020B0604020202020204" pitchFamily="34" charset="0"/>
+              <a:buChar char="•"/>
+            </a:pPr>
+            <a:r>
+              <a:rPr lang="en-US" sz="1000" dirty="0">
+                <a:solidFill>
+                  <a:schemeClr val="accent2"/>
+                </a:solidFill>
+              </a:rPr>
+              <a:t>Sigmoid</a:t>
+            </a:r>
+            <a:r>
+              <a:rPr lang="en-US" sz="1000" dirty="0">
+                <a:solidFill>
+                  <a:schemeClr val="bg1"/>
+                </a:solidFill>
+              </a:rPr>
+              <a:t> </a:t>
+            </a:r>
+            <a:r>
+              <a:rPr lang="en-US" sz="1000" dirty="0"/>
+              <a:t>(symmetric)</a:t>
+            </a:r>
+            <a:endParaRPr lang="en-US" sz="1000" dirty="0">
+              <a:solidFill>
+                <a:schemeClr val="bg1"/>
+              </a:solidFill>
+            </a:endParaRPr>
+          </a:p>
+          <a:p>
+            <a:pPr marL="265462" lvl="1" indent="-176974">
+              <a:buFont typeface="Courier New" panose="02070309020205020404" pitchFamily="49" charset="0"/>
+              <a:buChar char="-"/>
+            </a:pPr>
+            <a:r>
+              <a:rPr lang="en-US" sz="1000" dirty="0"/>
+              <a:t>Output 0 to 1</a:t>
+            </a:r>
+          </a:p>
+          <a:p>
+            <a:pPr marL="265462" lvl="1" indent="-176974">
+              <a:buFont typeface="Courier New" panose="02070309020205020404" pitchFamily="49" charset="0"/>
+              <a:buChar char="-"/>
+            </a:pPr>
+            <a:r>
+              <a:rPr lang="en-US" sz="1000" dirty="0"/>
+              <a:t>Capped – reduce explode chance</a:t>
+            </a:r>
+          </a:p>
+          <a:p>
+            <a:pPr marL="88488" indent="-88488">
+              <a:buFont typeface="Arial" panose="020B0604020202020204" pitchFamily="34" charset="0"/>
+              <a:buChar char="•"/>
+            </a:pPr>
+            <a:r>
+              <a:rPr lang="en-US" sz="1000" dirty="0">
+                <a:solidFill>
+                  <a:schemeClr val="accent2"/>
+                </a:solidFill>
+              </a:rPr>
+              <a:t>Tanh</a:t>
+            </a:r>
+            <a:r>
+              <a:rPr lang="en-US" sz="1000" dirty="0">
+                <a:solidFill>
+                  <a:schemeClr val="bg1"/>
+                </a:solidFill>
+              </a:rPr>
+              <a:t> </a:t>
+            </a:r>
+            <a:r>
+              <a:rPr lang="en-US" sz="1000" dirty="0"/>
+              <a:t>(symmetric)</a:t>
+            </a:r>
+            <a:endParaRPr lang="en-US" sz="1000" dirty="0">
+              <a:solidFill>
+                <a:schemeClr val="bg1"/>
+              </a:solidFill>
+            </a:endParaRPr>
+          </a:p>
+          <a:p>
+            <a:pPr marL="265462" lvl="1" indent="-176974">
+              <a:buFont typeface="Courier New" panose="02070309020205020404" pitchFamily="49" charset="0"/>
+              <a:buChar char="-"/>
+            </a:pPr>
+            <a:r>
+              <a:rPr lang="en-US" sz="1000" dirty="0"/>
+              <a:t>Output -1 to 1</a:t>
+            </a:r>
+          </a:p>
+          <a:p>
+            <a:pPr marL="88488" indent="-88488">
+              <a:buFont typeface="Arial" panose="020B0604020202020204" pitchFamily="34" charset="0"/>
+              <a:buChar char="•"/>
+            </a:pPr>
+            <a:r>
+              <a:rPr lang="en-US" sz="1000" dirty="0">
+                <a:solidFill>
+                  <a:schemeClr val="accent2"/>
+                </a:solidFill>
+              </a:rPr>
+              <a:t>Output Nodes</a:t>
+            </a:r>
+          </a:p>
+          <a:p>
+            <a:pPr marL="265462" lvl="1" indent="-176974">
+              <a:buFont typeface="Courier New" panose="02070309020205020404" pitchFamily="49" charset="0"/>
+              <a:buChar char="-"/>
+            </a:pPr>
+            <a:r>
+              <a:rPr lang="en-US" sz="1000" dirty="0"/>
+              <a:t>Sigmoid: binary classification</a:t>
+            </a:r>
+          </a:p>
+          <a:p>
+            <a:pPr marL="265462" lvl="1" indent="-176974">
+              <a:buFont typeface="Courier New" panose="02070309020205020404" pitchFamily="49" charset="0"/>
+              <a:buChar char="-"/>
+            </a:pPr>
+            <a:r>
+              <a:rPr lang="en-US" sz="1000" dirty="0"/>
+              <a:t>Softmax: multi-class classification</a:t>
+            </a:r>
+          </a:p>
+          <a:p>
+            <a:pPr marL="265462" lvl="1" indent="-176974">
+              <a:buFont typeface="Courier New" panose="02070309020205020404" pitchFamily="49" charset="0"/>
+              <a:buChar char="-"/>
+            </a:pPr>
+            <a:r>
+              <a:rPr lang="en-US" sz="1000" dirty="0"/>
+              <a:t>Linear: regression</a:t>
+            </a:r>
+            <a:endParaRPr lang="en-US" sz="1000" dirty="0">
+              <a:solidFill>
+                <a:schemeClr val="accent2"/>
+              </a:solidFill>
+            </a:endParaRPr>
+          </a:p>
+        </p:txBody>
+      </p:sp>
+      <mc:AlternateContent xmlns:mc="http://schemas.openxmlformats.org/markup-compatibility/2006">
+        <mc:Choice xmlns:a14="http://schemas.microsoft.com/office/drawing/2010/main" Requires="a14">
+          <p:sp>
+            <p:nvSpPr>
+              <p:cNvPr id="9" name="Rectangle 8">
+                <a:extLst>
+                  <a:ext uri="{FF2B5EF4-FFF2-40B4-BE49-F238E27FC236}">
+                    <a16:creationId xmlns:a16="http://schemas.microsoft.com/office/drawing/2014/main" id="{97E6A1E8-D388-4827-A28F-7773FF0CC1F8}"/>
+                  </a:ext>
+                </a:extLst>
+              </p:cNvPr>
+              <p:cNvSpPr/>
+              <p:nvPr/>
+            </p:nvSpPr>
+            <p:spPr>
+              <a:xfrm>
+                <a:off x="2286000" y="2818785"/>
+                <a:ext cx="2286000" cy="2076451"/>
+              </a:xfrm>
+              <a:prstGeom prst="rect">
+                <a:avLst/>
+              </a:prstGeom>
+              <a:solidFill>
+                <a:srgbClr val="001746"/>
+              </a:solidFill>
+              <a:ln>
+                <a:solidFill>
+                  <a:schemeClr val="accent1"/>
+                </a:solidFill>
+              </a:ln>
+            </p:spPr>
+            <p:style>
+              <a:lnRef idx="2">
+                <a:schemeClr val="accent1">
+                  <a:shade val="50000"/>
+                </a:schemeClr>
+              </a:lnRef>
+              <a:fillRef idx="1">
+                <a:schemeClr val="accent1"/>
+              </a:fillRef>
+              <a:effectRef idx="0">
+                <a:schemeClr val="accent1"/>
+              </a:effectRef>
+              <a:fontRef idx="minor">
+                <a:schemeClr val="lt1"/>
+              </a:fontRef>
+            </p:style>
+            <p:txBody>
+              <a:bodyPr rtlCol="0" anchor="t"/>
+              <a:lstStyle/>
+              <a:p>
+                <a:r>
+                  <a:rPr lang="en-US" sz="1000" b="1" dirty="0">
+                    <a:solidFill>
+                      <a:schemeClr val="accent2">
+                        <a:lumMod val="50000"/>
+                      </a:schemeClr>
+                    </a:solidFill>
+                    <a:highlight>
+                      <a:srgbClr val="FFFF00"/>
+                    </a:highlight>
+                  </a:rPr>
+                  <a:t>Initialization</a:t>
+                </a:r>
+                <a:endParaRPr lang="en-SG" sz="1000" b="1" dirty="0">
+                  <a:solidFill>
+                    <a:schemeClr val="accent2">
+                      <a:lumMod val="50000"/>
+                    </a:schemeClr>
+                  </a:solidFill>
+                  <a:highlight>
+                    <a:srgbClr val="FFFF00"/>
+                  </a:highlight>
+                </a:endParaRPr>
+              </a:p>
+              <a:p>
+                <a:pPr marL="88488" indent="-88488">
+                  <a:buFont typeface="Arial" panose="020B0604020202020204" pitchFamily="34" charset="0"/>
+                  <a:buChar char="•"/>
+                </a:pPr>
+                <a:r>
+                  <a:rPr lang="en-US" sz="1000" b="1" dirty="0">
+                    <a:solidFill>
+                      <a:schemeClr val="accent2"/>
+                    </a:solidFill>
+                  </a:rPr>
+                  <a:t>Xavier (</a:t>
+                </a:r>
+                <a:r>
+                  <a:rPr lang="en-US" sz="1000" b="1" dirty="0" err="1">
+                    <a:solidFill>
+                      <a:schemeClr val="accent2"/>
+                    </a:solidFill>
+                  </a:rPr>
+                  <a:t>Glorot</a:t>
+                </a:r>
+                <a:r>
+                  <a:rPr lang="en-US" sz="1000" b="1" dirty="0">
+                    <a:solidFill>
+                      <a:schemeClr val="accent2"/>
+                    </a:solidFill>
+                  </a:rPr>
+                  <a:t>) </a:t>
+                </a:r>
+                <a:r>
+                  <a:rPr lang="en-US" sz="1000" dirty="0">
+                    <a:solidFill>
+                      <a:schemeClr val="bg1"/>
+                    </a:solidFill>
+                  </a:rPr>
+                  <a:t>= </a:t>
+                </a:r>
+                <a14:m>
+                  <m:oMath xmlns:m="http://schemas.openxmlformats.org/officeDocument/2006/math">
+                    <m:r>
+                      <a:rPr lang="en-US" sz="1000" b="0" i="1" smtClean="0">
+                        <a:solidFill>
+                          <a:schemeClr val="bg1"/>
+                        </a:solidFill>
+                        <a:latin typeface="Cambria Math" panose="02040503050406030204" pitchFamily="18" charset="0"/>
+                      </a:rPr>
+                      <m:t>𝑁</m:t>
+                    </m:r>
+                    <m:r>
+                      <a:rPr lang="en-US" sz="1000" b="0" i="1" smtClean="0">
+                        <a:solidFill>
+                          <a:schemeClr val="bg1"/>
+                        </a:solidFill>
+                        <a:latin typeface="Cambria Math" panose="02040503050406030204" pitchFamily="18" charset="0"/>
+                      </a:rPr>
+                      <m:t>(0, </m:t>
+                    </m:r>
+                    <m:rad>
+                      <m:radPr>
+                        <m:degHide m:val="on"/>
+                        <m:ctrlPr>
+                          <a:rPr lang="en-US" sz="1000" b="0" i="1" smtClean="0">
+                            <a:solidFill>
+                              <a:schemeClr val="bg1"/>
+                            </a:solidFill>
+                            <a:latin typeface="Cambria Math" panose="02040503050406030204" pitchFamily="18" charset="0"/>
+                          </a:rPr>
+                        </m:ctrlPr>
+                      </m:radPr>
+                      <m:deg/>
+                      <m:e>
+                        <m:f>
+                          <m:fPr>
+                            <m:ctrlPr>
+                              <a:rPr lang="en-US" sz="1000" b="0" i="1" smtClean="0">
+                                <a:solidFill>
+                                  <a:schemeClr val="bg1"/>
+                                </a:solidFill>
+                                <a:latin typeface="Cambria Math" panose="02040503050406030204" pitchFamily="18" charset="0"/>
+                              </a:rPr>
+                            </m:ctrlPr>
+                          </m:fPr>
+                          <m:num>
+                            <m:r>
+                              <a:rPr lang="en-US" sz="1000" b="0" i="1" smtClean="0">
+                                <a:solidFill>
+                                  <a:schemeClr val="bg1"/>
+                                </a:solidFill>
+                                <a:latin typeface="Cambria Math" panose="02040503050406030204" pitchFamily="18" charset="0"/>
+                              </a:rPr>
+                              <m:t>2</m:t>
+                            </m:r>
+                          </m:num>
+                          <m:den>
+                            <m:sSub>
+                              <m:sSubPr>
+                                <m:ctrlPr>
+                                  <a:rPr lang="en-US" sz="1000" b="0" i="1" smtClean="0">
+                                    <a:solidFill>
+                                      <a:schemeClr val="bg1"/>
+                                    </a:solidFill>
+                                    <a:latin typeface="Cambria Math" panose="02040503050406030204" pitchFamily="18" charset="0"/>
+                                  </a:rPr>
+                                </m:ctrlPr>
+                              </m:sSubPr>
+                              <m:e>
+                                <m:r>
+                                  <a:rPr lang="en-US" sz="1000" b="0" i="1" smtClean="0">
+                                    <a:solidFill>
+                                      <a:schemeClr val="bg1"/>
+                                    </a:solidFill>
+                                    <a:latin typeface="Cambria Math" panose="02040503050406030204" pitchFamily="18" charset="0"/>
+                                  </a:rPr>
+                                  <m:t>𝑓</m:t>
+                                </m:r>
+                              </m:e>
+                              <m:sub>
+                                <m:r>
+                                  <a:rPr lang="en-US" sz="1000" b="0" i="1" smtClean="0">
+                                    <a:solidFill>
+                                      <a:schemeClr val="bg1"/>
+                                    </a:solidFill>
+                                    <a:latin typeface="Cambria Math" panose="02040503050406030204" pitchFamily="18" charset="0"/>
+                                  </a:rPr>
+                                  <m:t>𝑖</m:t>
+                                </m:r>
+                              </m:sub>
+                            </m:sSub>
+                            <m:r>
+                              <a:rPr lang="en-US" sz="1000" b="0" i="1" smtClean="0">
+                                <a:solidFill>
+                                  <a:schemeClr val="bg1"/>
+                                </a:solidFill>
+                                <a:latin typeface="Cambria Math" panose="02040503050406030204" pitchFamily="18" charset="0"/>
+                              </a:rPr>
+                              <m:t>+</m:t>
+                            </m:r>
+                            <m:sSub>
+                              <m:sSubPr>
+                                <m:ctrlPr>
+                                  <a:rPr lang="en-US" sz="1000" b="0" i="1" smtClean="0">
+                                    <a:solidFill>
+                                      <a:schemeClr val="bg1"/>
+                                    </a:solidFill>
+                                    <a:latin typeface="Cambria Math" panose="02040503050406030204" pitchFamily="18" charset="0"/>
+                                  </a:rPr>
+                                </m:ctrlPr>
+                              </m:sSubPr>
+                              <m:e>
+                                <m:r>
+                                  <a:rPr lang="en-US" sz="1000" b="0" i="1" smtClean="0">
+                                    <a:solidFill>
+                                      <a:schemeClr val="bg1"/>
+                                    </a:solidFill>
+                                    <a:latin typeface="Cambria Math" panose="02040503050406030204" pitchFamily="18" charset="0"/>
+                                  </a:rPr>
+                                  <m:t>𝑓</m:t>
+                                </m:r>
+                              </m:e>
+                              <m:sub>
+                                <m:r>
+                                  <a:rPr lang="en-US" sz="1000" b="0" i="1" smtClean="0">
+                                    <a:solidFill>
+                                      <a:schemeClr val="bg1"/>
+                                    </a:solidFill>
+                                    <a:latin typeface="Cambria Math" panose="02040503050406030204" pitchFamily="18" charset="0"/>
+                                  </a:rPr>
+                                  <m:t>𝑜</m:t>
+                                </m:r>
+                              </m:sub>
+                            </m:sSub>
+                          </m:den>
+                        </m:f>
+                      </m:e>
+                    </m:rad>
+                  </m:oMath>
+                </a14:m>
+                <a:r>
+                  <a:rPr lang="en-US" sz="1000" dirty="0">
+                    <a:solidFill>
+                      <a:schemeClr val="bg1"/>
+                    </a:solidFill>
+                  </a:rPr>
+                  <a:t>)</a:t>
+                </a:r>
+              </a:p>
+              <a:p>
+                <a:pPr marL="265462" lvl="1" indent="-176974">
+                  <a:buFont typeface="Courier New" panose="02070309020205020404" pitchFamily="49" charset="0"/>
+                  <a:buChar char="-"/>
+                </a:pPr>
+                <a:r>
+                  <a:rPr lang="en-US" sz="1000" dirty="0"/>
+                  <a:t>For </a:t>
+                </a:r>
+                <a:r>
+                  <a:rPr lang="en-US" sz="1000" dirty="0">
+                    <a:solidFill>
+                      <a:schemeClr val="accent2"/>
+                    </a:solidFill>
+                  </a:rPr>
+                  <a:t>symmetric</a:t>
+                </a:r>
+                <a:r>
+                  <a:rPr lang="en-US" sz="1000" dirty="0"/>
+                  <a:t> activation function</a:t>
+                </a:r>
+              </a:p>
+              <a:p>
+                <a:pPr marL="265462" lvl="1" indent="-176974">
+                  <a:buFont typeface="Courier New" panose="02070309020205020404" pitchFamily="49" charset="0"/>
+                  <a:buChar char="-"/>
+                </a:pPr>
+                <a14:m>
+                  <m:oMath xmlns:m="http://schemas.openxmlformats.org/officeDocument/2006/math">
+                    <m:sSub>
+                      <m:sSubPr>
+                        <m:ctrlPr>
+                          <a:rPr lang="en-US" sz="1000" b="0" i="1" smtClean="0">
+                            <a:latin typeface="Cambria Math" panose="02040503050406030204" pitchFamily="18" charset="0"/>
+                          </a:rPr>
+                        </m:ctrlPr>
+                      </m:sSubPr>
+                      <m:e>
+                        <m:r>
+                          <a:rPr lang="en-US" sz="1000" b="0" i="1" smtClean="0">
+                            <a:latin typeface="Cambria Math" panose="02040503050406030204" pitchFamily="18" charset="0"/>
+                          </a:rPr>
+                          <m:t>𝑓</m:t>
+                        </m:r>
+                      </m:e>
+                      <m:sub>
+                        <m:r>
+                          <a:rPr lang="en-US" sz="1000" b="0" i="1" smtClean="0">
+                            <a:latin typeface="Cambria Math" panose="02040503050406030204" pitchFamily="18" charset="0"/>
+                          </a:rPr>
+                          <m:t>𝑖</m:t>
+                        </m:r>
+                      </m:sub>
+                    </m:sSub>
+                  </m:oMath>
+                </a14:m>
+                <a:r>
+                  <a:rPr lang="en-US" sz="1000" dirty="0"/>
+                  <a:t> , </a:t>
+                </a:r>
+                <a14:m>
+                  <m:oMath xmlns:m="http://schemas.openxmlformats.org/officeDocument/2006/math">
+                    <m:sSub>
+                      <m:sSubPr>
+                        <m:ctrlPr>
+                          <a:rPr lang="en-US" sz="1000" b="0" i="1" smtClean="0">
+                            <a:latin typeface="Cambria Math" panose="02040503050406030204" pitchFamily="18" charset="0"/>
+                          </a:rPr>
+                        </m:ctrlPr>
+                      </m:sSubPr>
+                      <m:e>
+                        <m:r>
+                          <a:rPr lang="en-US" sz="1000" b="0" i="1" smtClean="0">
+                            <a:latin typeface="Cambria Math" panose="02040503050406030204" pitchFamily="18" charset="0"/>
+                          </a:rPr>
+                          <m:t>𝑓</m:t>
+                        </m:r>
+                      </m:e>
+                      <m:sub>
+                        <m:r>
+                          <a:rPr lang="en-US" sz="1000" b="0" i="1" smtClean="0">
+                            <a:latin typeface="Cambria Math" panose="02040503050406030204" pitchFamily="18" charset="0"/>
+                          </a:rPr>
+                          <m:t>𝑜</m:t>
+                        </m:r>
+                      </m:sub>
+                    </m:sSub>
+                  </m:oMath>
+                </a14:m>
+                <a:r>
+                  <a:rPr lang="en-US" sz="1000" dirty="0"/>
+                  <a:t>: # inputs / outputs to a layer</a:t>
+                </a:r>
+              </a:p>
+              <a:p>
+                <a:pPr marL="265462" lvl="1" indent="-176974">
+                  <a:buFont typeface="Courier New" panose="02070309020205020404" pitchFamily="49" charset="0"/>
+                  <a:buChar char="-"/>
+                </a:pPr>
+                <a:r>
+                  <a:rPr lang="en-US" sz="1000" dirty="0"/>
+                  <a:t>Shrink the std to reduce chance of vanishing / exploding gradient</a:t>
+                </a:r>
+              </a:p>
+              <a:p>
+                <a:pPr marL="88488" indent="-88488">
+                  <a:buFont typeface="Arial" panose="020B0604020202020204" pitchFamily="34" charset="0"/>
+                  <a:buChar char="•"/>
+                </a:pPr>
+                <a:r>
+                  <a:rPr lang="en-US" sz="1000" b="1" dirty="0" err="1">
+                    <a:solidFill>
+                      <a:schemeClr val="accent2"/>
+                    </a:solidFill>
+                  </a:rPr>
+                  <a:t>Kaiming</a:t>
+                </a:r>
+                <a:r>
+                  <a:rPr lang="en-US" sz="1000" dirty="0">
+                    <a:solidFill>
+                      <a:schemeClr val="accent2"/>
+                    </a:solidFill>
+                  </a:rPr>
+                  <a:t> </a:t>
+                </a:r>
+                <a:r>
+                  <a:rPr lang="en-US" sz="1000" dirty="0">
+                    <a:solidFill>
+                      <a:schemeClr val="bg1"/>
+                    </a:solidFill>
+                  </a:rPr>
+                  <a:t>= </a:t>
+                </a:r>
+                <a14:m>
+                  <m:oMath xmlns:m="http://schemas.openxmlformats.org/officeDocument/2006/math">
+                    <m:r>
+                      <a:rPr lang="en-US" sz="1000" b="0" i="1" smtClean="0">
+                        <a:solidFill>
+                          <a:schemeClr val="bg1"/>
+                        </a:solidFill>
+                        <a:latin typeface="Cambria Math" panose="02040503050406030204" pitchFamily="18" charset="0"/>
+                      </a:rPr>
+                      <m:t>𝑁</m:t>
+                    </m:r>
+                    <m:r>
+                      <a:rPr lang="en-US" sz="1000" b="0" i="1" smtClean="0">
+                        <a:solidFill>
+                          <a:schemeClr val="bg1"/>
+                        </a:solidFill>
+                        <a:latin typeface="Cambria Math" panose="02040503050406030204" pitchFamily="18" charset="0"/>
+                      </a:rPr>
+                      <m:t>(0, </m:t>
+                    </m:r>
+                    <m:rad>
+                      <m:radPr>
+                        <m:degHide m:val="on"/>
+                        <m:ctrlPr>
+                          <a:rPr lang="en-US" sz="1000" b="0" i="1" smtClean="0">
+                            <a:solidFill>
+                              <a:schemeClr val="bg1"/>
+                            </a:solidFill>
+                            <a:latin typeface="Cambria Math" panose="02040503050406030204" pitchFamily="18" charset="0"/>
+                          </a:rPr>
+                        </m:ctrlPr>
+                      </m:radPr>
+                      <m:deg/>
+                      <m:e>
+                        <m:f>
+                          <m:fPr>
+                            <m:ctrlPr>
+                              <a:rPr lang="en-US" sz="1000" b="0" i="1" smtClean="0">
+                                <a:solidFill>
+                                  <a:schemeClr val="bg1"/>
+                                </a:solidFill>
+                                <a:latin typeface="Cambria Math" panose="02040503050406030204" pitchFamily="18" charset="0"/>
+                              </a:rPr>
+                            </m:ctrlPr>
+                          </m:fPr>
+                          <m:num>
+                            <m:r>
+                              <a:rPr lang="en-US" sz="1000" b="0" i="1" smtClean="0">
+                                <a:solidFill>
+                                  <a:schemeClr val="bg1"/>
+                                </a:solidFill>
+                                <a:latin typeface="Cambria Math" panose="02040503050406030204" pitchFamily="18" charset="0"/>
+                              </a:rPr>
+                              <m:t>2</m:t>
+                            </m:r>
+                          </m:num>
+                          <m:den>
+                            <m:sSub>
+                              <m:sSubPr>
+                                <m:ctrlPr>
+                                  <a:rPr lang="en-US" sz="1000" b="0" i="1" smtClean="0">
+                                    <a:solidFill>
+                                      <a:schemeClr val="bg1"/>
+                                    </a:solidFill>
+                                    <a:latin typeface="Cambria Math" panose="02040503050406030204" pitchFamily="18" charset="0"/>
+                                  </a:rPr>
+                                </m:ctrlPr>
+                              </m:sSubPr>
+                              <m:e>
+                                <m:r>
+                                  <a:rPr lang="en-US" sz="1000" b="0" i="1" smtClean="0">
+                                    <a:solidFill>
+                                      <a:schemeClr val="bg1"/>
+                                    </a:solidFill>
+                                    <a:latin typeface="Cambria Math" panose="02040503050406030204" pitchFamily="18" charset="0"/>
+                                  </a:rPr>
+                                  <m:t>𝑓</m:t>
+                                </m:r>
+                              </m:e>
+                              <m:sub>
+                                <m:r>
+                                  <a:rPr lang="en-US" sz="1000" b="0" i="1" smtClean="0">
+                                    <a:solidFill>
+                                      <a:schemeClr val="bg1"/>
+                                    </a:solidFill>
+                                    <a:latin typeface="Cambria Math" panose="02040503050406030204" pitchFamily="18" charset="0"/>
+                                  </a:rPr>
+                                  <m:t>𝑖</m:t>
+                                </m:r>
+                              </m:sub>
+                            </m:sSub>
+                          </m:den>
+                        </m:f>
+                      </m:e>
+                    </m:rad>
+                    <m:r>
+                      <a:rPr lang="en-US" sz="1000" b="0" i="1" smtClean="0">
+                        <a:solidFill>
+                          <a:schemeClr val="bg1"/>
+                        </a:solidFill>
+                        <a:latin typeface="Cambria Math" panose="02040503050406030204" pitchFamily="18" charset="0"/>
+                      </a:rPr>
+                      <m:t>)</m:t>
+                    </m:r>
+                  </m:oMath>
+                </a14:m>
+                <a:endParaRPr lang="en-US" sz="1000" dirty="0">
+                  <a:solidFill>
+                    <a:schemeClr val="accent2"/>
+                  </a:solidFill>
+                </a:endParaRPr>
+              </a:p>
+              <a:p>
+                <a:pPr marL="265462" lvl="1" indent="-176974">
+                  <a:buFont typeface="Courier New" panose="02070309020205020404" pitchFamily="49" charset="0"/>
+                  <a:buChar char="-"/>
+                </a:pPr>
+                <a:r>
+                  <a:rPr lang="en-US" sz="1000" dirty="0"/>
+                  <a:t>For </a:t>
+                </a:r>
+                <a:r>
+                  <a:rPr lang="en-US" sz="1000" dirty="0">
+                    <a:solidFill>
+                      <a:schemeClr val="accent2"/>
+                    </a:solidFill>
+                  </a:rPr>
+                  <a:t>asymmetric</a:t>
+                </a:r>
+                <a:r>
+                  <a:rPr lang="en-US" sz="1000" dirty="0"/>
+                  <a:t> activation function</a:t>
+                </a:r>
+              </a:p>
+              <a:p>
+                <a:pPr marL="88488" indent="-88488">
+                  <a:buFont typeface="Arial" panose="020B0604020202020204" pitchFamily="34" charset="0"/>
+                  <a:buChar char="•"/>
+                </a:pPr>
+                <a:r>
+                  <a:rPr lang="en-US" sz="1000" b="1" dirty="0">
+                    <a:solidFill>
+                      <a:schemeClr val="accent2"/>
+                    </a:solidFill>
+                  </a:rPr>
+                  <a:t>Feature Scaling</a:t>
+                </a:r>
+              </a:p>
+              <a:p>
+                <a:pPr marL="265462" lvl="1" indent="-176974">
+                  <a:buFont typeface="Courier New" panose="02070309020205020404" pitchFamily="49" charset="0"/>
+                  <a:buChar char="-"/>
+                </a:pPr>
+                <a:r>
+                  <a:rPr lang="en-US" sz="1000" dirty="0"/>
+                  <a:t>Reduce vanishing / exploding</a:t>
+                </a:r>
+              </a:p>
+              <a:p>
+                <a:pPr marL="265462" lvl="1" indent="-176974">
+                  <a:buFont typeface="Courier New" panose="02070309020205020404" pitchFamily="49" charset="0"/>
+                  <a:buChar char="-"/>
+                </a:pPr>
+                <a:r>
+                  <a:rPr lang="en-US" sz="1000" dirty="0"/>
+                  <a:t>Improve converging rate</a:t>
+                </a:r>
+                <a:endParaRPr lang="en-US" sz="1000" dirty="0">
+                  <a:solidFill>
+                    <a:schemeClr val="accent2"/>
+                  </a:solidFill>
+                </a:endParaRPr>
+              </a:p>
+            </p:txBody>
+          </p:sp>
+        </mc:Choice>
+        <mc:Fallback>
+          <p:sp>
+            <p:nvSpPr>
+              <p:cNvPr id="9" name="Rectangle 8">
+                <a:extLst>
+                  <a:ext uri="{FF2B5EF4-FFF2-40B4-BE49-F238E27FC236}">
+                    <a16:creationId xmlns:a16="http://schemas.microsoft.com/office/drawing/2014/main" id="{97E6A1E8-D388-4827-A28F-7773FF0CC1F8}"/>
+                  </a:ext>
+                </a:extLst>
+              </p:cNvPr>
+              <p:cNvSpPr>
+                <a:spLocks noRot="1" noChangeAspect="1" noMove="1" noResize="1" noEditPoints="1" noAdjustHandles="1" noChangeArrowheads="1" noChangeShapeType="1" noTextEdit="1"/>
+              </p:cNvSpPr>
+              <p:nvPr/>
+            </p:nvSpPr>
+            <p:spPr>
+              <a:xfrm>
+                <a:off x="2286000" y="2818785"/>
+                <a:ext cx="2286000" cy="2076451"/>
+              </a:xfrm>
+              <a:prstGeom prst="rect">
+                <a:avLst/>
+              </a:prstGeom>
+              <a:blipFill>
+                <a:blip r:embed="rId4"/>
+                <a:stretch>
+                  <a:fillRect b="-1749"/>
+                </a:stretch>
+              </a:blipFill>
+              <a:ln>
+                <a:solidFill>
+                  <a:schemeClr val="accent1"/>
+                </a:solidFill>
+              </a:ln>
+            </p:spPr>
+            <p:txBody>
+              <a:bodyPr/>
+              <a:lstStyle/>
+              <a:p>
+                <a:r>
+                  <a:rPr lang="en-SG">
+                    <a:noFill/>
+                  </a:rPr>
+                  <a:t> </a:t>
+                </a:r>
+              </a:p>
+            </p:txBody>
+          </p:sp>
+        </mc:Fallback>
+      </mc:AlternateContent>
+      <p:sp>
+        <p:nvSpPr>
+          <p:cNvPr id="10" name="Rectangle 9">
+            <a:extLst>
+              <a:ext uri="{FF2B5EF4-FFF2-40B4-BE49-F238E27FC236}">
+                <a16:creationId xmlns:a16="http://schemas.microsoft.com/office/drawing/2014/main" id="{E6857BBC-13F9-4655-968C-A22B39BDC5F8}"/>
+              </a:ext>
+            </a:extLst>
+          </p:cNvPr>
+          <p:cNvSpPr/>
+          <p:nvPr/>
+        </p:nvSpPr>
+        <p:spPr>
+          <a:xfrm>
+            <a:off x="0" y="552450"/>
+            <a:ext cx="2286000" cy="1171575"/>
+          </a:xfrm>
+          <a:prstGeom prst="rect">
+            <a:avLst/>
+          </a:prstGeom>
+          <a:solidFill>
+            <a:srgbClr val="001746"/>
+          </a:solidFill>
+          <a:ln>
+            <a:solidFill>
+              <a:schemeClr val="accent1"/>
+            </a:solidFill>
+          </a:ln>
+        </p:spPr>
+        <p:style>
+          <a:lnRef idx="2">
+            <a:schemeClr val="accent1">
+              <a:shade val="50000"/>
+            </a:schemeClr>
+          </a:lnRef>
+          <a:fillRef idx="1">
+            <a:schemeClr val="accent1"/>
+          </a:fillRef>
+          <a:effectRef idx="0">
+            <a:schemeClr val="accent1"/>
+          </a:effectRef>
+          <a:fontRef idx="minor">
+            <a:schemeClr val="lt1"/>
+          </a:fontRef>
+        </p:style>
+        <p:txBody>
+          <a:bodyPr rtlCol="0" anchor="t"/>
+          <a:lstStyle/>
+          <a:p>
+            <a:r>
+              <a:rPr lang="en-US" sz="1000" b="1" dirty="0">
+                <a:solidFill>
+                  <a:schemeClr val="accent2"/>
+                </a:solidFill>
+              </a:rPr>
+              <a:t>Wide or Deep?</a:t>
+            </a:r>
+            <a:endParaRPr lang="en-SG" sz="1000" b="1" dirty="0">
+              <a:solidFill>
+                <a:schemeClr val="accent2"/>
+              </a:solidFill>
+            </a:endParaRPr>
+          </a:p>
+          <a:p>
+            <a:pPr marL="88488" indent="-88488">
+              <a:buFont typeface="Arial" panose="020B0604020202020204" pitchFamily="34" charset="0"/>
+              <a:buChar char="•"/>
+            </a:pPr>
+            <a:r>
+              <a:rPr lang="en-US" sz="1000" dirty="0">
+                <a:solidFill>
+                  <a:schemeClr val="bg1"/>
+                </a:solidFill>
+              </a:rPr>
+              <a:t>Deep usually needs fewer parameters</a:t>
+            </a:r>
+          </a:p>
+          <a:p>
+            <a:r>
+              <a:rPr lang="en-US" sz="1000" b="1" dirty="0">
+                <a:solidFill>
+                  <a:schemeClr val="accent2"/>
+                </a:solidFill>
+              </a:rPr>
+              <a:t>Start with One Hidden Layer</a:t>
+            </a:r>
+            <a:endParaRPr lang="en-SG" sz="1000" b="1" dirty="0">
+              <a:solidFill>
+                <a:schemeClr val="accent2"/>
+              </a:solidFill>
+            </a:endParaRPr>
+          </a:p>
+          <a:p>
+            <a:pPr marL="88488" indent="-88488">
+              <a:buFont typeface="Arial" panose="020B0604020202020204" pitchFamily="34" charset="0"/>
+              <a:buChar char="•"/>
+            </a:pPr>
+            <a:r>
+              <a:rPr lang="en-US" sz="1000" dirty="0">
+                <a:solidFill>
+                  <a:schemeClr val="bg1"/>
+                </a:solidFill>
+              </a:rPr>
+              <a:t># neurons = (inputs + outputs )/2</a:t>
+            </a:r>
+          </a:p>
+          <a:p>
+            <a:r>
+              <a:rPr lang="en-US" sz="1000" b="1" dirty="0">
+                <a:solidFill>
+                  <a:schemeClr val="accent2"/>
+                </a:solidFill>
+              </a:rPr>
+              <a:t>Start with Multiple Hidden Layers</a:t>
+            </a:r>
+            <a:endParaRPr lang="en-SG" sz="1000" b="1" dirty="0">
+              <a:solidFill>
+                <a:schemeClr val="accent2"/>
+              </a:solidFill>
+            </a:endParaRPr>
+          </a:p>
+          <a:p>
+            <a:pPr marL="88488" indent="-88488">
+              <a:buFont typeface="Arial" panose="020B0604020202020204" pitchFamily="34" charset="0"/>
+              <a:buChar char="•"/>
+            </a:pPr>
+            <a:r>
+              <a:rPr lang="en-US" sz="1000" dirty="0">
+                <a:solidFill>
+                  <a:schemeClr val="bg1"/>
+                </a:solidFill>
+              </a:rPr>
+              <a:t>With more layers, nodes than needed</a:t>
+            </a:r>
+          </a:p>
+          <a:p>
+            <a:pPr marL="88488" indent="-88488">
+              <a:buFont typeface="Arial" panose="020B0604020202020204" pitchFamily="34" charset="0"/>
+              <a:buChar char="•"/>
+            </a:pPr>
+            <a:r>
+              <a:rPr lang="en-US" sz="1000" dirty="0">
+                <a:solidFill>
+                  <a:schemeClr val="bg1"/>
+                </a:solidFill>
+              </a:rPr>
+              <a:t>Then prune the network</a:t>
+            </a:r>
+          </a:p>
+        </p:txBody>
+      </p:sp>
+      <mc:AlternateContent xmlns:mc="http://schemas.openxmlformats.org/markup-compatibility/2006">
+        <mc:Choice xmlns:a14="http://schemas.microsoft.com/office/drawing/2010/main" Requires="a14">
+          <p:sp>
+            <p:nvSpPr>
+              <p:cNvPr id="11" name="Rectangle 10">
+                <a:extLst>
+                  <a:ext uri="{FF2B5EF4-FFF2-40B4-BE49-F238E27FC236}">
+                    <a16:creationId xmlns:a16="http://schemas.microsoft.com/office/drawing/2014/main" id="{C72D3252-8B3D-4195-A247-265887603463}"/>
+                  </a:ext>
+                </a:extLst>
+              </p:cNvPr>
+              <p:cNvSpPr/>
+              <p:nvPr/>
+            </p:nvSpPr>
+            <p:spPr>
+              <a:xfrm>
+                <a:off x="0" y="1724025"/>
+                <a:ext cx="2286000" cy="1330120"/>
+              </a:xfrm>
+              <a:prstGeom prst="rect">
+                <a:avLst/>
+              </a:prstGeom>
+              <a:solidFill>
+                <a:srgbClr val="001746"/>
+              </a:solidFill>
+              <a:ln>
+                <a:solidFill>
+                  <a:schemeClr val="accent1"/>
+                </a:solidFill>
+              </a:ln>
+            </p:spPr>
+            <p:style>
+              <a:lnRef idx="2">
+                <a:schemeClr val="accent1">
+                  <a:shade val="50000"/>
+                </a:schemeClr>
+              </a:lnRef>
+              <a:fillRef idx="1">
+                <a:schemeClr val="accent1"/>
+              </a:fillRef>
+              <a:effectRef idx="0">
+                <a:schemeClr val="accent1"/>
+              </a:effectRef>
+              <a:fontRef idx="minor">
+                <a:schemeClr val="lt1"/>
+              </a:fontRef>
+            </p:style>
+            <p:txBody>
+              <a:bodyPr rtlCol="0" anchor="t"/>
+              <a:lstStyle/>
+              <a:p>
+                <a:r>
+                  <a:rPr lang="en-US" sz="1000" b="1" dirty="0">
+                    <a:solidFill>
+                      <a:schemeClr val="accent2">
+                        <a:lumMod val="50000"/>
+                      </a:schemeClr>
+                    </a:solidFill>
+                    <a:highlight>
+                      <a:srgbClr val="FFFF00"/>
+                    </a:highlight>
+                  </a:rPr>
+                  <a:t>Loss Functions</a:t>
+                </a:r>
+                <a:r>
+                  <a:rPr lang="en-US" sz="1000" b="1" dirty="0">
+                    <a:solidFill>
+                      <a:schemeClr val="bg1"/>
+                    </a:solidFill>
+                  </a:rPr>
+                  <a:t> </a:t>
+                </a:r>
+                <a14:m>
+                  <m:oMath xmlns:m="http://schemas.openxmlformats.org/officeDocument/2006/math">
+                    <m:r>
+                      <a:rPr lang="en-US" sz="1000" b="1" i="1" smtClean="0">
+                        <a:solidFill>
+                          <a:schemeClr val="bg1"/>
+                        </a:solidFill>
+                        <a:latin typeface="Cambria Math" panose="02040503050406030204" pitchFamily="18" charset="0"/>
+                      </a:rPr>
+                      <m:t>𝑳</m:t>
+                    </m:r>
+                    <m:r>
+                      <a:rPr lang="en-US" sz="1000" b="1" i="1" smtClean="0">
+                        <a:solidFill>
+                          <a:schemeClr val="bg1"/>
+                        </a:solidFill>
+                        <a:latin typeface="Cambria Math" panose="02040503050406030204" pitchFamily="18" charset="0"/>
+                      </a:rPr>
+                      <m:t>(</m:t>
+                    </m:r>
+                    <m:r>
+                      <a:rPr lang="en-US" sz="1000" b="1" i="1" smtClean="0">
+                        <a:solidFill>
+                          <a:schemeClr val="bg1"/>
+                        </a:solidFill>
+                        <a:latin typeface="Cambria Math" panose="02040503050406030204" pitchFamily="18" charset="0"/>
+                      </a:rPr>
+                      <m:t>𝒚</m:t>
+                    </m:r>
+                    <m:r>
+                      <a:rPr lang="en-US" sz="1000" b="1" i="1" smtClean="0">
+                        <a:solidFill>
+                          <a:schemeClr val="bg1"/>
+                        </a:solidFill>
+                        <a:latin typeface="Cambria Math" panose="02040503050406030204" pitchFamily="18" charset="0"/>
+                      </a:rPr>
+                      <m:t>,</m:t>
+                    </m:r>
+                    <m:acc>
+                      <m:accPr>
+                        <m:chr m:val="̂"/>
+                        <m:ctrlPr>
+                          <a:rPr lang="en-US" sz="1000" b="1" i="1" smtClean="0">
+                            <a:solidFill>
+                              <a:schemeClr val="bg1"/>
+                            </a:solidFill>
+                            <a:latin typeface="Cambria Math" panose="02040503050406030204" pitchFamily="18" charset="0"/>
+                          </a:rPr>
+                        </m:ctrlPr>
+                      </m:accPr>
+                      <m:e>
+                        <m:r>
+                          <a:rPr lang="en-US" sz="1000" b="1" i="1" smtClean="0">
+                            <a:solidFill>
+                              <a:schemeClr val="bg1"/>
+                            </a:solidFill>
+                            <a:latin typeface="Cambria Math" panose="02040503050406030204" pitchFamily="18" charset="0"/>
+                          </a:rPr>
+                          <m:t>𝒚</m:t>
+                        </m:r>
+                      </m:e>
+                    </m:acc>
+                    <m:r>
+                      <a:rPr lang="en-US" sz="1000" b="1" i="1" smtClean="0">
+                        <a:solidFill>
+                          <a:schemeClr val="bg1"/>
+                        </a:solidFill>
+                        <a:latin typeface="Cambria Math" panose="02040503050406030204" pitchFamily="18" charset="0"/>
+                      </a:rPr>
+                      <m:t>)</m:t>
+                    </m:r>
+                  </m:oMath>
+                </a14:m>
+                <a:endParaRPr lang="en-SG" sz="1000" b="1" dirty="0">
+                  <a:solidFill>
+                    <a:schemeClr val="accent2">
+                      <a:lumMod val="50000"/>
+                    </a:schemeClr>
+                  </a:solidFill>
+                </a:endParaRPr>
+              </a:p>
+              <a:p>
+                <a:pPr marL="88488" indent="-88488">
+                  <a:buFont typeface="Arial" panose="020B0604020202020204" pitchFamily="34" charset="0"/>
+                  <a:buChar char="•"/>
+                </a:pPr>
+                <a:r>
+                  <a:rPr lang="en-US" sz="1000" b="1" dirty="0">
+                    <a:solidFill>
+                      <a:schemeClr val="accent2"/>
+                    </a:solidFill>
+                  </a:rPr>
+                  <a:t>Regression</a:t>
+                </a:r>
+                <a:endParaRPr lang="en-US" sz="1000" dirty="0">
+                  <a:solidFill>
+                    <a:schemeClr val="bg1"/>
+                  </a:solidFill>
+                </a:endParaRPr>
+              </a:p>
+              <a:p>
+                <a:pPr marL="265462" lvl="1" indent="-176974">
+                  <a:buFont typeface="Courier New" panose="02070309020205020404" pitchFamily="49" charset="0"/>
+                  <a:buChar char="-"/>
+                </a:pPr>
+                <a:r>
+                  <a:rPr lang="en-US" sz="1000" dirty="0"/>
+                  <a:t>Mean Squared Error (L2 loss)</a:t>
+                </a:r>
+              </a:p>
+              <a:p>
+                <a:pPr marL="265462" lvl="1" indent="-176974">
+                  <a:buFont typeface="Courier New" panose="02070309020205020404" pitchFamily="49" charset="0"/>
+                  <a:buChar char="-"/>
+                </a:pPr>
+                <a:r>
+                  <a:rPr lang="en-US" sz="1000" dirty="0"/>
+                  <a:t>Mean Absolute Error (L1 loss)</a:t>
+                </a:r>
+              </a:p>
+              <a:p>
+                <a:pPr marL="88488" indent="-88488">
+                  <a:buFont typeface="Arial" panose="020B0604020202020204" pitchFamily="34" charset="0"/>
+                  <a:buChar char="•"/>
+                </a:pPr>
+                <a:r>
+                  <a:rPr lang="en-US" sz="1000" b="1" dirty="0">
+                    <a:solidFill>
+                      <a:schemeClr val="accent2"/>
+                    </a:solidFill>
+                  </a:rPr>
+                  <a:t>Classification</a:t>
+                </a:r>
+                <a:endParaRPr lang="en-US" sz="1000" dirty="0">
+                  <a:solidFill>
+                    <a:schemeClr val="accent2"/>
+                  </a:solidFill>
+                </a:endParaRPr>
+              </a:p>
+              <a:p>
+                <a:pPr marL="265462" lvl="1" indent="-176974">
+                  <a:buFont typeface="Courier New" panose="02070309020205020404" pitchFamily="49" charset="0"/>
+                  <a:buChar char="-"/>
+                </a:pPr>
+                <a:r>
+                  <a:rPr lang="en-US" sz="1000" dirty="0"/>
+                  <a:t>Cross-Entropy (Log Loss) =</a:t>
+                </a:r>
+                <a:br>
+                  <a:rPr lang="en-US" sz="1000" dirty="0"/>
+                </a:br>
+                <a14:m>
+                  <m:oMath xmlns:m="http://schemas.openxmlformats.org/officeDocument/2006/math">
+                    <m:r>
+                      <a:rPr lang="en-US" sz="1000" b="0" i="1" smtClean="0">
+                        <a:latin typeface="Cambria Math" panose="02040503050406030204" pitchFamily="18" charset="0"/>
+                      </a:rPr>
+                      <m:t>−[</m:t>
+                    </m:r>
+                    <m:r>
+                      <a:rPr lang="en-US" sz="1000" b="0" i="1" smtClean="0">
+                        <a:latin typeface="Cambria Math" panose="02040503050406030204" pitchFamily="18" charset="0"/>
+                      </a:rPr>
+                      <m:t>𝑦</m:t>
+                    </m:r>
+                    <m:func>
+                      <m:funcPr>
+                        <m:ctrlPr>
+                          <a:rPr lang="en-US" sz="1000" b="0" i="1" smtClean="0">
+                            <a:latin typeface="Cambria Math" panose="02040503050406030204" pitchFamily="18" charset="0"/>
+                          </a:rPr>
+                        </m:ctrlPr>
+                      </m:funcPr>
+                      <m:fName>
+                        <m:r>
+                          <m:rPr>
+                            <m:sty m:val="p"/>
+                          </m:rPr>
+                          <a:rPr lang="en-US" sz="1000" b="0" i="0" smtClean="0">
+                            <a:latin typeface="Cambria Math" panose="02040503050406030204" pitchFamily="18" charset="0"/>
+                          </a:rPr>
+                          <m:t>log</m:t>
+                        </m:r>
+                      </m:fName>
+                      <m:e>
+                        <m:acc>
+                          <m:accPr>
+                            <m:chr m:val="̂"/>
+                            <m:ctrlPr>
+                              <a:rPr lang="en-US" sz="1000" b="0" i="1" smtClean="0">
+                                <a:latin typeface="Cambria Math" panose="02040503050406030204" pitchFamily="18" charset="0"/>
+                              </a:rPr>
+                            </m:ctrlPr>
+                          </m:accPr>
+                          <m:e>
+                            <m:r>
+                              <a:rPr lang="en-US" sz="1000" b="0" i="1" smtClean="0">
+                                <a:latin typeface="Cambria Math" panose="02040503050406030204" pitchFamily="18" charset="0"/>
+                              </a:rPr>
+                              <m:t>𝑦</m:t>
+                            </m:r>
+                          </m:e>
+                        </m:acc>
+                      </m:e>
+                    </m:func>
+                    <m:r>
+                      <a:rPr lang="en-US" sz="1000" b="0" i="1" smtClean="0">
+                        <a:latin typeface="Cambria Math" panose="02040503050406030204" pitchFamily="18" charset="0"/>
+                      </a:rPr>
+                      <m:t>+</m:t>
+                    </m:r>
+                    <m:d>
+                      <m:dPr>
+                        <m:ctrlPr>
+                          <a:rPr lang="en-US" sz="1000" b="0" i="1" smtClean="0">
+                            <a:latin typeface="Cambria Math" panose="02040503050406030204" pitchFamily="18" charset="0"/>
+                          </a:rPr>
+                        </m:ctrlPr>
+                      </m:dPr>
+                      <m:e>
+                        <m:r>
+                          <a:rPr lang="en-US" sz="1000" b="0" i="1" smtClean="0">
+                            <a:latin typeface="Cambria Math" panose="02040503050406030204" pitchFamily="18" charset="0"/>
+                          </a:rPr>
+                          <m:t>1−</m:t>
+                        </m:r>
+                        <m:r>
+                          <a:rPr lang="en-US" sz="1000" b="0" i="1" smtClean="0">
+                            <a:latin typeface="Cambria Math" panose="02040503050406030204" pitchFamily="18" charset="0"/>
+                          </a:rPr>
+                          <m:t>𝑦</m:t>
+                        </m:r>
+                      </m:e>
+                    </m:d>
+                    <m:func>
+                      <m:funcPr>
+                        <m:ctrlPr>
+                          <a:rPr lang="en-US" sz="1000" b="0" i="1" smtClean="0">
+                            <a:latin typeface="Cambria Math" panose="02040503050406030204" pitchFamily="18" charset="0"/>
+                          </a:rPr>
+                        </m:ctrlPr>
+                      </m:funcPr>
+                      <m:fName>
+                        <m:r>
+                          <m:rPr>
+                            <m:sty m:val="p"/>
+                          </m:rPr>
+                          <a:rPr lang="en-US" sz="1000" b="0" i="0" smtClean="0">
+                            <a:latin typeface="Cambria Math" panose="02040503050406030204" pitchFamily="18" charset="0"/>
+                          </a:rPr>
+                          <m:t>log</m:t>
+                        </m:r>
+                      </m:fName>
+                      <m:e>
+                        <m:d>
+                          <m:dPr>
+                            <m:ctrlPr>
+                              <a:rPr lang="en-US" sz="1000" b="0" i="1" smtClean="0">
+                                <a:latin typeface="Cambria Math" panose="02040503050406030204" pitchFamily="18" charset="0"/>
+                              </a:rPr>
+                            </m:ctrlPr>
+                          </m:dPr>
+                          <m:e>
+                            <m:r>
+                              <a:rPr lang="en-US" sz="1000" b="0" i="1" smtClean="0">
+                                <a:latin typeface="Cambria Math" panose="02040503050406030204" pitchFamily="18" charset="0"/>
+                              </a:rPr>
+                              <m:t>1−</m:t>
+                            </m:r>
+                            <m:acc>
+                              <m:accPr>
+                                <m:chr m:val="̂"/>
+                                <m:ctrlPr>
+                                  <a:rPr lang="en-US" sz="1000" b="0" i="1" smtClean="0">
+                                    <a:latin typeface="Cambria Math" panose="02040503050406030204" pitchFamily="18" charset="0"/>
+                                  </a:rPr>
+                                </m:ctrlPr>
+                              </m:accPr>
+                              <m:e>
+                                <m:r>
+                                  <a:rPr lang="en-US" sz="1000" b="0" i="1" smtClean="0">
+                                    <a:latin typeface="Cambria Math" panose="02040503050406030204" pitchFamily="18" charset="0"/>
+                                  </a:rPr>
+                                  <m:t>𝑦</m:t>
+                                </m:r>
+                              </m:e>
+                            </m:acc>
+                          </m:e>
+                        </m:d>
+                      </m:e>
+                    </m:func>
+                    <m:r>
+                      <a:rPr lang="en-US" sz="1000" b="0" i="1" smtClean="0">
+                        <a:latin typeface="Cambria Math" panose="02040503050406030204" pitchFamily="18" charset="0"/>
+                      </a:rPr>
+                      <m:t>]</m:t>
+                    </m:r>
+                  </m:oMath>
+                </a14:m>
+                <a:endParaRPr lang="en-US" sz="1000" dirty="0"/>
+              </a:p>
+              <a:p>
+                <a:pPr marL="265462" lvl="1" indent="-176974">
+                  <a:buFont typeface="Courier New" panose="02070309020205020404" pitchFamily="49" charset="0"/>
+                  <a:buChar char="-"/>
+                </a:pPr>
+                <a:r>
+                  <a:rPr lang="en-US" sz="1000" dirty="0"/>
+                  <a:t>Multi-class = </a:t>
+                </a:r>
+                <a14:m>
+                  <m:oMath xmlns:m="http://schemas.openxmlformats.org/officeDocument/2006/math">
+                    <m:r>
+                      <a:rPr lang="en-US" sz="1000" b="0" i="1" smtClean="0">
+                        <a:latin typeface="Cambria Math" panose="02040503050406030204" pitchFamily="18" charset="0"/>
+                      </a:rPr>
+                      <m:t>−</m:t>
+                    </m:r>
+                    <m:nary>
+                      <m:naryPr>
+                        <m:chr m:val="∑"/>
+                        <m:limLoc m:val="subSup"/>
+                        <m:supHide m:val="on"/>
+                        <m:ctrlPr>
+                          <a:rPr lang="en-US" sz="1000" b="0" i="1" smtClean="0">
+                            <a:latin typeface="Cambria Math" panose="02040503050406030204" pitchFamily="18" charset="0"/>
+                          </a:rPr>
+                        </m:ctrlPr>
+                      </m:naryPr>
+                      <m:sub>
+                        <m:r>
+                          <m:rPr>
+                            <m:brk m:alnAt="9"/>
+                          </m:rPr>
+                          <a:rPr lang="en-US" sz="1000" b="0" i="1" smtClean="0">
+                            <a:latin typeface="Cambria Math" panose="02040503050406030204" pitchFamily="18" charset="0"/>
+                          </a:rPr>
+                          <m:t>𝐾</m:t>
+                        </m:r>
+                      </m:sub>
+                      <m:sup/>
+                      <m:e>
+                        <m:sSub>
+                          <m:sSubPr>
+                            <m:ctrlPr>
+                              <a:rPr lang="en-US" sz="1000" b="0" i="1" smtClean="0">
+                                <a:latin typeface="Cambria Math" panose="02040503050406030204" pitchFamily="18" charset="0"/>
+                              </a:rPr>
+                            </m:ctrlPr>
+                          </m:sSubPr>
+                          <m:e>
+                            <m:r>
+                              <a:rPr lang="en-US" sz="1000" b="0" i="1" smtClean="0">
+                                <a:latin typeface="Cambria Math" panose="02040503050406030204" pitchFamily="18" charset="0"/>
+                              </a:rPr>
+                              <m:t>𝑦</m:t>
+                            </m:r>
+                          </m:e>
+                          <m:sub>
+                            <m:r>
+                              <a:rPr lang="en-US" sz="1000" b="0" i="1" smtClean="0">
+                                <a:latin typeface="Cambria Math" panose="02040503050406030204" pitchFamily="18" charset="0"/>
+                              </a:rPr>
+                              <m:t>𝑖</m:t>
+                            </m:r>
+                          </m:sub>
+                        </m:sSub>
+                        <m:func>
+                          <m:funcPr>
+                            <m:ctrlPr>
+                              <a:rPr lang="en-US" sz="1000" b="0" i="1" smtClean="0">
+                                <a:latin typeface="Cambria Math" panose="02040503050406030204" pitchFamily="18" charset="0"/>
+                              </a:rPr>
+                            </m:ctrlPr>
+                          </m:funcPr>
+                          <m:fName>
+                            <m:r>
+                              <m:rPr>
+                                <m:sty m:val="p"/>
+                              </m:rPr>
+                              <a:rPr lang="en-US" sz="1000" b="0" i="0" smtClean="0">
+                                <a:latin typeface="Cambria Math" panose="02040503050406030204" pitchFamily="18" charset="0"/>
+                              </a:rPr>
+                              <m:t>log</m:t>
+                            </m:r>
+                          </m:fName>
+                          <m:e>
+                            <m:sSub>
+                              <m:sSubPr>
+                                <m:ctrlPr>
+                                  <a:rPr lang="en-US" sz="1000" b="0" i="1" smtClean="0">
+                                    <a:latin typeface="Cambria Math" panose="02040503050406030204" pitchFamily="18" charset="0"/>
+                                  </a:rPr>
+                                </m:ctrlPr>
+                              </m:sSubPr>
+                              <m:e>
+                                <m:acc>
+                                  <m:accPr>
+                                    <m:chr m:val="̂"/>
+                                    <m:ctrlPr>
+                                      <a:rPr lang="en-US" sz="1000" b="0" i="1" smtClean="0">
+                                        <a:latin typeface="Cambria Math" panose="02040503050406030204" pitchFamily="18" charset="0"/>
+                                      </a:rPr>
+                                    </m:ctrlPr>
+                                  </m:accPr>
+                                  <m:e>
+                                    <m:r>
+                                      <a:rPr lang="en-US" sz="1000" b="0" i="1" smtClean="0">
+                                        <a:latin typeface="Cambria Math" panose="02040503050406030204" pitchFamily="18" charset="0"/>
+                                      </a:rPr>
+                                      <m:t>𝑦</m:t>
+                                    </m:r>
+                                  </m:e>
+                                </m:acc>
+                              </m:e>
+                              <m:sub>
+                                <m:r>
+                                  <a:rPr lang="en-US" sz="1000" b="0" i="1" smtClean="0">
+                                    <a:latin typeface="Cambria Math" panose="02040503050406030204" pitchFamily="18" charset="0"/>
+                                  </a:rPr>
+                                  <m:t>𝑖</m:t>
+                                </m:r>
+                              </m:sub>
+                            </m:sSub>
+                          </m:e>
+                        </m:func>
+                      </m:e>
+                    </m:nary>
+                  </m:oMath>
+                </a14:m>
+                <a:endParaRPr lang="en-US" sz="1000" dirty="0"/>
+              </a:p>
+              <a:p>
+                <a:endParaRPr lang="en-US" sz="1000" dirty="0"/>
+              </a:p>
+              <a:p>
+                <a:pPr marL="265462" lvl="1" indent="-176974">
+                  <a:buFont typeface="Courier New" panose="02070309020205020404" pitchFamily="49" charset="0"/>
+                  <a:buChar char="-"/>
+                </a:pPr>
+                <a:endParaRPr lang="en-US" sz="1000" dirty="0">
+                  <a:solidFill>
+                    <a:schemeClr val="accent2"/>
+                  </a:solidFill>
+                </a:endParaRPr>
+              </a:p>
+            </p:txBody>
+          </p:sp>
+        </mc:Choice>
+        <mc:Fallback>
+          <p:sp>
+            <p:nvSpPr>
+              <p:cNvPr id="11" name="Rectangle 10">
+                <a:extLst>
+                  <a:ext uri="{FF2B5EF4-FFF2-40B4-BE49-F238E27FC236}">
+                    <a16:creationId xmlns:a16="http://schemas.microsoft.com/office/drawing/2014/main" id="{C72D3252-8B3D-4195-A247-265887603463}"/>
+                  </a:ext>
+                </a:extLst>
+              </p:cNvPr>
+              <p:cNvSpPr>
+                <a:spLocks noRot="1" noChangeAspect="1" noMove="1" noResize="1" noEditPoints="1" noAdjustHandles="1" noChangeArrowheads="1" noChangeShapeType="1" noTextEdit="1"/>
+              </p:cNvSpPr>
+              <p:nvPr/>
+            </p:nvSpPr>
+            <p:spPr>
+              <a:xfrm>
+                <a:off x="0" y="1724025"/>
+                <a:ext cx="2286000" cy="1330120"/>
+              </a:xfrm>
+              <a:prstGeom prst="rect">
+                <a:avLst/>
+              </a:prstGeom>
+              <a:blipFill>
+                <a:blip r:embed="rId5"/>
+                <a:stretch>
+                  <a:fillRect b="-25000"/>
+                </a:stretch>
+              </a:blipFill>
+              <a:ln>
+                <a:solidFill>
+                  <a:schemeClr val="accent1"/>
+                </a:solidFill>
+              </a:ln>
+            </p:spPr>
+            <p:txBody>
+              <a:bodyPr/>
+              <a:lstStyle/>
+              <a:p>
+                <a:r>
+                  <a:rPr lang="en-SG">
+                    <a:noFill/>
+                  </a:rPr>
+                  <a:t> </a:t>
+                </a:r>
+              </a:p>
+            </p:txBody>
+          </p:sp>
+        </mc:Fallback>
+      </mc:AlternateContent>
+      <mc:AlternateContent xmlns:mc="http://schemas.openxmlformats.org/markup-compatibility/2006">
+        <mc:Choice xmlns:a14="http://schemas.microsoft.com/office/drawing/2010/main" Requires="a14">
+          <p:sp>
+            <p:nvSpPr>
+              <p:cNvPr id="12" name="Rectangle 11">
+                <a:extLst>
+                  <a:ext uri="{FF2B5EF4-FFF2-40B4-BE49-F238E27FC236}">
+                    <a16:creationId xmlns:a16="http://schemas.microsoft.com/office/drawing/2014/main" id="{655FC4CF-B7E8-4AC1-BEEE-E23DAA083C90}"/>
+                  </a:ext>
+                </a:extLst>
+              </p:cNvPr>
+              <p:cNvSpPr/>
+              <p:nvPr/>
+            </p:nvSpPr>
+            <p:spPr>
+              <a:xfrm>
+                <a:off x="0" y="3054146"/>
+                <a:ext cx="2286000" cy="2076451"/>
+              </a:xfrm>
+              <a:prstGeom prst="rect">
+                <a:avLst/>
+              </a:prstGeom>
+              <a:solidFill>
+                <a:srgbClr val="001746"/>
+              </a:solidFill>
+              <a:ln>
+                <a:solidFill>
+                  <a:schemeClr val="accent1"/>
+                </a:solidFill>
+              </a:ln>
+            </p:spPr>
+            <p:style>
+              <a:lnRef idx="2">
+                <a:schemeClr val="accent1">
+                  <a:shade val="50000"/>
+                </a:schemeClr>
+              </a:lnRef>
+              <a:fillRef idx="1">
+                <a:schemeClr val="accent1"/>
+              </a:fillRef>
+              <a:effectRef idx="0">
+                <a:schemeClr val="accent1"/>
+              </a:effectRef>
+              <a:fontRef idx="minor">
+                <a:schemeClr val="lt1"/>
+              </a:fontRef>
+            </p:style>
+            <p:txBody>
+              <a:bodyPr rtlCol="0" anchor="t"/>
+              <a:lstStyle/>
+              <a:p>
+                <a:r>
+                  <a:rPr lang="en-US" sz="1000" b="1" dirty="0">
+                    <a:solidFill>
+                      <a:schemeClr val="accent2">
+                        <a:lumMod val="50000"/>
+                      </a:schemeClr>
+                    </a:solidFill>
+                    <a:highlight>
+                      <a:srgbClr val="FFFF00"/>
+                    </a:highlight>
+                  </a:rPr>
+                  <a:t>Regularization</a:t>
+                </a:r>
+                <a:endParaRPr lang="en-SG" sz="1000" b="1" dirty="0">
+                  <a:solidFill>
+                    <a:schemeClr val="accent2">
+                      <a:lumMod val="50000"/>
+                    </a:schemeClr>
+                  </a:solidFill>
+                </a:endParaRPr>
+              </a:p>
+              <a:p>
+                <a:pPr marL="88488" indent="-88488">
+                  <a:buFont typeface="Arial" panose="020B0604020202020204" pitchFamily="34" charset="0"/>
+                  <a:buChar char="•"/>
+                </a:pPr>
+                <a:r>
+                  <a:rPr lang="en-US" sz="1000" b="1" dirty="0">
+                    <a:solidFill>
+                      <a:schemeClr val="accent2"/>
+                    </a:solidFill>
+                  </a:rPr>
+                  <a:t>L1 Penalty </a:t>
+                </a:r>
+                <a:r>
+                  <a:rPr lang="en-US" sz="1000" dirty="0">
+                    <a:solidFill>
+                      <a:schemeClr val="bg1"/>
+                    </a:solidFill>
+                  </a:rPr>
+                  <a:t>= </a:t>
+                </a:r>
+                <a14:m>
+                  <m:oMath xmlns:m="http://schemas.openxmlformats.org/officeDocument/2006/math">
+                    <m:r>
+                      <a:rPr lang="en-US" sz="1000" b="0" i="1" smtClean="0">
+                        <a:solidFill>
+                          <a:schemeClr val="bg1"/>
+                        </a:solidFill>
+                        <a:latin typeface="Cambria Math" panose="02040503050406030204" pitchFamily="18" charset="0"/>
+                      </a:rPr>
+                      <m:t>𝜆</m:t>
+                    </m:r>
+                    <m:nary>
+                      <m:naryPr>
+                        <m:chr m:val="∑"/>
+                        <m:limLoc m:val="subSup"/>
+                        <m:supHide m:val="on"/>
+                        <m:ctrlPr>
+                          <a:rPr lang="en-US" sz="1000" b="0" i="1" smtClean="0">
+                            <a:solidFill>
+                              <a:schemeClr val="bg1"/>
+                            </a:solidFill>
+                            <a:latin typeface="Cambria Math" panose="02040503050406030204" pitchFamily="18" charset="0"/>
+                          </a:rPr>
+                        </m:ctrlPr>
+                      </m:naryPr>
+                      <m:sub>
+                        <m:r>
+                          <m:rPr>
+                            <m:brk m:alnAt="9"/>
+                          </m:rPr>
+                          <a:rPr lang="en-US" sz="1000" b="0" i="1" smtClean="0">
+                            <a:solidFill>
+                              <a:schemeClr val="bg1"/>
+                            </a:solidFill>
+                            <a:latin typeface="Cambria Math" panose="02040503050406030204" pitchFamily="18" charset="0"/>
+                          </a:rPr>
+                          <m:t>𝑤</m:t>
+                        </m:r>
+                      </m:sub>
+                      <m:sup/>
+                      <m:e>
+                        <m:r>
+                          <a:rPr lang="en-US" sz="1000" b="0" i="1" smtClean="0">
+                            <a:solidFill>
+                              <a:schemeClr val="bg1"/>
+                            </a:solidFill>
+                            <a:latin typeface="Cambria Math" panose="02040503050406030204" pitchFamily="18" charset="0"/>
+                          </a:rPr>
+                          <m:t>|</m:t>
+                        </m:r>
+                        <m:sSub>
+                          <m:sSubPr>
+                            <m:ctrlPr>
+                              <a:rPr lang="en-US" sz="1000" b="0" i="1" smtClean="0">
+                                <a:solidFill>
+                                  <a:schemeClr val="bg1"/>
+                                </a:solidFill>
+                                <a:latin typeface="Cambria Math" panose="02040503050406030204" pitchFamily="18" charset="0"/>
+                              </a:rPr>
+                            </m:ctrlPr>
+                          </m:sSubPr>
+                          <m:e>
+                            <m:r>
+                              <a:rPr lang="en-US" sz="1000" b="0" i="1" smtClean="0">
+                                <a:solidFill>
+                                  <a:schemeClr val="bg1"/>
+                                </a:solidFill>
+                                <a:latin typeface="Cambria Math" panose="02040503050406030204" pitchFamily="18" charset="0"/>
+                              </a:rPr>
+                              <m:t>𝑤</m:t>
+                            </m:r>
+                          </m:e>
+                          <m:sub>
+                            <m:r>
+                              <a:rPr lang="en-US" sz="1000" b="0" i="1" smtClean="0">
+                                <a:solidFill>
+                                  <a:schemeClr val="bg1"/>
+                                </a:solidFill>
+                                <a:latin typeface="Cambria Math" panose="02040503050406030204" pitchFamily="18" charset="0"/>
+                              </a:rPr>
+                              <m:t>𝑖</m:t>
+                            </m:r>
+                          </m:sub>
+                        </m:sSub>
+                        <m:r>
+                          <a:rPr lang="en-US" sz="1000" b="0" i="1" smtClean="0">
+                            <a:solidFill>
+                              <a:schemeClr val="bg1"/>
+                            </a:solidFill>
+                            <a:latin typeface="Cambria Math" panose="02040503050406030204" pitchFamily="18" charset="0"/>
+                          </a:rPr>
+                          <m:t>|</m:t>
+                        </m:r>
+                      </m:e>
+                    </m:nary>
+                  </m:oMath>
+                </a14:m>
+                <a:endParaRPr lang="en-US" sz="1000" dirty="0">
                   <a:solidFill>
                     <a:schemeClr val="bg1"/>
                   </a:solidFill>
@@ -12214,14 +15079,112 @@
                   <a:buChar char="•"/>
                 </a:pPr>
                 <a:r>
+                  <a:rPr lang="en-US" sz="1000" b="1" dirty="0">
+                    <a:solidFill>
+                      <a:schemeClr val="accent2"/>
+                    </a:solidFill>
+                  </a:rPr>
+                  <a:t>L2 Penalty </a:t>
+                </a:r>
+                <a:r>
                   <a:rPr lang="en-US" sz="1000" dirty="0">
                     <a:solidFill>
                       <a:schemeClr val="bg1"/>
                     </a:solidFill>
                   </a:rPr>
-                  <a:t>Learning rate α needs to be tuned</a:t>
-                </a:r>
-                <a:endParaRPr lang="en-SG" sz="1000" dirty="0">
+                  <a:t>= </a:t>
+                </a:r>
+                <a14:m>
+                  <m:oMath xmlns:m="http://schemas.openxmlformats.org/officeDocument/2006/math">
+                    <m:r>
+                      <a:rPr lang="en-US" sz="1000" b="0" i="1" smtClean="0">
+                        <a:solidFill>
+                          <a:schemeClr val="bg1"/>
+                        </a:solidFill>
+                        <a:latin typeface="Cambria Math" panose="02040503050406030204" pitchFamily="18" charset="0"/>
+                      </a:rPr>
+                      <m:t>𝜆</m:t>
+                    </m:r>
+                    <m:nary>
+                      <m:naryPr>
+                        <m:chr m:val="∑"/>
+                        <m:limLoc m:val="subSup"/>
+                        <m:supHide m:val="on"/>
+                        <m:ctrlPr>
+                          <a:rPr lang="en-US" sz="1000" b="0" i="1" smtClean="0">
+                            <a:solidFill>
+                              <a:schemeClr val="bg1"/>
+                            </a:solidFill>
+                            <a:latin typeface="Cambria Math" panose="02040503050406030204" pitchFamily="18" charset="0"/>
+                          </a:rPr>
+                        </m:ctrlPr>
+                      </m:naryPr>
+                      <m:sub>
+                        <m:r>
+                          <m:rPr>
+                            <m:brk m:alnAt="9"/>
+                          </m:rPr>
+                          <a:rPr lang="en-US" sz="1000" b="0" i="1" smtClean="0">
+                            <a:solidFill>
+                              <a:schemeClr val="bg1"/>
+                            </a:solidFill>
+                            <a:latin typeface="Cambria Math" panose="02040503050406030204" pitchFamily="18" charset="0"/>
+                          </a:rPr>
+                          <m:t>𝑤</m:t>
+                        </m:r>
+                      </m:sub>
+                      <m:sup/>
+                      <m:e>
+                        <m:sSubSup>
+                          <m:sSubSupPr>
+                            <m:ctrlPr>
+                              <a:rPr lang="en-US" sz="1000" b="0" i="1" smtClean="0">
+                                <a:solidFill>
+                                  <a:schemeClr val="bg1"/>
+                                </a:solidFill>
+                                <a:latin typeface="Cambria Math" panose="02040503050406030204" pitchFamily="18" charset="0"/>
+                              </a:rPr>
+                            </m:ctrlPr>
+                          </m:sSubSupPr>
+                          <m:e>
+                            <m:r>
+                              <a:rPr lang="en-US" sz="1000" b="0" i="1" smtClean="0">
+                                <a:solidFill>
+                                  <a:schemeClr val="bg1"/>
+                                </a:solidFill>
+                                <a:latin typeface="Cambria Math" panose="02040503050406030204" pitchFamily="18" charset="0"/>
+                              </a:rPr>
+                              <m:t>𝑤</m:t>
+                            </m:r>
+                          </m:e>
+                          <m:sub>
+                            <m:r>
+                              <a:rPr lang="en-US" sz="1000" b="0" i="1" smtClean="0">
+                                <a:solidFill>
+                                  <a:schemeClr val="bg1"/>
+                                </a:solidFill>
+                                <a:latin typeface="Cambria Math" panose="02040503050406030204" pitchFamily="18" charset="0"/>
+                              </a:rPr>
+                              <m:t>𝑖</m:t>
+                            </m:r>
+                          </m:sub>
+                          <m:sup>
+                            <m:r>
+                              <a:rPr lang="en-US" sz="1000" b="0" i="1" smtClean="0">
+                                <a:solidFill>
+                                  <a:schemeClr val="bg1"/>
+                                </a:solidFill>
+                                <a:latin typeface="Cambria Math" panose="02040503050406030204" pitchFamily="18" charset="0"/>
+                              </a:rPr>
+                              <m:t>2</m:t>
+                            </m:r>
+                          </m:sup>
+                        </m:sSubSup>
+                      </m:e>
+                    </m:nary>
+                  </m:oMath>
+                </a14:m>
+                <a:endParaRPr lang="en-US" sz="1000" dirty="0">
                   <a:solidFill>
                     <a:schemeClr val="bg1"/>
                   </a:solidFill>
@@ -12233,16 +15196,118 @@
                   <a:buChar char="•"/>
                 </a:pPr>
                 <a:r>
+                  <a:rPr lang="en-US" sz="1000" b="1" dirty="0">
+                    <a:solidFill>
+                      <a:schemeClr val="accent2"/>
+                    </a:solidFill>
+                  </a:rPr>
+                  <a:t>Dropout</a:t>
+                </a:r>
+                <a:endParaRPr lang="en-US" sz="1000" dirty="0">
+                  <a:solidFill>
+                    <a:schemeClr val="accent2"/>
+                  </a:solidFill>
+                </a:endParaRPr>
+              </a:p>
+              <a:p>
+                <a:pPr marL="265462" lvl="1" indent="-176974">
+                  <a:buFont typeface="Courier New" panose="02070309020205020404" pitchFamily="49" charset="0"/>
+                  <a:buChar char="-"/>
+                </a:pPr>
+                <a:r>
+                  <a:rPr lang="en-US" sz="1000" dirty="0"/>
+                  <a:t>Produce an ensemble of NNs</a:t>
+                </a:r>
+              </a:p>
+              <a:p>
+                <a:pPr marL="265462" lvl="1" indent="-176974">
+                  <a:buFont typeface="Courier New" panose="02070309020205020404" pitchFamily="49" charset="0"/>
+                  <a:buChar char="-"/>
+                </a:pPr>
+                <a:r>
+                  <a:rPr lang="en-US" sz="1000" dirty="0"/>
+                  <a:t>Training: drop in each iteration;</a:t>
+                </a:r>
+                <a:br>
+                  <a:rPr lang="en-US" sz="1000" dirty="0"/>
+                </a:br>
+                <a:r>
+                  <a:rPr lang="en-US" sz="1000" dirty="0"/>
+                  <a:t>adjust by </a:t>
+                </a:r>
+                <a:r>
                   <a:rPr lang="en-US" sz="1000" dirty="0">
                     <a:solidFill>
-                      <a:schemeClr val="bg1"/>
+                      <a:schemeClr val="accent2"/>
                     </a:solidFill>
                   </a:rPr>
-                  <a:t>β1 is default 0.9, β2 is default 0.999</a:t>
-                </a:r>
-                <a:endParaRPr lang="en-SG" sz="1000" dirty="0">
+                  <a:t>inverted dropout </a:t>
+                </a:r>
+                <a:r>
+                  <a:rPr lang="en-US" sz="1000" dirty="0"/>
+                  <a:t>(divide the output by the keep-alive rate)</a:t>
+                </a:r>
+              </a:p>
+              <a:p>
+                <a:pPr marL="265462" lvl="1" indent="-176974">
+                  <a:buFont typeface="Courier New" panose="02070309020205020404" pitchFamily="49" charset="0"/>
+                  <a:buChar char="-"/>
+                </a:pPr>
+                <a:r>
+                  <a:rPr lang="en-US" sz="1000" dirty="0"/>
+                  <a:t>Prediction: no drop</a:t>
+                </a:r>
+              </a:p>
+              <a:p>
+                <a:pPr marL="88488" indent="-88488">
+                  <a:buFont typeface="Arial" panose="020B0604020202020204" pitchFamily="34" charset="0"/>
+                  <a:buChar char="•"/>
+                </a:pPr>
+                <a:r>
+                  <a:rPr lang="en-US" sz="1000" b="1" dirty="0">
+                    <a:solidFill>
+                      <a:schemeClr val="accent2"/>
+                    </a:solidFill>
+                  </a:rPr>
+                  <a:t>Pruning</a:t>
+                </a:r>
+                <a:endParaRPr lang="en-US" sz="1000" dirty="0">
                   <a:solidFill>
-                    <a:schemeClr val="bg1"/>
+                    <a:schemeClr val="accent2"/>
+                  </a:solidFill>
+                </a:endParaRPr>
+              </a:p>
+              <a:p>
+                <a:pPr marL="265462" lvl="1" indent="-176974">
+                  <a:buFont typeface="Courier New" panose="02070309020205020404" pitchFamily="49" charset="0"/>
+                  <a:buChar char="-"/>
+                </a:pPr>
+                <a:r>
+                  <a:rPr lang="en-US" sz="1000" dirty="0"/>
+                  <a:t>After training, for weights ≈ 0, remove surrounding neurons</a:t>
+                </a:r>
+              </a:p>
+              <a:p>
+                <a:pPr marL="265462" lvl="1" indent="-176974">
+                  <a:buFont typeface="Courier New" panose="02070309020205020404" pitchFamily="49" charset="0"/>
+                  <a:buChar char="-"/>
+                </a:pPr>
+                <a:r>
+                  <a:rPr lang="en-US" sz="1000" dirty="0"/>
+                  <a:t>Check again if perform the same</a:t>
+                </a:r>
+              </a:p>
+              <a:p>
+                <a:endParaRPr lang="en-US" sz="1000" dirty="0"/>
+              </a:p>
+              <a:p>
+                <a:pPr marL="265462" lvl="1" indent="-176974">
+                  <a:buFont typeface="Courier New" panose="02070309020205020404" pitchFamily="49" charset="0"/>
+                  <a:buChar char="-"/>
+                </a:pPr>
+                <a:endParaRPr lang="en-US" sz="1000" dirty="0">
+                  <a:solidFill>
+                    <a:schemeClr val="accent2"/>
                   </a:solidFill>
                 </a:endParaRPr>
               </a:p>
@@ -12252,10 +15317,10 @@
         <mc:Fallback>
           <p:sp>
             <p:nvSpPr>
-              <p:cNvPr id="57" name="Rectangle 56">
+              <p:cNvPr id="12" name="Rectangle 11">
                 <a:extLst>
                   <a:ext uri="{FF2B5EF4-FFF2-40B4-BE49-F238E27FC236}">
-                    <a16:creationId xmlns:a16="http://schemas.microsoft.com/office/drawing/2014/main" id="{7CA76DBA-3A25-4458-AE2D-AD7DFBD7CEB3}"/>
+                    <a16:creationId xmlns:a16="http://schemas.microsoft.com/office/drawing/2014/main" id="{655FC4CF-B7E8-4AC1-BEEE-E23DAA083C90}"/>
                   </a:ext>
                 </a:extLst>
               </p:cNvPr>
@@ -12266,16 +15331,16 @@
             </p:nvSpPr>
             <p:spPr>
               <a:xfrm>
-                <a:off x="0" y="0"/>
-                <a:ext cx="2286000" cy="2292383"/>
+                <a:off x="0" y="3054146"/>
+                <a:ext cx="2286000" cy="2076451"/>
               </a:xfrm>
               <a:prstGeom prst="rect">
                 <a:avLst/>
               </a:prstGeom>
               <a:blipFill>
-                <a:blip r:embed="rId2"/>
+                <a:blip r:embed="rId6"/>
                 <a:stretch>
-                  <a:fillRect b="-265"/>
+                  <a:fillRect t="-2624" b="-1749"/>
                 </a:stretch>
               </a:blipFill>
               <a:ln>

</xml_diff>

<commit_message>
update cheat sheet and systems design
</commit_message>
<xml_diff>
--- a/cheat_sheet/DS Basics.pptx
+++ b/cheat_sheet/DS Basics.pptx
@@ -1792,7 +1792,7 @@
           <a:p>
             <a:fld id="{1AB153FA-EDD0-4CF2-940E-53E42A92FA71}" type="datetimeFigureOut">
               <a:rPr lang="en-US" smtClean="0"/>
-              <a:t>9/28/2021</a:t>
+              <a:t>9/29/2021</a:t>
             </a:fld>
             <a:endParaRPr lang="en-US"/>
           </a:p>
@@ -1962,7 +1962,7 @@
           <a:p>
             <a:fld id="{1AB153FA-EDD0-4CF2-940E-53E42A92FA71}" type="datetimeFigureOut">
               <a:rPr lang="en-US" smtClean="0"/>
-              <a:t>9/28/2021</a:t>
+              <a:t>9/29/2021</a:t>
             </a:fld>
             <a:endParaRPr lang="en-US"/>
           </a:p>
@@ -2142,7 +2142,7 @@
           <a:p>
             <a:fld id="{1AB153FA-EDD0-4CF2-940E-53E42A92FA71}" type="datetimeFigureOut">
               <a:rPr lang="en-US" smtClean="0"/>
-              <a:t>9/28/2021</a:t>
+              <a:t>9/29/2021</a:t>
             </a:fld>
             <a:endParaRPr lang="en-US"/>
           </a:p>
@@ -2312,7 +2312,7 @@
           <a:p>
             <a:fld id="{1AB153FA-EDD0-4CF2-940E-53E42A92FA71}" type="datetimeFigureOut">
               <a:rPr lang="en-US" smtClean="0"/>
-              <a:t>9/28/2021</a:t>
+              <a:t>9/29/2021</a:t>
             </a:fld>
             <a:endParaRPr lang="en-US"/>
           </a:p>
@@ -2558,7 +2558,7 @@
           <a:p>
             <a:fld id="{1AB153FA-EDD0-4CF2-940E-53E42A92FA71}" type="datetimeFigureOut">
               <a:rPr lang="en-US" smtClean="0"/>
-              <a:t>9/28/2021</a:t>
+              <a:t>9/29/2021</a:t>
             </a:fld>
             <a:endParaRPr lang="en-US"/>
           </a:p>
@@ -2790,7 +2790,7 @@
           <a:p>
             <a:fld id="{1AB153FA-EDD0-4CF2-940E-53E42A92FA71}" type="datetimeFigureOut">
               <a:rPr lang="en-US" smtClean="0"/>
-              <a:t>9/28/2021</a:t>
+              <a:t>9/29/2021</a:t>
             </a:fld>
             <a:endParaRPr lang="en-US"/>
           </a:p>
@@ -3157,7 +3157,7 @@
           <a:p>
             <a:fld id="{1AB153FA-EDD0-4CF2-940E-53E42A92FA71}" type="datetimeFigureOut">
               <a:rPr lang="en-US" smtClean="0"/>
-              <a:t>9/28/2021</a:t>
+              <a:t>9/29/2021</a:t>
             </a:fld>
             <a:endParaRPr lang="en-US"/>
           </a:p>
@@ -3275,7 +3275,7 @@
           <a:p>
             <a:fld id="{1AB153FA-EDD0-4CF2-940E-53E42A92FA71}" type="datetimeFigureOut">
               <a:rPr lang="en-US" smtClean="0"/>
-              <a:t>9/28/2021</a:t>
+              <a:t>9/29/2021</a:t>
             </a:fld>
             <a:endParaRPr lang="en-US"/>
           </a:p>
@@ -3370,7 +3370,7 @@
           <a:p>
             <a:fld id="{1AB153FA-EDD0-4CF2-940E-53E42A92FA71}" type="datetimeFigureOut">
               <a:rPr lang="en-US" smtClean="0"/>
-              <a:t>9/28/2021</a:t>
+              <a:t>9/29/2021</a:t>
             </a:fld>
             <a:endParaRPr lang="en-US"/>
           </a:p>
@@ -3647,7 +3647,7 @@
           <a:p>
             <a:fld id="{1AB153FA-EDD0-4CF2-940E-53E42A92FA71}" type="datetimeFigureOut">
               <a:rPr lang="en-US" smtClean="0"/>
-              <a:t>9/28/2021</a:t>
+              <a:t>9/29/2021</a:t>
             </a:fld>
             <a:endParaRPr lang="en-US"/>
           </a:p>
@@ -3904,7 +3904,7 @@
           <a:p>
             <a:fld id="{1AB153FA-EDD0-4CF2-940E-53E42A92FA71}" type="datetimeFigureOut">
               <a:rPr lang="en-US" smtClean="0"/>
-              <a:t>9/28/2021</a:t>
+              <a:t>9/29/2021</a:t>
             </a:fld>
             <a:endParaRPr lang="en-US"/>
           </a:p>
@@ -4117,7 +4117,7 @@
           <a:p>
             <a:fld id="{1AB153FA-EDD0-4CF2-940E-53E42A92FA71}" type="datetimeFigureOut">
               <a:rPr lang="en-US" smtClean="0"/>
-              <a:t>9/28/2021</a:t>
+              <a:t>9/29/2021</a:t>
             </a:fld>
             <a:endParaRPr lang="en-US"/>
           </a:p>
@@ -11671,8 +11671,8 @@
           </p:sp>
         </mc:Fallback>
       </mc:AlternateContent>
-      <mc:AlternateContent xmlns:mc="http://schemas.openxmlformats.org/markup-compatibility/2006">
-        <mc:Choice xmlns:a14="http://schemas.microsoft.com/office/drawing/2010/main" Requires="a14">
+      <mc:AlternateContent xmlns:mc="http://schemas.openxmlformats.org/markup-compatibility/2006" xmlns:a14="http://schemas.microsoft.com/office/drawing/2010/main">
+        <mc:Choice Requires="a14">
           <p:sp>
             <p:nvSpPr>
               <p:cNvPr id="7" name="Rectangle 6">
@@ -13220,7 +13220,7 @@
             </p:txBody>
           </p:sp>
         </mc:Choice>
-        <mc:Fallback>
+        <mc:Fallback xmlns="">
           <p:sp>
             <p:nvSpPr>
               <p:cNvPr id="7" name="Rectangle 6">
@@ -13627,8 +13627,8 @@
           </a:p>
         </p:txBody>
       </p:sp>
-      <mc:AlternateContent xmlns:mc="http://schemas.openxmlformats.org/markup-compatibility/2006">
-        <mc:Choice xmlns:a14="http://schemas.microsoft.com/office/drawing/2010/main" Requires="a14">
+      <mc:AlternateContent xmlns:mc="http://schemas.openxmlformats.org/markup-compatibility/2006" xmlns:a14="http://schemas.microsoft.com/office/drawing/2010/main">
+        <mc:Choice Requires="a14">
           <p:sp>
             <p:nvSpPr>
               <p:cNvPr id="9" name="Rectangle 8">
@@ -14200,7 +14200,7 @@
             </p:txBody>
           </p:sp>
         </mc:Choice>
-        <mc:Fallback>
+        <mc:Fallback xmlns="">
           <p:sp>
             <p:nvSpPr>
               <p:cNvPr id="9" name="Rectangle 8">
@@ -15497,8 +15497,8 @@
           <a:chExt cx="0" cy="0"/>
         </a:xfrm>
       </p:grpSpPr>
-      <mc:AlternateContent xmlns:mc="http://schemas.openxmlformats.org/markup-compatibility/2006">
-        <mc:Choice xmlns:a14="http://schemas.microsoft.com/office/drawing/2010/main" Requires="a14">
+      <mc:AlternateContent xmlns:mc="http://schemas.openxmlformats.org/markup-compatibility/2006" xmlns:a14="http://schemas.microsoft.com/office/drawing/2010/main">
+        <mc:Choice Requires="a14">
           <p:sp>
             <p:nvSpPr>
               <p:cNvPr id="5" name="Rectangle 4">
@@ -16475,7 +16475,7 @@
             </p:txBody>
           </p:sp>
         </mc:Choice>
-        <mc:Fallback>
+        <mc:Fallback xmlns="">
           <p:sp>
             <p:nvSpPr>
               <p:cNvPr id="5" name="Rectangle 4">
@@ -16525,8 +16525,8 @@
           </p:sp>
         </mc:Fallback>
       </mc:AlternateContent>
-      <mc:AlternateContent xmlns:mc="http://schemas.openxmlformats.org/markup-compatibility/2006">
-        <mc:Choice xmlns:a14="http://schemas.microsoft.com/office/drawing/2010/main" Requires="a14">
+      <mc:AlternateContent xmlns:mc="http://schemas.openxmlformats.org/markup-compatibility/2006" xmlns:a14="http://schemas.microsoft.com/office/drawing/2010/main">
+        <mc:Choice Requires="a14">
           <p:sp>
             <p:nvSpPr>
               <p:cNvPr id="11" name="Rectangle 10">
@@ -17845,7 +17845,7 @@
             </p:txBody>
           </p:sp>
         </mc:Choice>
-        <mc:Fallback>
+        <mc:Fallback xmlns="">
           <p:sp>
             <p:nvSpPr>
               <p:cNvPr id="11" name="Rectangle 10">
@@ -17895,8 +17895,8 @@
           </p:sp>
         </mc:Fallback>
       </mc:AlternateContent>
-      <mc:AlternateContent xmlns:mc="http://schemas.openxmlformats.org/markup-compatibility/2006">
-        <mc:Choice xmlns:a14="http://schemas.microsoft.com/office/drawing/2010/main" Requires="a14">
+      <mc:AlternateContent xmlns:mc="http://schemas.openxmlformats.org/markup-compatibility/2006" xmlns:a14="http://schemas.microsoft.com/office/drawing/2010/main">
+        <mc:Choice Requires="a14">
           <p:sp>
             <p:nvSpPr>
               <p:cNvPr id="13" name="Rectangle 12">
@@ -18356,7 +18356,7 @@
             </p:txBody>
           </p:sp>
         </mc:Choice>
-        <mc:Fallback>
+        <mc:Fallback xmlns="">
           <p:sp>
             <p:nvSpPr>
               <p:cNvPr id="13" name="Rectangle 12">
@@ -18681,8 +18681,8 @@
           </a:p>
         </p:txBody>
       </p:sp>
-      <mc:AlternateContent xmlns:mc="http://schemas.openxmlformats.org/markup-compatibility/2006">
-        <mc:Choice xmlns:a14="http://schemas.microsoft.com/office/drawing/2010/main" Requires="a14">
+      <mc:AlternateContent xmlns:mc="http://schemas.openxmlformats.org/markup-compatibility/2006" xmlns:a14="http://schemas.microsoft.com/office/drawing/2010/main">
+        <mc:Choice Requires="a14">
           <p:sp>
             <p:nvSpPr>
               <p:cNvPr id="16" name="Rectangle 15">
@@ -19083,7 +19083,7 @@
             </p:txBody>
           </p:sp>
         </mc:Choice>
-        <mc:Fallback>
+        <mc:Fallback xmlns="">
           <p:sp>
             <p:nvSpPr>
               <p:cNvPr id="16" name="Rectangle 15">
@@ -19133,6 +19133,990 @@
           </p:sp>
         </mc:Fallback>
       </mc:AlternateContent>
+      <mc:AlternateContent xmlns:mc="http://schemas.openxmlformats.org/markup-compatibility/2006">
+        <mc:Choice xmlns:a14="http://schemas.microsoft.com/office/drawing/2010/main" Requires="a14">
+          <p:sp>
+            <p:nvSpPr>
+              <p:cNvPr id="8" name="Rectangle 7">
+                <a:extLst>
+                  <a:ext uri="{FF2B5EF4-FFF2-40B4-BE49-F238E27FC236}">
+                    <a16:creationId xmlns:a16="http://schemas.microsoft.com/office/drawing/2014/main" id="{869C4274-804A-4BFA-A27A-14461831171E}"/>
+                  </a:ext>
+                </a:extLst>
+              </p:cNvPr>
+              <p:cNvSpPr/>
+              <p:nvPr/>
+            </p:nvSpPr>
+            <p:spPr>
+              <a:xfrm>
+                <a:off x="11430000" y="-1"/>
+                <a:ext cx="2286000" cy="5840362"/>
+              </a:xfrm>
+              <a:prstGeom prst="rect">
+                <a:avLst/>
+              </a:prstGeom>
+              <a:solidFill>
+                <a:srgbClr val="001746"/>
+              </a:solidFill>
+              <a:ln>
+                <a:solidFill>
+                  <a:schemeClr val="accent1"/>
+                </a:solidFill>
+              </a:ln>
+            </p:spPr>
+            <p:style>
+              <a:lnRef idx="2">
+                <a:schemeClr val="accent1">
+                  <a:shade val="50000"/>
+                </a:schemeClr>
+              </a:lnRef>
+              <a:fillRef idx="1">
+                <a:schemeClr val="accent1"/>
+              </a:fillRef>
+              <a:effectRef idx="0">
+                <a:schemeClr val="accent1"/>
+              </a:effectRef>
+              <a:fontRef idx="minor">
+                <a:schemeClr val="lt1"/>
+              </a:fontRef>
+            </p:style>
+            <p:txBody>
+              <a:bodyPr rtlCol="0" anchor="t"/>
+              <a:lstStyle/>
+              <a:p>
+                <a:r>
+                  <a:rPr lang="en-US" sz="1000" b="1" dirty="0">
+                    <a:solidFill>
+                      <a:schemeClr val="accent2">
+                        <a:lumMod val="50000"/>
+                      </a:schemeClr>
+                    </a:solidFill>
+                    <a:highlight>
+                      <a:srgbClr val="FFFF00"/>
+                    </a:highlight>
+                  </a:rPr>
+                  <a:t>Mean Reciprocal Rank</a:t>
+                </a:r>
+                <a:endParaRPr lang="en-SG" sz="1000" b="1" dirty="0">
+                  <a:solidFill>
+                    <a:schemeClr val="accent2">
+                      <a:lumMod val="50000"/>
+                    </a:schemeClr>
+                  </a:solidFill>
+                </a:endParaRPr>
+              </a:p>
+              <a:p>
+                <a:pPr marL="88488" indent="-88488">
+                  <a:buFont typeface="Arial" panose="020B0604020202020204" pitchFamily="34" charset="0"/>
+                  <a:buChar char="•"/>
+                </a:pPr>
+                <a:r>
+                  <a:rPr lang="en-US" sz="1000" i="0" dirty="0">
+                    <a:solidFill>
+                      <a:schemeClr val="bg1"/>
+                    </a:solidFill>
+                    <a:latin typeface="+mj-lt"/>
+                  </a:rPr>
+                  <a:t>Take top K prediction as pred TRUE</a:t>
+                </a:r>
+              </a:p>
+              <a:p>
+                <a:pPr marL="88488" indent="-88488">
+                  <a:buFont typeface="Arial" panose="020B0604020202020204" pitchFamily="34" charset="0"/>
+                  <a:buChar char="•"/>
+                </a:pPr>
+                <a:r>
+                  <a:rPr lang="en-US" sz="1000" dirty="0">
+                    <a:solidFill>
+                      <a:schemeClr val="bg1"/>
+                    </a:solidFill>
+                    <a:latin typeface="+mj-lt"/>
+                  </a:rPr>
+                  <a:t>MRR = </a:t>
+                </a:r>
+                <a14:m>
+                  <m:oMath xmlns:m="http://schemas.openxmlformats.org/officeDocument/2006/math">
+                    <m:f>
+                      <m:fPr>
+                        <m:ctrlPr>
+                          <a:rPr lang="en-US" sz="1000" b="0" i="1" smtClean="0">
+                            <a:solidFill>
+                              <a:schemeClr val="bg1"/>
+                            </a:solidFill>
+                            <a:latin typeface="Cambria Math" panose="02040503050406030204" pitchFamily="18" charset="0"/>
+                          </a:rPr>
+                        </m:ctrlPr>
+                      </m:fPr>
+                      <m:num>
+                        <m:r>
+                          <a:rPr lang="en-US" sz="1000" b="0" i="1" smtClean="0">
+                            <a:solidFill>
+                              <a:schemeClr val="bg1"/>
+                            </a:solidFill>
+                            <a:latin typeface="Cambria Math" panose="02040503050406030204" pitchFamily="18" charset="0"/>
+                          </a:rPr>
+                          <m:t>1</m:t>
+                        </m:r>
+                      </m:num>
+                      <m:den>
+                        <m:r>
+                          <a:rPr lang="en-US" sz="1000" b="0" i="1" smtClean="0">
+                            <a:solidFill>
+                              <a:schemeClr val="bg1"/>
+                            </a:solidFill>
+                            <a:latin typeface="Cambria Math" panose="02040503050406030204" pitchFamily="18" charset="0"/>
+                          </a:rPr>
+                          <m:t>𝑄</m:t>
+                        </m:r>
+                      </m:den>
+                    </m:f>
+                    <m:nary>
+                      <m:naryPr>
+                        <m:chr m:val="∑"/>
+                        <m:supHide m:val="on"/>
+                        <m:ctrlPr>
+                          <a:rPr lang="en-US" sz="1000" b="0" i="1" smtClean="0">
+                            <a:solidFill>
+                              <a:schemeClr val="bg1"/>
+                            </a:solidFill>
+                            <a:latin typeface="Cambria Math" panose="02040503050406030204" pitchFamily="18" charset="0"/>
+                          </a:rPr>
+                        </m:ctrlPr>
+                      </m:naryPr>
+                      <m:sub>
+                        <m:r>
+                          <m:rPr>
+                            <m:brk m:alnAt="7"/>
+                          </m:rPr>
+                          <a:rPr lang="en-US" sz="1000" b="0" i="1" smtClean="0">
+                            <a:solidFill>
+                              <a:schemeClr val="bg1"/>
+                            </a:solidFill>
+                            <a:latin typeface="Cambria Math" panose="02040503050406030204" pitchFamily="18" charset="0"/>
+                          </a:rPr>
+                          <m:t>𝑄</m:t>
+                        </m:r>
+                      </m:sub>
+                      <m:sup/>
+                      <m:e>
+                        <m:f>
+                          <m:fPr>
+                            <m:ctrlPr>
+                              <a:rPr lang="en-US" sz="1000" b="0" i="1" smtClean="0">
+                                <a:solidFill>
+                                  <a:schemeClr val="bg1"/>
+                                </a:solidFill>
+                                <a:latin typeface="Cambria Math" panose="02040503050406030204" pitchFamily="18" charset="0"/>
+                              </a:rPr>
+                            </m:ctrlPr>
+                          </m:fPr>
+                          <m:num>
+                            <m:r>
+                              <a:rPr lang="en-US" sz="1000" b="0" i="1" smtClean="0">
+                                <a:solidFill>
+                                  <a:schemeClr val="bg1"/>
+                                </a:solidFill>
+                                <a:latin typeface="Cambria Math" panose="02040503050406030204" pitchFamily="18" charset="0"/>
+                              </a:rPr>
+                              <m:t>1</m:t>
+                            </m:r>
+                          </m:num>
+                          <m:den>
+                            <m:r>
+                              <a:rPr lang="en-US" sz="1000" b="0" i="1" smtClean="0">
+                                <a:solidFill>
+                                  <a:schemeClr val="bg1"/>
+                                </a:solidFill>
+                                <a:latin typeface="Cambria Math" panose="02040503050406030204" pitchFamily="18" charset="0"/>
+                              </a:rPr>
+                              <m:t>𝑟𝑎𝑛</m:t>
+                            </m:r>
+                            <m:sSub>
+                              <m:sSubPr>
+                                <m:ctrlPr>
+                                  <a:rPr lang="en-US" sz="1000" b="0" i="1" smtClean="0">
+                                    <a:solidFill>
+                                      <a:schemeClr val="bg1"/>
+                                    </a:solidFill>
+                                    <a:latin typeface="Cambria Math" panose="02040503050406030204" pitchFamily="18" charset="0"/>
+                                  </a:rPr>
+                                </m:ctrlPr>
+                              </m:sSubPr>
+                              <m:e>
+                                <m:r>
+                                  <a:rPr lang="en-US" sz="1000" b="0" i="1" smtClean="0">
+                                    <a:solidFill>
+                                      <a:schemeClr val="bg1"/>
+                                    </a:solidFill>
+                                    <a:latin typeface="Cambria Math" panose="02040503050406030204" pitchFamily="18" charset="0"/>
+                                  </a:rPr>
+                                  <m:t>𝑘</m:t>
+                                </m:r>
+                              </m:e>
+                              <m:sub>
+                                <m:r>
+                                  <a:rPr lang="en-US" sz="1000" b="0" i="1" smtClean="0">
+                                    <a:solidFill>
+                                      <a:schemeClr val="bg1"/>
+                                    </a:solidFill>
+                                    <a:latin typeface="Cambria Math" panose="02040503050406030204" pitchFamily="18" charset="0"/>
+                                  </a:rPr>
+                                  <m:t>𝑖</m:t>
+                                </m:r>
+                              </m:sub>
+                            </m:sSub>
+                          </m:den>
+                        </m:f>
+                      </m:e>
+                    </m:nary>
+                  </m:oMath>
+                </a14:m>
+                <a:r>
+                  <a:rPr lang="en-US" sz="1000" dirty="0">
+                    <a:solidFill>
+                      <a:schemeClr val="bg1"/>
+                    </a:solidFill>
+                  </a:rPr>
+                  <a:t>, where </a:t>
+                </a:r>
+                <a14:m>
+                  <m:oMath xmlns:m="http://schemas.openxmlformats.org/officeDocument/2006/math">
+                    <m:r>
+                      <a:rPr lang="en-US" sz="1000" b="0" i="1" smtClean="0">
+                        <a:solidFill>
+                          <a:schemeClr val="bg1"/>
+                        </a:solidFill>
+                        <a:latin typeface="Cambria Math" panose="02040503050406030204" pitchFamily="18" charset="0"/>
+                      </a:rPr>
+                      <m:t>𝑟𝑎𝑛</m:t>
+                    </m:r>
+                    <m:sSub>
+                      <m:sSubPr>
+                        <m:ctrlPr>
+                          <a:rPr lang="en-US" sz="1000" b="0" i="1" smtClean="0">
+                            <a:solidFill>
+                              <a:schemeClr val="bg1"/>
+                            </a:solidFill>
+                            <a:latin typeface="Cambria Math" panose="02040503050406030204" pitchFamily="18" charset="0"/>
+                          </a:rPr>
+                        </m:ctrlPr>
+                      </m:sSubPr>
+                      <m:e>
+                        <m:r>
+                          <a:rPr lang="en-US" sz="1000" b="0" i="1" smtClean="0">
+                            <a:solidFill>
+                              <a:schemeClr val="bg1"/>
+                            </a:solidFill>
+                            <a:latin typeface="Cambria Math" panose="02040503050406030204" pitchFamily="18" charset="0"/>
+                          </a:rPr>
+                          <m:t>𝑘</m:t>
+                        </m:r>
+                      </m:e>
+                      <m:sub>
+                        <m:r>
+                          <a:rPr lang="en-US" sz="1000" b="0" i="1" smtClean="0">
+                            <a:solidFill>
+                              <a:schemeClr val="bg1"/>
+                            </a:solidFill>
+                            <a:latin typeface="Cambria Math" panose="02040503050406030204" pitchFamily="18" charset="0"/>
+                          </a:rPr>
+                          <m:t>𝑖</m:t>
+                        </m:r>
+                      </m:sub>
+                    </m:sSub>
+                  </m:oMath>
+                </a14:m>
+                <a:r>
+                  <a:rPr lang="en-US" sz="1000" dirty="0">
+                    <a:solidFill>
+                      <a:schemeClr val="bg1"/>
+                    </a:solidFill>
+                  </a:rPr>
+                  <a:t> is the</a:t>
+                </a:r>
+                <a:br>
+                  <a:rPr lang="en-US" sz="1000" dirty="0">
+                    <a:solidFill>
+                      <a:schemeClr val="bg1"/>
+                    </a:solidFill>
+                  </a:rPr>
+                </a:br>
+                <a:r>
+                  <a:rPr lang="en-US" sz="1000" dirty="0">
+                    <a:solidFill>
+                      <a:schemeClr val="bg1"/>
+                    </a:solidFill>
+                  </a:rPr>
+                  <a:t>rank of the 1</a:t>
+                </a:r>
+                <a:r>
+                  <a:rPr lang="en-US" sz="1000" baseline="30000" dirty="0">
+                    <a:solidFill>
+                      <a:schemeClr val="bg1"/>
+                    </a:solidFill>
+                  </a:rPr>
+                  <a:t>st</a:t>
+                </a:r>
+                <a:r>
+                  <a:rPr lang="en-US" sz="1000" dirty="0">
+                    <a:solidFill>
+                      <a:schemeClr val="bg1"/>
+                    </a:solidFill>
+                  </a:rPr>
+                  <a:t> relevant doc for query </a:t>
+                </a:r>
+                <a14:m>
+                  <m:oMath xmlns:m="http://schemas.openxmlformats.org/officeDocument/2006/math">
+                    <m:r>
+                      <a:rPr lang="en-US" sz="1000" b="0" i="1" smtClean="0">
+                        <a:solidFill>
+                          <a:schemeClr val="bg1"/>
+                        </a:solidFill>
+                        <a:latin typeface="Cambria Math" panose="02040503050406030204" pitchFamily="18" charset="0"/>
+                      </a:rPr>
+                      <m:t>𝑖</m:t>
+                    </m:r>
+                  </m:oMath>
+                </a14:m>
+                <a:endParaRPr lang="en-US" sz="1000" dirty="0">
+                  <a:solidFill>
+                    <a:schemeClr val="accent2">
+                      <a:lumMod val="50000"/>
+                    </a:schemeClr>
+                  </a:solidFill>
+                </a:endParaRPr>
+              </a:p>
+              <a:p>
+                <a:endParaRPr lang="en-US" sz="1000" b="1" dirty="0">
+                  <a:solidFill>
+                    <a:schemeClr val="accent2">
+                      <a:lumMod val="50000"/>
+                    </a:schemeClr>
+                  </a:solidFill>
+                  <a:highlight>
+                    <a:srgbClr val="FFFF00"/>
+                  </a:highlight>
+                </a:endParaRPr>
+              </a:p>
+              <a:p>
+                <a:r>
+                  <a:rPr lang="en-US" sz="1000" b="1" dirty="0">
+                    <a:solidFill>
+                      <a:schemeClr val="accent2">
+                        <a:lumMod val="50000"/>
+                      </a:schemeClr>
+                    </a:solidFill>
+                    <a:highlight>
+                      <a:srgbClr val="FFFF00"/>
+                    </a:highlight>
+                  </a:rPr>
+                  <a:t>Precision / Recall / F1 @ K</a:t>
+                </a:r>
+                <a:endParaRPr lang="en-SG" sz="1000" b="1" dirty="0">
+                  <a:solidFill>
+                    <a:schemeClr val="accent2">
+                      <a:lumMod val="50000"/>
+                    </a:schemeClr>
+                  </a:solidFill>
+                </a:endParaRPr>
+              </a:p>
+              <a:p>
+                <a:pPr marL="88488" indent="-88488">
+                  <a:buFont typeface="Arial" panose="020B0604020202020204" pitchFamily="34" charset="0"/>
+                  <a:buChar char="•"/>
+                </a:pPr>
+                <a:r>
+                  <a:rPr lang="en-US" sz="1000" dirty="0">
+                    <a:solidFill>
+                      <a:schemeClr val="bg1"/>
+                    </a:solidFill>
+                  </a:rPr>
+                  <a:t>Take top K prediction as pred TRUE</a:t>
+                </a:r>
+              </a:p>
+              <a:p>
+                <a:pPr marL="88488" indent="-88488">
+                  <a:buFont typeface="Arial" panose="020B0604020202020204" pitchFamily="34" charset="0"/>
+                  <a:buChar char="•"/>
+                </a:pPr>
+                <a:r>
+                  <a:rPr lang="en-US" sz="1000" dirty="0">
+                    <a:solidFill>
+                      <a:schemeClr val="bg1"/>
+                    </a:solidFill>
+                  </a:rPr>
+                  <a:t>Calculate Precision, Recall land F1</a:t>
+                </a:r>
+                <a:br>
+                  <a:rPr lang="en-US" sz="1000" dirty="0">
+                    <a:solidFill>
+                      <a:schemeClr val="bg1"/>
+                    </a:solidFill>
+                  </a:rPr>
+                </a:br>
+                <a:endParaRPr lang="en-US" sz="1000" dirty="0">
+                  <a:solidFill>
+                    <a:schemeClr val="bg1"/>
+                  </a:solidFill>
+                </a:endParaRPr>
+              </a:p>
+              <a:p>
+                <a:r>
+                  <a:rPr lang="en-US" sz="1000" b="1" dirty="0">
+                    <a:solidFill>
+                      <a:schemeClr val="accent2">
+                        <a:lumMod val="50000"/>
+                      </a:schemeClr>
+                    </a:solidFill>
+                    <a:highlight>
+                      <a:srgbClr val="FFFF00"/>
+                    </a:highlight>
+                  </a:rPr>
+                  <a:t>MAP: (Mean) Average Precision </a:t>
+                </a:r>
+                <a:endParaRPr lang="en-SG" sz="1000" b="1" dirty="0">
+                  <a:solidFill>
+                    <a:schemeClr val="accent2">
+                      <a:lumMod val="50000"/>
+                    </a:schemeClr>
+                  </a:solidFill>
+                </a:endParaRPr>
+              </a:p>
+              <a:p>
+                <a:pPr marL="88488" indent="-88488">
+                  <a:buFont typeface="Arial" panose="020B0604020202020204" pitchFamily="34" charset="0"/>
+                  <a:buChar char="•"/>
+                </a:pPr>
+                <a:r>
+                  <a:rPr lang="en-US" sz="1000" dirty="0">
+                    <a:solidFill>
+                      <a:schemeClr val="bg1"/>
+                    </a:solidFill>
+                  </a:rPr>
+                  <a:t>For binary relevance</a:t>
+                </a:r>
+              </a:p>
+              <a:p>
+                <a:pPr marL="88488" indent="-88488">
+                  <a:buFont typeface="Arial" panose="020B0604020202020204" pitchFamily="34" charset="0"/>
+                  <a:buChar char="•"/>
+                </a:pPr>
+                <a:r>
+                  <a:rPr lang="en-US" sz="1000" dirty="0">
+                    <a:solidFill>
+                      <a:schemeClr val="bg1"/>
+                    </a:solidFill>
+                  </a:rPr>
+                  <a:t>How much of relevant docs are concentrated in the highest predicts</a:t>
+                </a:r>
+              </a:p>
+              <a:p>
+                <a:pPr marL="88488" indent="-88488">
+                  <a:buFont typeface="Arial" panose="020B0604020202020204" pitchFamily="34" charset="0"/>
+                  <a:buChar char="•"/>
+                </a:pPr>
+                <a:endParaRPr lang="en-US" sz="1000" dirty="0">
+                  <a:solidFill>
+                    <a:srgbClr val="FF0000"/>
+                  </a:solidFill>
+                </a:endParaRPr>
+              </a:p>
+              <a:p>
+                <a:pPr marL="88488" indent="-88488">
+                  <a:buFont typeface="Arial" panose="020B0604020202020204" pitchFamily="34" charset="0"/>
+                  <a:buChar char="•"/>
+                </a:pPr>
+                <a:endParaRPr lang="en-US" sz="1000" dirty="0">
+                  <a:solidFill>
+                    <a:schemeClr val="bg1"/>
+                  </a:solidFill>
+                </a:endParaRPr>
+              </a:p>
+              <a:p>
+                <a:pPr marL="88488" indent="-88488">
+                  <a:buFont typeface="Arial" panose="020B0604020202020204" pitchFamily="34" charset="0"/>
+                  <a:buChar char="•"/>
+                </a:pPr>
+                <a:r>
+                  <a:rPr lang="en-US" sz="1000" dirty="0">
+                    <a:solidFill>
+                      <a:schemeClr val="bg1"/>
+                    </a:solidFill>
+                  </a:rPr>
+                  <a:t>Can calc with a more efficient algo</a:t>
+                </a:r>
+              </a:p>
+              <a:p>
+                <a:pPr marL="88488" indent="-88488">
+                  <a:buFont typeface="Arial" panose="020B0604020202020204" pitchFamily="34" charset="0"/>
+                  <a:buChar char="•"/>
+                </a:pPr>
+                <a:endParaRPr lang="en-US" sz="1000" dirty="0">
+                  <a:solidFill>
+                    <a:srgbClr val="FF0000"/>
+                  </a:solidFill>
+                </a:endParaRPr>
+              </a:p>
+              <a:p>
+                <a:r>
+                  <a:rPr lang="en-US" sz="1000" b="1" dirty="0">
+                    <a:solidFill>
+                      <a:schemeClr val="accent2">
+                        <a:lumMod val="50000"/>
+                      </a:schemeClr>
+                    </a:solidFill>
+                    <a:highlight>
+                      <a:srgbClr val="FFFF00"/>
+                    </a:highlight>
+                  </a:rPr>
+                  <a:t>NDGC: Normalized Discounted Cumulative Gain</a:t>
+                </a:r>
+                <a:endParaRPr lang="en-SG" sz="1000" b="1" dirty="0">
+                  <a:solidFill>
+                    <a:schemeClr val="accent2">
+                      <a:lumMod val="50000"/>
+                    </a:schemeClr>
+                  </a:solidFill>
+                </a:endParaRPr>
+              </a:p>
+              <a:p>
+                <a:pPr marL="88488" indent="-88488">
+                  <a:buFont typeface="Arial" panose="020B0604020202020204" pitchFamily="34" charset="0"/>
+                  <a:buChar char="•"/>
+                </a:pPr>
+                <a:r>
+                  <a:rPr lang="en-US" sz="1000" dirty="0">
+                    <a:solidFill>
+                      <a:schemeClr val="bg1"/>
+                    </a:solidFill>
+                  </a:rPr>
+                  <a:t>Work with </a:t>
+                </a:r>
+                <a:r>
+                  <a:rPr lang="en-US" sz="1000" dirty="0">
+                    <a:solidFill>
+                      <a:srgbClr val="92D050"/>
+                    </a:solidFill>
+                  </a:rPr>
+                  <a:t>continuous relevance score</a:t>
+                </a:r>
+              </a:p>
+              <a:p>
+                <a:pPr marL="88488" indent="-88488">
+                  <a:buFont typeface="Arial" panose="020B0604020202020204" pitchFamily="34" charset="0"/>
+                  <a:buChar char="•"/>
+                </a:pPr>
+                <a:endParaRPr lang="en-US" sz="1000" dirty="0">
+                  <a:solidFill>
+                    <a:schemeClr val="bg1"/>
+                  </a:solidFill>
+                </a:endParaRPr>
+              </a:p>
+              <a:p>
+                <a:pPr marL="88488" indent="-88488">
+                  <a:buFont typeface="Arial" panose="020B0604020202020204" pitchFamily="34" charset="0"/>
+                  <a:buChar char="•"/>
+                </a:pPr>
+                <a:endParaRPr lang="en-US" sz="1000" dirty="0">
+                  <a:solidFill>
+                    <a:schemeClr val="bg1"/>
+                  </a:solidFill>
+                </a:endParaRPr>
+              </a:p>
+              <a:p>
+                <a:pPr marL="88488" indent="-88488">
+                  <a:buFont typeface="Arial" panose="020B0604020202020204" pitchFamily="34" charset="0"/>
+                  <a:buChar char="•"/>
+                </a:pPr>
+                <a:endParaRPr lang="en-US" sz="1000" dirty="0">
+                  <a:solidFill>
+                    <a:schemeClr val="bg1"/>
+                  </a:solidFill>
+                </a:endParaRPr>
+              </a:p>
+              <a:p>
+                <a:pPr marL="88488" indent="-88488">
+                  <a:buFont typeface="Arial" panose="020B0604020202020204" pitchFamily="34" charset="0"/>
+                  <a:buChar char="•"/>
+                </a:pPr>
+                <a:endParaRPr lang="en-US" sz="1000" dirty="0">
+                  <a:solidFill>
+                    <a:schemeClr val="bg1"/>
+                  </a:solidFill>
+                </a:endParaRPr>
+              </a:p>
+              <a:p>
+                <a:pPr marL="88488" indent="-88488">
+                  <a:buFont typeface="Arial" panose="020B0604020202020204" pitchFamily="34" charset="0"/>
+                  <a:buChar char="•"/>
+                </a:pPr>
+                <a14:m>
+                  <m:oMath xmlns:m="http://schemas.openxmlformats.org/officeDocument/2006/math">
+                    <m:r>
+                      <a:rPr lang="en-US" sz="1000" b="0" i="1" smtClean="0">
+                        <a:solidFill>
+                          <a:schemeClr val="bg1"/>
+                        </a:solidFill>
+                        <a:latin typeface="Cambria Math" panose="02040503050406030204" pitchFamily="18" charset="0"/>
+                      </a:rPr>
+                      <m:t>𝑟𝑒</m:t>
+                    </m:r>
+                    <m:sSub>
+                      <m:sSubPr>
+                        <m:ctrlPr>
+                          <a:rPr lang="en-US" sz="1000" b="0" i="1" smtClean="0">
+                            <a:solidFill>
+                              <a:schemeClr val="bg1"/>
+                            </a:solidFill>
+                            <a:latin typeface="Cambria Math" panose="02040503050406030204" pitchFamily="18" charset="0"/>
+                          </a:rPr>
+                        </m:ctrlPr>
+                      </m:sSubPr>
+                      <m:e>
+                        <m:r>
+                          <a:rPr lang="en-US" sz="1000" b="0" i="1" smtClean="0">
+                            <a:solidFill>
+                              <a:schemeClr val="bg1"/>
+                            </a:solidFill>
+                            <a:latin typeface="Cambria Math" panose="02040503050406030204" pitchFamily="18" charset="0"/>
+                          </a:rPr>
+                          <m:t>𝑙</m:t>
+                        </m:r>
+                      </m:e>
+                      <m:sub>
+                        <m:r>
+                          <a:rPr lang="en-US" sz="1000" b="0" i="1" smtClean="0">
+                            <a:solidFill>
+                              <a:schemeClr val="bg1"/>
+                            </a:solidFill>
+                            <a:latin typeface="Cambria Math" panose="02040503050406030204" pitchFamily="18" charset="0"/>
+                          </a:rPr>
+                          <m:t>𝑖</m:t>
+                        </m:r>
+                      </m:sub>
+                    </m:sSub>
+                  </m:oMath>
+                </a14:m>
+                <a:r>
+                  <a:rPr lang="en-US" sz="1000" dirty="0">
+                    <a:solidFill>
+                      <a:schemeClr val="bg1"/>
+                    </a:solidFill>
+                  </a:rPr>
+                  <a:t> is the relevance of doc at index </a:t>
+                </a:r>
+                <a14:m>
+                  <m:oMath xmlns:m="http://schemas.openxmlformats.org/officeDocument/2006/math">
+                    <m:r>
+                      <a:rPr lang="en-US" sz="1000" b="0" i="1" smtClean="0">
+                        <a:solidFill>
+                          <a:schemeClr val="bg1"/>
+                        </a:solidFill>
+                        <a:latin typeface="Cambria Math" panose="02040503050406030204" pitchFamily="18" charset="0"/>
+                      </a:rPr>
+                      <m:t>𝑖</m:t>
+                    </m:r>
+                  </m:oMath>
+                </a14:m>
+                <a:endParaRPr lang="en-US" sz="1000" dirty="0">
+                  <a:solidFill>
+                    <a:schemeClr val="bg1"/>
+                  </a:solidFill>
+                </a:endParaRPr>
+              </a:p>
+              <a:p>
+                <a:pPr marL="88488" indent="-88488">
+                  <a:buFont typeface="Arial" panose="020B0604020202020204" pitchFamily="34" charset="0"/>
+                  <a:buChar char="•"/>
+                </a:pPr>
+                <a:r>
+                  <a:rPr lang="en-US" sz="1000" dirty="0">
+                    <a:solidFill>
+                      <a:schemeClr val="bg1"/>
+                    </a:solidFill>
+                  </a:rPr>
+                  <a:t>Emphasis on retrieving relevant docs</a:t>
+                </a:r>
+              </a:p>
+              <a:p>
+                <a:pPr marL="88488" indent="-88488">
+                  <a:buFont typeface="Arial" panose="020B0604020202020204" pitchFamily="34" charset="0"/>
+                  <a:buChar char="•"/>
+                </a:pPr>
+                <a:r>
+                  <a:rPr lang="en-US" sz="1000" dirty="0">
+                    <a:solidFill>
+                      <a:srgbClr val="FF0000"/>
+                    </a:solidFill>
+                  </a:rPr>
+                  <a:t>Larger result sets, likely higher DCG</a:t>
+                </a:r>
+              </a:p>
+              <a:p>
+                <a:pPr marL="88488" indent="-88488">
+                  <a:buFont typeface="Arial" panose="020B0604020202020204" pitchFamily="34" charset="0"/>
+                  <a:buChar char="•"/>
+                </a:pPr>
+                <a:r>
+                  <a:rPr lang="en-US" sz="1000" dirty="0">
+                    <a:solidFill>
+                      <a:schemeClr val="bg1"/>
+                    </a:solidFill>
+                  </a:rPr>
+                  <a:t>Normalized by ideal DCG@K</a:t>
+                </a:r>
+              </a:p>
+              <a:p>
+                <a:pPr marL="88488" indent="-88488">
+                  <a:buFont typeface="Arial" panose="020B0604020202020204" pitchFamily="34" charset="0"/>
+                  <a:buChar char="•"/>
+                </a:pPr>
+                <a:endParaRPr lang="en-US" sz="1000" dirty="0">
+                  <a:solidFill>
+                    <a:schemeClr val="bg1"/>
+                  </a:solidFill>
+                </a:endParaRPr>
+              </a:p>
+              <a:p>
+                <a:pPr marL="88488" indent="-88488">
+                  <a:buFont typeface="Arial" panose="020B0604020202020204" pitchFamily="34" charset="0"/>
+                  <a:buChar char="•"/>
+                </a:pPr>
+                <a:endParaRPr lang="en-US" sz="1000" dirty="0">
+                  <a:solidFill>
+                    <a:schemeClr val="bg1"/>
+                  </a:solidFill>
+                </a:endParaRPr>
+              </a:p>
+              <a:p>
+                <a:pPr marL="88488" indent="-88488">
+                  <a:buFont typeface="Arial" panose="020B0604020202020204" pitchFamily="34" charset="0"/>
+                  <a:buChar char="•"/>
+                </a:pPr>
+                <a:endParaRPr lang="en-US" sz="1000" dirty="0">
+                  <a:solidFill>
+                    <a:schemeClr val="bg1"/>
+                  </a:solidFill>
+                </a:endParaRPr>
+              </a:p>
+              <a:p>
+                <a:pPr marL="88488" indent="-88488">
+                  <a:buFont typeface="Arial" panose="020B0604020202020204" pitchFamily="34" charset="0"/>
+                  <a:buChar char="•"/>
+                </a:pPr>
+                <a:endParaRPr lang="en-US" sz="1000" dirty="0">
+                  <a:solidFill>
+                    <a:schemeClr val="bg1"/>
+                  </a:solidFill>
+                </a:endParaRPr>
+              </a:p>
+              <a:p>
+                <a:pPr marL="88488" indent="-88488">
+                  <a:buFont typeface="Arial" panose="020B0604020202020204" pitchFamily="34" charset="0"/>
+                  <a:buChar char="•"/>
+                </a:pPr>
+                <a:endParaRPr lang="en-US" sz="1000" dirty="0">
+                  <a:solidFill>
+                    <a:schemeClr val="bg1"/>
+                  </a:solidFill>
+                </a:endParaRPr>
+              </a:p>
+              <a:p>
+                <a:pPr marL="88488" indent="-88488">
+                  <a:buFont typeface="Arial" panose="020B0604020202020204" pitchFamily="34" charset="0"/>
+                  <a:buChar char="•"/>
+                </a:pPr>
+                <a:endParaRPr lang="en-US" sz="1000" dirty="0">
+                  <a:solidFill>
+                    <a:schemeClr val="bg1"/>
+                  </a:solidFill>
+                </a:endParaRPr>
+              </a:p>
+              <a:p>
+                <a:pPr marL="88488" indent="-88488">
+                  <a:buFont typeface="Arial" panose="020B0604020202020204" pitchFamily="34" charset="0"/>
+                  <a:buChar char="•"/>
+                </a:pPr>
+                <a:r>
+                  <a:rPr lang="en-US" sz="1000" dirty="0">
+                    <a:solidFill>
+                      <a:schemeClr val="bg1"/>
+                    </a:solidFill>
+                  </a:rPr>
+                  <a:t>Use Average NDCG to evaluate models</a:t>
+                </a:r>
+              </a:p>
+              <a:p>
+                <a:pPr marL="88488" indent="-88488">
+                  <a:buFont typeface="Arial" panose="020B0604020202020204" pitchFamily="34" charset="0"/>
+                  <a:buChar char="•"/>
+                </a:pPr>
+                <a:r>
+                  <a:rPr lang="en-US" sz="1000" dirty="0">
+                    <a:solidFill>
+                      <a:srgbClr val="FF0000"/>
+                    </a:solidFill>
+                  </a:rPr>
+                  <a:t>Not penalize bad/missing doc in result</a:t>
+                </a:r>
+              </a:p>
+              <a:p>
+                <a:pPr marL="88488" indent="-88488">
+                  <a:buFont typeface="Arial" panose="020B0604020202020204" pitchFamily="34" charset="0"/>
+                  <a:buChar char="•"/>
+                </a:pPr>
+                <a:r>
+                  <a:rPr lang="en-US" sz="1000" dirty="0">
+                    <a:solidFill>
+                      <a:srgbClr val="FF0000"/>
+                    </a:solidFill>
+                  </a:rPr>
+                  <a:t>NDCG can have a negative value</a:t>
+                </a:r>
+              </a:p>
+            </p:txBody>
+          </p:sp>
+        </mc:Choice>
+        <mc:Fallback>
+          <p:sp>
+            <p:nvSpPr>
+              <p:cNvPr id="8" name="Rectangle 7">
+                <a:extLst>
+                  <a:ext uri="{FF2B5EF4-FFF2-40B4-BE49-F238E27FC236}">
+                    <a16:creationId xmlns:a16="http://schemas.microsoft.com/office/drawing/2014/main" id="{869C4274-804A-4BFA-A27A-14461831171E}"/>
+                  </a:ext>
+                </a:extLst>
+              </p:cNvPr>
+              <p:cNvSpPr>
+                <a:spLocks noRot="1" noChangeAspect="1" noMove="1" noResize="1" noEditPoints="1" noAdjustHandles="1" noChangeArrowheads="1" noChangeShapeType="1" noTextEdit="1"/>
+              </p:cNvSpPr>
+              <p:nvPr/>
+            </p:nvSpPr>
+            <p:spPr>
+              <a:xfrm>
+                <a:off x="11430000" y="-1"/>
+                <a:ext cx="2286000" cy="5840362"/>
+              </a:xfrm>
+              <a:prstGeom prst="rect">
+                <a:avLst/>
+              </a:prstGeom>
+              <a:blipFill>
+                <a:blip r:embed="rId6"/>
+                <a:stretch>
+                  <a:fillRect/>
+                </a:stretch>
+              </a:blipFill>
+              <a:ln>
+                <a:solidFill>
+                  <a:schemeClr val="accent1"/>
+                </a:solidFill>
+              </a:ln>
+            </p:spPr>
+            <p:txBody>
+              <a:bodyPr/>
+              <a:lstStyle/>
+              <a:p>
+                <a:r>
+                  <a:rPr lang="en-SG">
+                    <a:noFill/>
+                  </a:rPr>
+                  <a:t> </a:t>
+                </a:r>
+              </a:p>
+            </p:txBody>
+          </p:sp>
+        </mc:Fallback>
+      </mc:AlternateContent>
+      <p:pic>
+        <p:nvPicPr>
+          <p:cNvPr id="3" name="Picture 2">
+            <a:extLst>
+              <a:ext uri="{FF2B5EF4-FFF2-40B4-BE49-F238E27FC236}">
+                <a16:creationId xmlns:a16="http://schemas.microsoft.com/office/drawing/2014/main" id="{1668D212-1965-436B-9276-D5F609C4DED1}"/>
+              </a:ext>
+            </a:extLst>
+          </p:cNvPr>
+          <p:cNvPicPr>
+            <a:picLocks noChangeAspect="1"/>
+          </p:cNvPicPr>
+          <p:nvPr/>
+        </p:nvPicPr>
+        <p:blipFill>
+          <a:blip r:embed="rId7"/>
+          <a:stretch>
+            <a:fillRect/>
+          </a:stretch>
+        </p:blipFill>
+        <p:spPr>
+          <a:xfrm>
+            <a:off x="11430000" y="2137889"/>
+            <a:ext cx="2286000" cy="283688"/>
+          </a:xfrm>
+          <a:prstGeom prst="rect">
+            <a:avLst/>
+          </a:prstGeom>
+        </p:spPr>
+      </p:pic>
+      <p:pic>
+        <p:nvPicPr>
+          <p:cNvPr id="6" name="Picture 5">
+            <a:extLst>
+              <a:ext uri="{FF2B5EF4-FFF2-40B4-BE49-F238E27FC236}">
+                <a16:creationId xmlns:a16="http://schemas.microsoft.com/office/drawing/2014/main" id="{F71C9A1C-E0EC-4E3B-9FEE-5BA0D47934DE}"/>
+              </a:ext>
+            </a:extLst>
+          </p:cNvPr>
+          <p:cNvPicPr>
+            <a:picLocks noChangeAspect="1"/>
+          </p:cNvPicPr>
+          <p:nvPr/>
+        </p:nvPicPr>
+        <p:blipFill>
+          <a:blip r:embed="rId8"/>
+          <a:stretch>
+            <a:fillRect/>
+          </a:stretch>
+        </p:blipFill>
+        <p:spPr>
+          <a:xfrm>
+            <a:off x="11803846" y="3240998"/>
+            <a:ext cx="1538307" cy="479242"/>
+          </a:xfrm>
+          <a:prstGeom prst="rect">
+            <a:avLst/>
+          </a:prstGeom>
+        </p:spPr>
+      </p:pic>
+      <p:pic>
+        <p:nvPicPr>
+          <p:cNvPr id="9" name="Picture 8">
+            <a:extLst>
+              <a:ext uri="{FF2B5EF4-FFF2-40B4-BE49-F238E27FC236}">
+                <a16:creationId xmlns:a16="http://schemas.microsoft.com/office/drawing/2014/main" id="{796421C5-D492-4D56-B5A5-C735CBBBFAA9}"/>
+              </a:ext>
+            </a:extLst>
+          </p:cNvPr>
+          <p:cNvPicPr>
+            <a:picLocks noChangeAspect="1"/>
+          </p:cNvPicPr>
+          <p:nvPr/>
+        </p:nvPicPr>
+        <p:blipFill>
+          <a:blip r:embed="rId9"/>
+          <a:stretch>
+            <a:fillRect/>
+          </a:stretch>
+        </p:blipFill>
+        <p:spPr>
+          <a:xfrm>
+            <a:off x="11479671" y="4425365"/>
+            <a:ext cx="2186655" cy="868309"/>
+          </a:xfrm>
+          <a:prstGeom prst="rect">
+            <a:avLst/>
+          </a:prstGeom>
+        </p:spPr>
+      </p:pic>
     </p:spTree>
     <p:extLst>
       <p:ext uri="{BB962C8B-B14F-4D97-AF65-F5344CB8AC3E}">

</xml_diff>